<commit_message>
Update advanced design deck
Add model-binding slides and examples; add versioning slides
</commit_message>
<xml_diff>
--- a/Slides/Module 6 - Web API Advanced Design.pptx
+++ b/Slides/Module 6 - Web API Advanced Design.pptx
@@ -5,10 +5,10 @@
     <p:sldMasterId id="2147483660" r:id="rId4"/>
   </p:sldMasterIdLst>
   <p:notesMasterIdLst>
-    <p:notesMasterId r:id="rId18"/>
+    <p:notesMasterId r:id="rId22"/>
   </p:notesMasterIdLst>
   <p:handoutMasterIdLst>
-    <p:handoutMasterId r:id="rId19"/>
+    <p:handoutMasterId r:id="rId23"/>
   </p:handoutMasterIdLst>
   <p:sldIdLst>
     <p:sldId id="277" r:id="rId5"/>
@@ -20,10 +20,14 @@
     <p:sldId id="305" r:id="rId11"/>
     <p:sldId id="312" r:id="rId12"/>
     <p:sldId id="302" r:id="rId13"/>
-    <p:sldId id="300" r:id="rId14"/>
-    <p:sldId id="304" r:id="rId15"/>
-    <p:sldId id="309" r:id="rId16"/>
-    <p:sldId id="269" r:id="rId17"/>
+    <p:sldId id="313" r:id="rId14"/>
+    <p:sldId id="314" r:id="rId15"/>
+    <p:sldId id="300" r:id="rId16"/>
+    <p:sldId id="315" r:id="rId17"/>
+    <p:sldId id="316" r:id="rId18"/>
+    <p:sldId id="304" r:id="rId19"/>
+    <p:sldId id="309" r:id="rId20"/>
+    <p:sldId id="269" r:id="rId21"/>
   </p:sldIdLst>
   <p:sldSz cx="12192000" cy="6858000"/>
   <p:notesSz cx="6858000" cy="9144000"/>
@@ -133,6 +137,2939 @@
 </p:presentation>
 </file>
 
+<file path=ppt/diagrams/colors1.xml><?xml version="1.0" encoding="utf-8"?>
+<dgm:colorsDef xmlns:dgm="http://schemas.openxmlformats.org/drawingml/2006/diagram" xmlns:a="http://schemas.openxmlformats.org/drawingml/2006/main" uniqueId="urn:microsoft.com/office/officeart/2005/8/colors/colorful3">
+  <dgm:title val=""/>
+  <dgm:desc val=""/>
+  <dgm:catLst>
+    <dgm:cat type="colorful" pri="10300"/>
+  </dgm:catLst>
+  <dgm:styleLbl name="node0">
+    <dgm:fillClrLst meth="repeat">
+      <a:schemeClr val="accent2"/>
+    </dgm:fillClrLst>
+    <dgm:linClrLst meth="repeat">
+      <a:schemeClr val="lt1"/>
+    </dgm:linClrLst>
+    <dgm:effectClrLst/>
+    <dgm:txLinClrLst/>
+    <dgm:txFillClrLst/>
+    <dgm:txEffectClrLst/>
+  </dgm:styleLbl>
+  <dgm:styleLbl name="node1">
+    <dgm:fillClrLst>
+      <a:schemeClr val="accent3"/>
+      <a:schemeClr val="accent4"/>
+    </dgm:fillClrLst>
+    <dgm:linClrLst meth="repeat">
+      <a:schemeClr val="lt1"/>
+    </dgm:linClrLst>
+    <dgm:effectClrLst/>
+    <dgm:txLinClrLst/>
+    <dgm:txFillClrLst/>
+    <dgm:txEffectClrLst/>
+  </dgm:styleLbl>
+  <dgm:styleLbl name="alignNode1">
+    <dgm:fillClrLst>
+      <a:schemeClr val="accent3"/>
+      <a:schemeClr val="accent4"/>
+    </dgm:fillClrLst>
+    <dgm:linClrLst>
+      <a:schemeClr val="accent3"/>
+      <a:schemeClr val="accent4"/>
+    </dgm:linClrLst>
+    <dgm:effectClrLst/>
+    <dgm:txLinClrLst/>
+    <dgm:txFillClrLst/>
+    <dgm:txEffectClrLst/>
+  </dgm:styleLbl>
+  <dgm:styleLbl name="lnNode1">
+    <dgm:fillClrLst>
+      <a:schemeClr val="accent3"/>
+      <a:schemeClr val="accent4"/>
+    </dgm:fillClrLst>
+    <dgm:linClrLst meth="repeat">
+      <a:schemeClr val="lt1"/>
+    </dgm:linClrLst>
+    <dgm:effectClrLst/>
+    <dgm:txLinClrLst/>
+    <dgm:txFillClrLst/>
+    <dgm:txEffectClrLst/>
+  </dgm:styleLbl>
+  <dgm:styleLbl name="vennNode1">
+    <dgm:fillClrLst>
+      <a:schemeClr val="accent3">
+        <a:alpha val="50000"/>
+      </a:schemeClr>
+      <a:schemeClr val="accent4">
+        <a:alpha val="50000"/>
+      </a:schemeClr>
+    </dgm:fillClrLst>
+    <dgm:linClrLst meth="repeat">
+      <a:schemeClr val="lt1"/>
+    </dgm:linClrLst>
+    <dgm:effectClrLst/>
+    <dgm:txLinClrLst/>
+    <dgm:txFillClrLst/>
+    <dgm:txEffectClrLst/>
+  </dgm:styleLbl>
+  <dgm:styleLbl name="node2">
+    <dgm:fillClrLst>
+      <a:schemeClr val="accent4"/>
+    </dgm:fillClrLst>
+    <dgm:linClrLst meth="repeat">
+      <a:schemeClr val="lt1"/>
+    </dgm:linClrLst>
+    <dgm:effectClrLst/>
+    <dgm:txLinClrLst/>
+    <dgm:txFillClrLst/>
+    <dgm:txEffectClrLst/>
+  </dgm:styleLbl>
+  <dgm:styleLbl name="node3">
+    <dgm:fillClrLst>
+      <a:schemeClr val="accent5"/>
+    </dgm:fillClrLst>
+    <dgm:linClrLst meth="repeat">
+      <a:schemeClr val="lt1"/>
+    </dgm:linClrLst>
+    <dgm:effectClrLst/>
+    <dgm:txLinClrLst/>
+    <dgm:txFillClrLst/>
+    <dgm:txEffectClrLst/>
+  </dgm:styleLbl>
+  <dgm:styleLbl name="node4">
+    <dgm:fillClrLst>
+      <a:schemeClr val="accent6"/>
+    </dgm:fillClrLst>
+    <dgm:linClrLst meth="repeat">
+      <a:schemeClr val="lt1"/>
+    </dgm:linClrLst>
+    <dgm:effectClrLst/>
+    <dgm:txLinClrLst/>
+    <dgm:txFillClrLst/>
+    <dgm:txEffectClrLst/>
+  </dgm:styleLbl>
+  <dgm:styleLbl name="fgImgPlace1">
+    <dgm:fillClrLst>
+      <a:schemeClr val="accent3">
+        <a:tint val="50000"/>
+      </a:schemeClr>
+      <a:schemeClr val="accent4">
+        <a:tint val="50000"/>
+      </a:schemeClr>
+    </dgm:fillClrLst>
+    <dgm:linClrLst meth="repeat">
+      <a:schemeClr val="lt1"/>
+    </dgm:linClrLst>
+    <dgm:effectClrLst/>
+    <dgm:txLinClrLst/>
+    <dgm:txFillClrLst meth="repeat">
+      <a:schemeClr val="lt1"/>
+    </dgm:txFillClrLst>
+    <dgm:txEffectClrLst/>
+  </dgm:styleLbl>
+  <dgm:styleLbl name="alignImgPlace1">
+    <dgm:fillClrLst>
+      <a:schemeClr val="accent3">
+        <a:tint val="50000"/>
+      </a:schemeClr>
+      <a:schemeClr val="accent4">
+        <a:tint val="20000"/>
+      </a:schemeClr>
+    </dgm:fillClrLst>
+    <dgm:linClrLst meth="repeat">
+      <a:schemeClr val="lt1"/>
+    </dgm:linClrLst>
+    <dgm:effectClrLst/>
+    <dgm:txLinClrLst/>
+    <dgm:txFillClrLst meth="repeat">
+      <a:schemeClr val="lt1"/>
+    </dgm:txFillClrLst>
+    <dgm:txEffectClrLst/>
+  </dgm:styleLbl>
+  <dgm:styleLbl name="bgImgPlace1">
+    <dgm:fillClrLst>
+      <a:schemeClr val="accent3">
+        <a:tint val="50000"/>
+      </a:schemeClr>
+      <a:schemeClr val="accent4">
+        <a:tint val="20000"/>
+      </a:schemeClr>
+    </dgm:fillClrLst>
+    <dgm:linClrLst meth="repeat">
+      <a:schemeClr val="lt1"/>
+    </dgm:linClrLst>
+    <dgm:effectClrLst/>
+    <dgm:txLinClrLst/>
+    <dgm:txFillClrLst meth="repeat">
+      <a:schemeClr val="lt1"/>
+    </dgm:txFillClrLst>
+    <dgm:txEffectClrLst/>
+  </dgm:styleLbl>
+  <dgm:styleLbl name="sibTrans2D1">
+    <dgm:fillClrLst>
+      <a:schemeClr val="accent3"/>
+      <a:schemeClr val="accent4"/>
+    </dgm:fillClrLst>
+    <dgm:linClrLst meth="repeat">
+      <a:schemeClr val="lt1"/>
+    </dgm:linClrLst>
+    <dgm:effectClrLst/>
+    <dgm:txLinClrLst/>
+    <dgm:txFillClrLst/>
+    <dgm:txEffectClrLst/>
+  </dgm:styleLbl>
+  <dgm:styleLbl name="fgSibTrans2D1">
+    <dgm:fillClrLst>
+      <a:schemeClr val="accent3"/>
+      <a:schemeClr val="accent4"/>
+    </dgm:fillClrLst>
+    <dgm:linClrLst meth="repeat">
+      <a:schemeClr val="lt1"/>
+    </dgm:linClrLst>
+    <dgm:effectClrLst/>
+    <dgm:txLinClrLst/>
+    <dgm:txFillClrLst meth="repeat">
+      <a:schemeClr val="lt1"/>
+    </dgm:txFillClrLst>
+    <dgm:txEffectClrLst/>
+  </dgm:styleLbl>
+  <dgm:styleLbl name="bgSibTrans2D1">
+    <dgm:fillClrLst>
+      <a:schemeClr val="accent3"/>
+      <a:schemeClr val="accent4"/>
+    </dgm:fillClrLst>
+    <dgm:linClrLst meth="repeat">
+      <a:schemeClr val="lt1"/>
+    </dgm:linClrLst>
+    <dgm:effectClrLst/>
+    <dgm:txLinClrLst/>
+    <dgm:txFillClrLst meth="repeat">
+      <a:schemeClr val="lt1"/>
+    </dgm:txFillClrLst>
+    <dgm:txEffectClrLst/>
+  </dgm:styleLbl>
+  <dgm:styleLbl name="sibTrans1D1">
+    <dgm:fillClrLst/>
+    <dgm:linClrLst>
+      <a:schemeClr val="accent3"/>
+      <a:schemeClr val="accent4"/>
+    </dgm:linClrLst>
+    <dgm:effectClrLst/>
+    <dgm:txLinClrLst/>
+    <dgm:txFillClrLst meth="repeat">
+      <a:schemeClr val="tx1"/>
+    </dgm:txFillClrLst>
+    <dgm:txEffectClrLst/>
+  </dgm:styleLbl>
+  <dgm:styleLbl name="callout">
+    <dgm:fillClrLst meth="repeat">
+      <a:schemeClr val="accent3"/>
+    </dgm:fillClrLst>
+    <dgm:linClrLst meth="repeat">
+      <a:schemeClr val="accent3">
+        <a:tint val="50000"/>
+      </a:schemeClr>
+    </dgm:linClrLst>
+    <dgm:effectClrLst/>
+    <dgm:txLinClrLst/>
+    <dgm:txFillClrLst meth="repeat">
+      <a:schemeClr val="tx1"/>
+    </dgm:txFillClrLst>
+    <dgm:txEffectClrLst/>
+  </dgm:styleLbl>
+  <dgm:styleLbl name="asst0">
+    <dgm:fillClrLst meth="repeat">
+      <a:schemeClr val="accent3"/>
+    </dgm:fillClrLst>
+    <dgm:linClrLst meth="repeat">
+      <a:schemeClr val="lt1">
+        <a:shade val="80000"/>
+      </a:schemeClr>
+    </dgm:linClrLst>
+    <dgm:effectClrLst/>
+    <dgm:txLinClrLst/>
+    <dgm:txFillClrLst/>
+    <dgm:txEffectClrLst/>
+  </dgm:styleLbl>
+  <dgm:styleLbl name="asst1">
+    <dgm:fillClrLst meth="repeat">
+      <a:schemeClr val="accent4"/>
+    </dgm:fillClrLst>
+    <dgm:linClrLst meth="repeat">
+      <a:schemeClr val="lt1">
+        <a:shade val="80000"/>
+      </a:schemeClr>
+    </dgm:linClrLst>
+    <dgm:effectClrLst/>
+    <dgm:txLinClrLst/>
+    <dgm:txFillClrLst/>
+    <dgm:txEffectClrLst/>
+  </dgm:styleLbl>
+  <dgm:styleLbl name="asst2">
+    <dgm:fillClrLst>
+      <a:schemeClr val="accent5"/>
+    </dgm:fillClrLst>
+    <dgm:linClrLst meth="repeat">
+      <a:schemeClr val="lt1"/>
+    </dgm:linClrLst>
+    <dgm:effectClrLst/>
+    <dgm:txLinClrLst/>
+    <dgm:txFillClrLst/>
+    <dgm:txEffectClrLst/>
+  </dgm:styleLbl>
+  <dgm:styleLbl name="asst3">
+    <dgm:fillClrLst>
+      <a:schemeClr val="accent6"/>
+    </dgm:fillClrLst>
+    <dgm:linClrLst meth="repeat">
+      <a:schemeClr val="lt1"/>
+    </dgm:linClrLst>
+    <dgm:effectClrLst/>
+    <dgm:txLinClrLst/>
+    <dgm:txFillClrLst/>
+    <dgm:txEffectClrLst/>
+  </dgm:styleLbl>
+  <dgm:styleLbl name="asst4">
+    <dgm:fillClrLst>
+      <a:schemeClr val="accent1"/>
+    </dgm:fillClrLst>
+    <dgm:linClrLst meth="repeat">
+      <a:schemeClr val="lt1"/>
+    </dgm:linClrLst>
+    <dgm:effectClrLst/>
+    <dgm:txLinClrLst/>
+    <dgm:txFillClrLst/>
+    <dgm:txEffectClrLst/>
+  </dgm:styleLbl>
+  <dgm:styleLbl name="parChTrans2D1">
+    <dgm:fillClrLst meth="repeat">
+      <a:schemeClr val="accent2"/>
+    </dgm:fillClrLst>
+    <dgm:linClrLst meth="repeat">
+      <a:schemeClr val="lt1"/>
+    </dgm:linClrLst>
+    <dgm:effectClrLst/>
+    <dgm:txLinClrLst/>
+    <dgm:txFillClrLst meth="repeat">
+      <a:schemeClr val="lt1"/>
+    </dgm:txFillClrLst>
+    <dgm:txEffectClrLst/>
+  </dgm:styleLbl>
+  <dgm:styleLbl name="parChTrans2D2">
+    <dgm:fillClrLst meth="repeat">
+      <a:schemeClr val="accent3"/>
+    </dgm:fillClrLst>
+    <dgm:linClrLst meth="repeat">
+      <a:schemeClr val="lt1"/>
+    </dgm:linClrLst>
+    <dgm:effectClrLst/>
+    <dgm:txLinClrLst/>
+    <dgm:txFillClrLst/>
+    <dgm:txEffectClrLst/>
+  </dgm:styleLbl>
+  <dgm:styleLbl name="parChTrans2D3">
+    <dgm:fillClrLst meth="repeat">
+      <a:schemeClr val="accent4"/>
+    </dgm:fillClrLst>
+    <dgm:linClrLst meth="repeat">
+      <a:schemeClr val="lt1"/>
+    </dgm:linClrLst>
+    <dgm:effectClrLst/>
+    <dgm:txLinClrLst/>
+    <dgm:txFillClrLst/>
+    <dgm:txEffectClrLst/>
+  </dgm:styleLbl>
+  <dgm:styleLbl name="parChTrans2D4">
+    <dgm:fillClrLst meth="repeat">
+      <a:schemeClr val="accent5"/>
+    </dgm:fillClrLst>
+    <dgm:linClrLst meth="repeat">
+      <a:schemeClr val="lt1"/>
+    </dgm:linClrLst>
+    <dgm:effectClrLst/>
+    <dgm:txLinClrLst/>
+    <dgm:txFillClrLst meth="repeat">
+      <a:schemeClr val="lt1"/>
+    </dgm:txFillClrLst>
+    <dgm:txEffectClrLst/>
+  </dgm:styleLbl>
+  <dgm:styleLbl name="parChTrans1D1">
+    <dgm:fillClrLst meth="repeat">
+      <a:schemeClr val="accent3"/>
+    </dgm:fillClrLst>
+    <dgm:linClrLst meth="repeat">
+      <a:schemeClr val="accent3"/>
+    </dgm:linClrLst>
+    <dgm:effectClrLst/>
+    <dgm:txLinClrLst/>
+    <dgm:txFillClrLst meth="repeat">
+      <a:schemeClr val="tx1"/>
+    </dgm:txFillClrLst>
+    <dgm:txEffectClrLst/>
+  </dgm:styleLbl>
+  <dgm:styleLbl name="parChTrans1D2">
+    <dgm:fillClrLst meth="repeat">
+      <a:schemeClr val="accent2">
+        <a:tint val="90000"/>
+      </a:schemeClr>
+    </dgm:fillClrLst>
+    <dgm:linClrLst meth="repeat">
+      <a:schemeClr val="accent4"/>
+    </dgm:linClrLst>
+    <dgm:effectClrLst/>
+    <dgm:txLinClrLst/>
+    <dgm:txFillClrLst meth="repeat">
+      <a:schemeClr val="tx1"/>
+    </dgm:txFillClrLst>
+    <dgm:txEffectClrLst/>
+  </dgm:styleLbl>
+  <dgm:styleLbl name="parChTrans1D3">
+    <dgm:fillClrLst meth="repeat">
+      <a:schemeClr val="accent2">
+        <a:tint val="70000"/>
+      </a:schemeClr>
+    </dgm:fillClrLst>
+    <dgm:linClrLst meth="repeat">
+      <a:schemeClr val="accent5"/>
+    </dgm:linClrLst>
+    <dgm:effectClrLst/>
+    <dgm:txLinClrLst/>
+    <dgm:txFillClrLst meth="repeat">
+      <a:schemeClr val="tx1"/>
+    </dgm:txFillClrLst>
+    <dgm:txEffectClrLst/>
+  </dgm:styleLbl>
+  <dgm:styleLbl name="parChTrans1D4">
+    <dgm:fillClrLst meth="repeat">
+      <a:schemeClr val="accent6">
+        <a:tint val="50000"/>
+      </a:schemeClr>
+    </dgm:fillClrLst>
+    <dgm:linClrLst meth="repeat">
+      <a:schemeClr val="accent6"/>
+    </dgm:linClrLst>
+    <dgm:effectClrLst/>
+    <dgm:txLinClrLst/>
+    <dgm:txFillClrLst meth="repeat">
+      <a:schemeClr val="tx1"/>
+    </dgm:txFillClrLst>
+    <dgm:txEffectClrLst/>
+  </dgm:styleLbl>
+  <dgm:styleLbl name="fgAcc1">
+    <dgm:fillClrLst meth="repeat">
+      <a:schemeClr val="lt1">
+        <a:alpha val="90000"/>
+      </a:schemeClr>
+    </dgm:fillClrLst>
+    <dgm:linClrLst>
+      <a:schemeClr val="accent3"/>
+      <a:schemeClr val="accent4"/>
+    </dgm:linClrLst>
+    <dgm:effectClrLst/>
+    <dgm:txLinClrLst/>
+    <dgm:txFillClrLst meth="repeat">
+      <a:schemeClr val="dk1"/>
+    </dgm:txFillClrLst>
+    <dgm:txEffectClrLst/>
+  </dgm:styleLbl>
+  <dgm:styleLbl name="conFgAcc1">
+    <dgm:fillClrLst meth="repeat">
+      <a:schemeClr val="lt1">
+        <a:alpha val="90000"/>
+      </a:schemeClr>
+    </dgm:fillClrLst>
+    <dgm:linClrLst>
+      <a:schemeClr val="accent3"/>
+      <a:schemeClr val="accent4"/>
+    </dgm:linClrLst>
+    <dgm:effectClrLst/>
+    <dgm:txLinClrLst/>
+    <dgm:txFillClrLst meth="repeat">
+      <a:schemeClr val="dk1"/>
+    </dgm:txFillClrLst>
+    <dgm:txEffectClrLst/>
+  </dgm:styleLbl>
+  <dgm:styleLbl name="alignAcc1">
+    <dgm:fillClrLst meth="repeat">
+      <a:schemeClr val="lt1">
+        <a:alpha val="90000"/>
+      </a:schemeClr>
+    </dgm:fillClrLst>
+    <dgm:linClrLst>
+      <a:schemeClr val="accent3"/>
+      <a:schemeClr val="accent4"/>
+    </dgm:linClrLst>
+    <dgm:effectClrLst/>
+    <dgm:txLinClrLst/>
+    <dgm:txFillClrLst meth="repeat">
+      <a:schemeClr val="dk1"/>
+    </dgm:txFillClrLst>
+    <dgm:txEffectClrLst/>
+  </dgm:styleLbl>
+  <dgm:styleLbl name="trAlignAcc1">
+    <dgm:fillClrLst meth="repeat">
+      <a:schemeClr val="lt1">
+        <a:alpha val="40000"/>
+      </a:schemeClr>
+    </dgm:fillClrLst>
+    <dgm:linClrLst meth="repeat">
+      <a:schemeClr val="accent2"/>
+    </dgm:linClrLst>
+    <dgm:effectClrLst/>
+    <dgm:txLinClrLst/>
+    <dgm:txFillClrLst meth="repeat">
+      <a:schemeClr val="dk1"/>
+    </dgm:txFillClrLst>
+    <dgm:txEffectClrLst/>
+  </dgm:styleLbl>
+  <dgm:styleLbl name="bgAcc1">
+    <dgm:fillClrLst meth="repeat">
+      <a:schemeClr val="lt1">
+        <a:alpha val="90000"/>
+      </a:schemeClr>
+    </dgm:fillClrLst>
+    <dgm:linClrLst>
+      <a:schemeClr val="accent3"/>
+      <a:schemeClr val="accent4"/>
+    </dgm:linClrLst>
+    <dgm:effectClrLst/>
+    <dgm:txLinClrLst/>
+    <dgm:txFillClrLst meth="repeat">
+      <a:schemeClr val="dk1"/>
+    </dgm:txFillClrLst>
+    <dgm:txEffectClrLst/>
+  </dgm:styleLbl>
+  <dgm:styleLbl name="solidFgAcc1">
+    <dgm:fillClrLst meth="repeat">
+      <a:schemeClr val="lt1"/>
+    </dgm:fillClrLst>
+    <dgm:linClrLst>
+      <a:schemeClr val="accent3"/>
+      <a:schemeClr val="accent4"/>
+    </dgm:linClrLst>
+    <dgm:effectClrLst/>
+    <dgm:txLinClrLst/>
+    <dgm:txFillClrLst meth="repeat">
+      <a:schemeClr val="dk1"/>
+    </dgm:txFillClrLst>
+    <dgm:txEffectClrLst/>
+  </dgm:styleLbl>
+  <dgm:styleLbl name="solidAlignAcc1">
+    <dgm:fillClrLst meth="repeat">
+      <a:schemeClr val="lt1"/>
+    </dgm:fillClrLst>
+    <dgm:linClrLst>
+      <a:schemeClr val="accent3"/>
+      <a:schemeClr val="accent4"/>
+    </dgm:linClrLst>
+    <dgm:effectClrLst/>
+    <dgm:txLinClrLst/>
+    <dgm:txFillClrLst meth="repeat">
+      <a:schemeClr val="dk1"/>
+    </dgm:txFillClrLst>
+    <dgm:txEffectClrLst/>
+  </dgm:styleLbl>
+  <dgm:styleLbl name="solidBgAcc1">
+    <dgm:fillClrLst meth="repeat">
+      <a:schemeClr val="lt1"/>
+    </dgm:fillClrLst>
+    <dgm:linClrLst>
+      <a:schemeClr val="accent3"/>
+      <a:schemeClr val="accent4"/>
+    </dgm:linClrLst>
+    <dgm:effectClrLst/>
+    <dgm:txLinClrLst/>
+    <dgm:txFillClrLst meth="repeat">
+      <a:schemeClr val="dk1"/>
+    </dgm:txFillClrLst>
+    <dgm:txEffectClrLst/>
+  </dgm:styleLbl>
+  <dgm:styleLbl name="fgAccFollowNode1">
+    <dgm:fillClrLst>
+      <a:schemeClr val="accent3">
+        <a:tint val="40000"/>
+        <a:alpha val="90000"/>
+      </a:schemeClr>
+      <a:schemeClr val="accent4">
+        <a:tint val="40000"/>
+        <a:alpha val="90000"/>
+      </a:schemeClr>
+    </dgm:fillClrLst>
+    <dgm:linClrLst>
+      <a:schemeClr val="accent3">
+        <a:tint val="40000"/>
+        <a:alpha val="90000"/>
+      </a:schemeClr>
+      <a:schemeClr val="accent4">
+        <a:tint val="40000"/>
+        <a:alpha val="90000"/>
+      </a:schemeClr>
+    </dgm:linClrLst>
+    <dgm:effectClrLst/>
+    <dgm:txLinClrLst/>
+    <dgm:txFillClrLst meth="repeat">
+      <a:schemeClr val="dk1"/>
+    </dgm:txFillClrLst>
+    <dgm:txEffectClrLst/>
+  </dgm:styleLbl>
+  <dgm:styleLbl name="alignAccFollowNode1">
+    <dgm:fillClrLst>
+      <a:schemeClr val="accent3">
+        <a:tint val="40000"/>
+        <a:alpha val="90000"/>
+      </a:schemeClr>
+      <a:schemeClr val="accent4">
+        <a:tint val="40000"/>
+        <a:alpha val="90000"/>
+      </a:schemeClr>
+    </dgm:fillClrLst>
+    <dgm:linClrLst>
+      <a:schemeClr val="accent3">
+        <a:tint val="40000"/>
+        <a:alpha val="90000"/>
+      </a:schemeClr>
+      <a:schemeClr val="accent4">
+        <a:tint val="40000"/>
+        <a:alpha val="90000"/>
+      </a:schemeClr>
+    </dgm:linClrLst>
+    <dgm:effectClrLst/>
+    <dgm:txLinClrLst/>
+    <dgm:txFillClrLst meth="repeat">
+      <a:schemeClr val="dk1"/>
+    </dgm:txFillClrLst>
+    <dgm:txEffectClrLst/>
+  </dgm:styleLbl>
+  <dgm:styleLbl name="bgAccFollowNode1">
+    <dgm:fillClrLst>
+      <a:schemeClr val="accent3">
+        <a:tint val="40000"/>
+        <a:alpha val="90000"/>
+      </a:schemeClr>
+      <a:schemeClr val="accent4">
+        <a:tint val="40000"/>
+        <a:alpha val="90000"/>
+      </a:schemeClr>
+    </dgm:fillClrLst>
+    <dgm:linClrLst>
+      <a:schemeClr val="accent3">
+        <a:tint val="40000"/>
+        <a:alpha val="90000"/>
+      </a:schemeClr>
+      <a:schemeClr val="accent4">
+        <a:tint val="40000"/>
+        <a:alpha val="90000"/>
+      </a:schemeClr>
+    </dgm:linClrLst>
+    <dgm:effectClrLst/>
+    <dgm:txLinClrLst/>
+    <dgm:txFillClrLst meth="repeat">
+      <a:schemeClr val="dk1"/>
+    </dgm:txFillClrLst>
+    <dgm:txEffectClrLst/>
+  </dgm:styleLbl>
+  <dgm:styleLbl name="fgAcc0">
+    <dgm:fillClrLst meth="repeat">
+      <a:schemeClr val="lt1">
+        <a:alpha val="90000"/>
+      </a:schemeClr>
+    </dgm:fillClrLst>
+    <dgm:linClrLst>
+      <a:schemeClr val="accent2"/>
+    </dgm:linClrLst>
+    <dgm:effectClrLst/>
+    <dgm:txLinClrLst/>
+    <dgm:txFillClrLst meth="repeat">
+      <a:schemeClr val="dk1"/>
+    </dgm:txFillClrLst>
+    <dgm:txEffectClrLst/>
+  </dgm:styleLbl>
+  <dgm:styleLbl name="fgAcc2">
+    <dgm:fillClrLst meth="repeat">
+      <a:schemeClr val="lt1">
+        <a:alpha val="90000"/>
+      </a:schemeClr>
+    </dgm:fillClrLst>
+    <dgm:linClrLst>
+      <a:schemeClr val="accent4"/>
+    </dgm:linClrLst>
+    <dgm:effectClrLst/>
+    <dgm:txLinClrLst/>
+    <dgm:txFillClrLst meth="repeat">
+      <a:schemeClr val="dk1"/>
+    </dgm:txFillClrLst>
+    <dgm:txEffectClrLst/>
+  </dgm:styleLbl>
+  <dgm:styleLbl name="fgAcc3">
+    <dgm:fillClrLst meth="repeat">
+      <a:schemeClr val="lt1">
+        <a:alpha val="90000"/>
+      </a:schemeClr>
+    </dgm:fillClrLst>
+    <dgm:linClrLst>
+      <a:schemeClr val="accent5"/>
+    </dgm:linClrLst>
+    <dgm:effectClrLst/>
+    <dgm:txLinClrLst/>
+    <dgm:txFillClrLst meth="repeat">
+      <a:schemeClr val="dk1"/>
+    </dgm:txFillClrLst>
+    <dgm:txEffectClrLst/>
+  </dgm:styleLbl>
+  <dgm:styleLbl name="fgAcc4">
+    <dgm:fillClrLst meth="repeat">
+      <a:schemeClr val="lt1">
+        <a:alpha val="90000"/>
+      </a:schemeClr>
+    </dgm:fillClrLst>
+    <dgm:linClrLst>
+      <a:schemeClr val="accent6"/>
+    </dgm:linClrLst>
+    <dgm:effectClrLst/>
+    <dgm:txLinClrLst/>
+    <dgm:txFillClrLst meth="repeat">
+      <a:schemeClr val="dk1"/>
+    </dgm:txFillClrLst>
+    <dgm:txEffectClrLst/>
+  </dgm:styleLbl>
+  <dgm:styleLbl name="bgShp">
+    <dgm:fillClrLst meth="repeat">
+      <a:schemeClr val="accent3">
+        <a:tint val="40000"/>
+      </a:schemeClr>
+    </dgm:fillClrLst>
+    <dgm:linClrLst meth="repeat">
+      <a:schemeClr val="dk1"/>
+    </dgm:linClrLst>
+    <dgm:effectClrLst/>
+    <dgm:txLinClrLst/>
+    <dgm:txFillClrLst meth="repeat">
+      <a:schemeClr val="dk1"/>
+    </dgm:txFillClrLst>
+    <dgm:txEffectClrLst/>
+  </dgm:styleLbl>
+  <dgm:styleLbl name="dkBgShp">
+    <dgm:fillClrLst meth="repeat">
+      <a:schemeClr val="accent3">
+        <a:shade val="90000"/>
+      </a:schemeClr>
+    </dgm:fillClrLst>
+    <dgm:linClrLst meth="repeat">
+      <a:schemeClr val="dk1"/>
+    </dgm:linClrLst>
+    <dgm:effectClrLst/>
+    <dgm:txLinClrLst/>
+    <dgm:txFillClrLst meth="repeat">
+      <a:schemeClr val="lt1"/>
+    </dgm:txFillClrLst>
+    <dgm:txEffectClrLst/>
+  </dgm:styleLbl>
+  <dgm:styleLbl name="trBgShp">
+    <dgm:fillClrLst meth="repeat">
+      <a:schemeClr val="accent2">
+        <a:tint val="50000"/>
+        <a:alpha val="40000"/>
+      </a:schemeClr>
+    </dgm:fillClrLst>
+    <dgm:linClrLst meth="repeat">
+      <a:schemeClr val="accent3"/>
+    </dgm:linClrLst>
+    <dgm:effectClrLst/>
+    <dgm:txLinClrLst/>
+    <dgm:txFillClrLst meth="repeat">
+      <a:schemeClr val="lt1"/>
+    </dgm:txFillClrLst>
+    <dgm:txEffectClrLst/>
+  </dgm:styleLbl>
+  <dgm:styleLbl name="fgShp">
+    <dgm:fillClrLst meth="repeat">
+      <a:schemeClr val="accent3">
+        <a:tint val="40000"/>
+      </a:schemeClr>
+    </dgm:fillClrLst>
+    <dgm:linClrLst meth="repeat">
+      <a:schemeClr val="lt1"/>
+    </dgm:linClrLst>
+    <dgm:effectClrLst/>
+    <dgm:txLinClrLst/>
+    <dgm:txFillClrLst meth="repeat">
+      <a:schemeClr val="dk1"/>
+    </dgm:txFillClrLst>
+    <dgm:txEffectClrLst/>
+  </dgm:styleLbl>
+  <dgm:styleLbl name="revTx">
+    <dgm:fillClrLst meth="repeat">
+      <a:schemeClr val="lt1">
+        <a:alpha val="0"/>
+      </a:schemeClr>
+    </dgm:fillClrLst>
+    <dgm:linClrLst meth="repeat">
+      <a:schemeClr val="dk1">
+        <a:alpha val="0"/>
+      </a:schemeClr>
+    </dgm:linClrLst>
+    <dgm:effectClrLst/>
+    <dgm:txLinClrLst/>
+    <dgm:txFillClrLst meth="repeat">
+      <a:schemeClr val="tx1"/>
+    </dgm:txFillClrLst>
+    <dgm:txEffectClrLst/>
+  </dgm:styleLbl>
+</dgm:colorsDef>
+</file>
+
+<file path=ppt/diagrams/data1.xml><?xml version="1.0" encoding="utf-8"?>
+<dgm:dataModel xmlns:dgm="http://schemas.openxmlformats.org/drawingml/2006/diagram" xmlns:a="http://schemas.openxmlformats.org/drawingml/2006/main">
+  <dgm:ptLst>
+    <dgm:pt modelId="{CB31AFBE-DAEA-44D5-8415-BC73F58EFA77}" type="doc">
+      <dgm:prSet loTypeId="urn:microsoft.com/office/officeart/2005/8/layout/chevron2" loCatId="process" qsTypeId="urn:microsoft.com/office/officeart/2005/8/quickstyle/simple1" qsCatId="simple" csTypeId="urn:microsoft.com/office/officeart/2005/8/colors/colorful3" csCatId="colorful" phldr="1"/>
+      <dgm:spPr/>
+      <dgm:t>
+        <a:bodyPr/>
+        <a:lstStyle/>
+        <a:p>
+          <a:endParaRPr lang="en-US"/>
+        </a:p>
+      </dgm:t>
+    </dgm:pt>
+    <dgm:pt modelId="{72C84063-AED8-4516-A41E-E9BA8105F8E0}">
+      <dgm:prSet phldrT="[Text]"/>
+      <dgm:spPr/>
+      <dgm:t>
+        <a:bodyPr/>
+        <a:lstStyle/>
+        <a:p>
+          <a:r>
+            <a:rPr lang="en-US" dirty="0" smtClean="0"/>
+            <a:t>v1</a:t>
+          </a:r>
+          <a:endParaRPr lang="en-US" dirty="0"/>
+        </a:p>
+      </dgm:t>
+    </dgm:pt>
+    <dgm:pt modelId="{8778F2AB-B655-4817-A0FA-13313E2B11F6}" type="parTrans" cxnId="{10C96502-9343-42B3-827E-F0F98F88DF63}">
+      <dgm:prSet/>
+      <dgm:spPr/>
+      <dgm:t>
+        <a:bodyPr/>
+        <a:lstStyle/>
+        <a:p>
+          <a:endParaRPr lang="en-US"/>
+        </a:p>
+      </dgm:t>
+    </dgm:pt>
+    <dgm:pt modelId="{25FB5F2D-6BE7-4F33-A184-61770FAC2072}" type="sibTrans" cxnId="{10C96502-9343-42B3-827E-F0F98F88DF63}">
+      <dgm:prSet/>
+      <dgm:spPr/>
+      <dgm:t>
+        <a:bodyPr/>
+        <a:lstStyle/>
+        <a:p>
+          <a:endParaRPr lang="en-US"/>
+        </a:p>
+      </dgm:t>
+    </dgm:pt>
+    <dgm:pt modelId="{49DE29FD-06D9-462D-9CE6-8FFF9CF17177}">
+      <dgm:prSet phldrT="[Text]"/>
+      <dgm:spPr/>
+      <dgm:t>
+        <a:bodyPr/>
+        <a:lstStyle/>
+        <a:p>
+          <a:r>
+            <a:rPr lang="en-US" dirty="0" smtClean="0"/>
+            <a:t>You thought there would only be three types of dates</a:t>
+          </a:r>
+          <a:endParaRPr lang="en-US" dirty="0"/>
+        </a:p>
+      </dgm:t>
+    </dgm:pt>
+    <dgm:pt modelId="{284702D0-C566-4C67-9A52-8DEBBB05C0C2}" type="parTrans" cxnId="{564E4A6D-5861-49EE-958D-8EBC0F233397}">
+      <dgm:prSet/>
+      <dgm:spPr/>
+      <dgm:t>
+        <a:bodyPr/>
+        <a:lstStyle/>
+        <a:p>
+          <a:endParaRPr lang="en-US"/>
+        </a:p>
+      </dgm:t>
+    </dgm:pt>
+    <dgm:pt modelId="{A61F681B-9CC5-4335-985F-49C1CB5621B6}" type="sibTrans" cxnId="{564E4A6D-5861-49EE-958D-8EBC0F233397}">
+      <dgm:prSet/>
+      <dgm:spPr/>
+      <dgm:t>
+        <a:bodyPr/>
+        <a:lstStyle/>
+        <a:p>
+          <a:endParaRPr lang="en-US"/>
+        </a:p>
+      </dgm:t>
+    </dgm:pt>
+    <dgm:pt modelId="{83C22955-F503-4B08-B1B1-0767DF47FC63}">
+      <dgm:prSet phldrT="[Text]"/>
+      <dgm:spPr/>
+      <dgm:t>
+        <a:bodyPr/>
+        <a:lstStyle/>
+        <a:p>
+          <a:r>
+            <a:rPr lang="en-US" dirty="0" smtClean="0"/>
+            <a:t>So you returned a single object </a:t>
+          </a:r>
+          <a:endParaRPr lang="en-US" dirty="0"/>
+        </a:p>
+      </dgm:t>
+    </dgm:pt>
+    <dgm:pt modelId="{9B075334-32AE-457A-8357-A77AE0DB2E97}" type="parTrans" cxnId="{F0BCD62D-75DF-4400-9F94-7C50AA410FFE}">
+      <dgm:prSet/>
+      <dgm:spPr/>
+      <dgm:t>
+        <a:bodyPr/>
+        <a:lstStyle/>
+        <a:p>
+          <a:endParaRPr lang="en-US"/>
+        </a:p>
+      </dgm:t>
+    </dgm:pt>
+    <dgm:pt modelId="{207A4BBA-C58A-4720-805E-A2157F015FCC}" type="sibTrans" cxnId="{F0BCD62D-75DF-4400-9F94-7C50AA410FFE}">
+      <dgm:prSet/>
+      <dgm:spPr/>
+      <dgm:t>
+        <a:bodyPr/>
+        <a:lstStyle/>
+        <a:p>
+          <a:endParaRPr lang="en-US"/>
+        </a:p>
+      </dgm:t>
+    </dgm:pt>
+    <dgm:pt modelId="{6E3AC7C8-84D4-4345-9DC4-4670CF41915F}">
+      <dgm:prSet phldrT="[Text]"/>
+      <dgm:spPr/>
+      <dgm:t>
+        <a:bodyPr/>
+        <a:lstStyle/>
+        <a:p>
+          <a:r>
+            <a:rPr lang="en-US" dirty="0" smtClean="0"/>
+            <a:t>v2</a:t>
+          </a:r>
+          <a:endParaRPr lang="en-US" dirty="0"/>
+        </a:p>
+      </dgm:t>
+    </dgm:pt>
+    <dgm:pt modelId="{AFE49948-7CB5-4A4F-995A-8DC9489B91AE}" type="parTrans" cxnId="{6FCB299F-A92E-45D1-B219-1CD8F43438E7}">
+      <dgm:prSet/>
+      <dgm:spPr/>
+      <dgm:t>
+        <a:bodyPr/>
+        <a:lstStyle/>
+        <a:p>
+          <a:endParaRPr lang="en-US"/>
+        </a:p>
+      </dgm:t>
+    </dgm:pt>
+    <dgm:pt modelId="{B1503AE5-DE76-4B69-8549-6D13AE2AF633}" type="sibTrans" cxnId="{6FCB299F-A92E-45D1-B219-1CD8F43438E7}">
+      <dgm:prSet/>
+      <dgm:spPr/>
+      <dgm:t>
+        <a:bodyPr/>
+        <a:lstStyle/>
+        <a:p>
+          <a:endParaRPr lang="en-US"/>
+        </a:p>
+      </dgm:t>
+    </dgm:pt>
+    <dgm:pt modelId="{89DE63EF-B3C8-458D-B915-09BFE576A34F}">
+      <dgm:prSet phldrT="[Text]"/>
+      <dgm:spPr/>
+      <dgm:t>
+        <a:bodyPr/>
+        <a:lstStyle/>
+        <a:p>
+          <a:r>
+            <a:rPr lang="en-US" dirty="0" smtClean="0"/>
+            <a:t>Things change (surprise!) and now you may have 1..n dates </a:t>
+          </a:r>
+          <a:endParaRPr lang="en-US" dirty="0"/>
+        </a:p>
+      </dgm:t>
+    </dgm:pt>
+    <dgm:pt modelId="{CF1D9192-744B-40CC-9BCE-E324E91D910A}" type="parTrans" cxnId="{7FF154F7-7BDA-464B-882A-5C30C0DCAFCA}">
+      <dgm:prSet/>
+      <dgm:spPr/>
+      <dgm:t>
+        <a:bodyPr/>
+        <a:lstStyle/>
+        <a:p>
+          <a:endParaRPr lang="en-US"/>
+        </a:p>
+      </dgm:t>
+    </dgm:pt>
+    <dgm:pt modelId="{9F8B87B9-8933-4E91-AB66-BB8BB1AD608D}" type="sibTrans" cxnId="{7FF154F7-7BDA-464B-882A-5C30C0DCAFCA}">
+      <dgm:prSet/>
+      <dgm:spPr/>
+      <dgm:t>
+        <a:bodyPr/>
+        <a:lstStyle/>
+        <a:p>
+          <a:endParaRPr lang="en-US"/>
+        </a:p>
+      </dgm:t>
+    </dgm:pt>
+    <dgm:pt modelId="{685E302A-37A3-4F69-8822-B10C05F7AAC7}">
+      <dgm:prSet phldrT="[Text]"/>
+      <dgm:spPr/>
+      <dgm:t>
+        <a:bodyPr/>
+        <a:lstStyle/>
+        <a:p>
+          <a:r>
+            <a:rPr lang="en-US" dirty="0" smtClean="0"/>
+            <a:t>{id, type, date}</a:t>
+          </a:r>
+          <a:endParaRPr lang="en-US" dirty="0"/>
+        </a:p>
+      </dgm:t>
+    </dgm:pt>
+    <dgm:pt modelId="{38F0F377-8DCB-4647-B9A7-094A0533C435}" type="parTrans" cxnId="{7ABB59F4-7ADF-4F03-91AD-B69416681851}">
+      <dgm:prSet/>
+      <dgm:spPr/>
+      <dgm:t>
+        <a:bodyPr/>
+        <a:lstStyle/>
+        <a:p>
+          <a:endParaRPr lang="en-US"/>
+        </a:p>
+      </dgm:t>
+    </dgm:pt>
+    <dgm:pt modelId="{4CAF93E1-4506-4895-B3E0-A63EFC1350E3}" type="sibTrans" cxnId="{7ABB59F4-7ADF-4F03-91AD-B69416681851}">
+      <dgm:prSet/>
+      <dgm:spPr/>
+      <dgm:t>
+        <a:bodyPr/>
+        <a:lstStyle/>
+        <a:p>
+          <a:endParaRPr lang="en-US"/>
+        </a:p>
+      </dgm:t>
+    </dgm:pt>
+    <dgm:pt modelId="{1BF9C2CD-BB22-4632-BE55-59449C52EDAB}">
+      <dgm:prSet phldrT="[Text]"/>
+      <dgm:spPr/>
+      <dgm:t>
+        <a:bodyPr/>
+        <a:lstStyle/>
+        <a:p>
+          <a:r>
+            <a:rPr lang="en-US" dirty="0" smtClean="0"/>
+            <a:t>{ id, </a:t>
+          </a:r>
+          <a:r>
+            <a:rPr lang="en-US" dirty="0" err="1" smtClean="0"/>
+            <a:t>fooDate</a:t>
+          </a:r>
+          <a:r>
+            <a:rPr lang="en-US" dirty="0" smtClean="0"/>
+            <a:t>, </a:t>
+          </a:r>
+          <a:r>
+            <a:rPr lang="en-US" dirty="0" err="1" smtClean="0"/>
+            <a:t>barDate</a:t>
+          </a:r>
+          <a:r>
+            <a:rPr lang="en-US" dirty="0" smtClean="0"/>
+            <a:t>, </a:t>
+          </a:r>
+          <a:r>
+            <a:rPr lang="en-US" dirty="0" err="1" smtClean="0"/>
+            <a:t>widgetDate</a:t>
+          </a:r>
+          <a:r>
+            <a:rPr lang="en-US" dirty="0" smtClean="0"/>
+            <a:t> }</a:t>
+          </a:r>
+          <a:endParaRPr lang="en-US" dirty="0"/>
+        </a:p>
+      </dgm:t>
+    </dgm:pt>
+    <dgm:pt modelId="{A6C499AD-4A33-4425-8622-F827F4D9DDAE}" type="parTrans" cxnId="{622BC44A-4F29-44CB-B56F-7547A933BE37}">
+      <dgm:prSet/>
+      <dgm:spPr/>
+      <dgm:t>
+        <a:bodyPr/>
+        <a:lstStyle/>
+        <a:p>
+          <a:endParaRPr lang="en-US"/>
+        </a:p>
+      </dgm:t>
+    </dgm:pt>
+    <dgm:pt modelId="{2E391214-7221-421A-89D0-8F3F671A512D}" type="sibTrans" cxnId="{622BC44A-4F29-44CB-B56F-7547A933BE37}">
+      <dgm:prSet/>
+      <dgm:spPr/>
+      <dgm:t>
+        <a:bodyPr/>
+        <a:lstStyle/>
+        <a:p>
+          <a:endParaRPr lang="en-US"/>
+        </a:p>
+      </dgm:t>
+    </dgm:pt>
+    <dgm:pt modelId="{6304A6C3-0030-488C-9EB8-9523AC3FA439}">
+      <dgm:prSet phldrT="[Text]"/>
+      <dgm:spPr/>
+      <dgm:t>
+        <a:bodyPr/>
+        <a:lstStyle/>
+        <a:p>
+          <a:r>
+            <a:rPr lang="en-US" dirty="0" smtClean="0"/>
+            <a:t>So you return a set of rows instead with a date type</a:t>
+          </a:r>
+          <a:endParaRPr lang="en-US" dirty="0"/>
+        </a:p>
+      </dgm:t>
+    </dgm:pt>
+    <dgm:pt modelId="{EF85B223-4BD8-4EC0-B241-2E797A5C44D3}" type="parTrans" cxnId="{3F64204A-D17F-4C69-B3BF-577354AD226E}">
+      <dgm:prSet/>
+      <dgm:spPr/>
+      <dgm:t>
+        <a:bodyPr/>
+        <a:lstStyle/>
+        <a:p>
+          <a:endParaRPr lang="en-US"/>
+        </a:p>
+      </dgm:t>
+    </dgm:pt>
+    <dgm:pt modelId="{A793C610-6378-4B2D-AEA1-9870826A8165}" type="sibTrans" cxnId="{3F64204A-D17F-4C69-B3BF-577354AD226E}">
+      <dgm:prSet/>
+      <dgm:spPr/>
+      <dgm:t>
+        <a:bodyPr/>
+        <a:lstStyle/>
+        <a:p>
+          <a:endParaRPr lang="en-US"/>
+        </a:p>
+      </dgm:t>
+    </dgm:pt>
+    <dgm:pt modelId="{60BCFE6E-9155-4C21-A26A-328931E3A519}" type="pres">
+      <dgm:prSet presAssocID="{CB31AFBE-DAEA-44D5-8415-BC73F58EFA77}" presName="linearFlow" presStyleCnt="0">
+        <dgm:presLayoutVars>
+          <dgm:dir/>
+          <dgm:animLvl val="lvl"/>
+          <dgm:resizeHandles val="exact"/>
+        </dgm:presLayoutVars>
+      </dgm:prSet>
+      <dgm:spPr/>
+    </dgm:pt>
+    <dgm:pt modelId="{847E7D6A-EE97-42E1-B39D-9807D90F4CCF}" type="pres">
+      <dgm:prSet presAssocID="{72C84063-AED8-4516-A41E-E9BA8105F8E0}" presName="composite" presStyleCnt="0"/>
+      <dgm:spPr/>
+    </dgm:pt>
+    <dgm:pt modelId="{F86DCCC1-BE8C-451F-8334-66E626EBC338}" type="pres">
+      <dgm:prSet presAssocID="{72C84063-AED8-4516-A41E-E9BA8105F8E0}" presName="parentText" presStyleLbl="alignNode1" presStyleIdx="0" presStyleCnt="2">
+        <dgm:presLayoutVars>
+          <dgm:chMax val="1"/>
+          <dgm:bulletEnabled val="1"/>
+        </dgm:presLayoutVars>
+      </dgm:prSet>
+      <dgm:spPr/>
+    </dgm:pt>
+    <dgm:pt modelId="{12A6C3CC-A67A-4A87-8F08-82220699C3B6}" type="pres">
+      <dgm:prSet presAssocID="{72C84063-AED8-4516-A41E-E9BA8105F8E0}" presName="descendantText" presStyleLbl="alignAcc1" presStyleIdx="0" presStyleCnt="2">
+        <dgm:presLayoutVars>
+          <dgm:bulletEnabled val="1"/>
+        </dgm:presLayoutVars>
+      </dgm:prSet>
+      <dgm:spPr/>
+      <dgm:t>
+        <a:bodyPr/>
+        <a:lstStyle/>
+        <a:p>
+          <a:endParaRPr lang="en-US"/>
+        </a:p>
+      </dgm:t>
+    </dgm:pt>
+    <dgm:pt modelId="{0EB69E59-DAC5-4598-8747-400CA4D8A19F}" type="pres">
+      <dgm:prSet presAssocID="{25FB5F2D-6BE7-4F33-A184-61770FAC2072}" presName="sp" presStyleCnt="0"/>
+      <dgm:spPr/>
+    </dgm:pt>
+    <dgm:pt modelId="{82CC6A56-7E2D-4BC2-AD46-97E9011DC3CF}" type="pres">
+      <dgm:prSet presAssocID="{6E3AC7C8-84D4-4345-9DC4-4670CF41915F}" presName="composite" presStyleCnt="0"/>
+      <dgm:spPr/>
+    </dgm:pt>
+    <dgm:pt modelId="{14F6DA88-C20D-4C32-A1B0-9E851A6032FD}" type="pres">
+      <dgm:prSet presAssocID="{6E3AC7C8-84D4-4345-9DC4-4670CF41915F}" presName="parentText" presStyleLbl="alignNode1" presStyleIdx="1" presStyleCnt="2">
+        <dgm:presLayoutVars>
+          <dgm:chMax val="1"/>
+          <dgm:bulletEnabled val="1"/>
+        </dgm:presLayoutVars>
+      </dgm:prSet>
+      <dgm:spPr/>
+    </dgm:pt>
+    <dgm:pt modelId="{8844029F-54BA-4378-83D4-32B76F91C629}" type="pres">
+      <dgm:prSet presAssocID="{6E3AC7C8-84D4-4345-9DC4-4670CF41915F}" presName="descendantText" presStyleLbl="alignAcc1" presStyleIdx="1" presStyleCnt="2">
+        <dgm:presLayoutVars>
+          <dgm:bulletEnabled val="1"/>
+        </dgm:presLayoutVars>
+      </dgm:prSet>
+      <dgm:spPr/>
+      <dgm:t>
+        <a:bodyPr/>
+        <a:lstStyle/>
+        <a:p>
+          <a:endParaRPr lang="en-US"/>
+        </a:p>
+      </dgm:t>
+    </dgm:pt>
+  </dgm:ptLst>
+  <dgm:cxnLst>
+    <dgm:cxn modelId="{10C96502-9343-42B3-827E-F0F98F88DF63}" srcId="{CB31AFBE-DAEA-44D5-8415-BC73F58EFA77}" destId="{72C84063-AED8-4516-A41E-E9BA8105F8E0}" srcOrd="0" destOrd="0" parTransId="{8778F2AB-B655-4817-A0FA-13313E2B11F6}" sibTransId="{25FB5F2D-6BE7-4F33-A184-61770FAC2072}"/>
+    <dgm:cxn modelId="{CBBB2562-5E6D-4CBC-8C8F-4932580F61C2}" type="presOf" srcId="{72C84063-AED8-4516-A41E-E9BA8105F8E0}" destId="{F86DCCC1-BE8C-451F-8334-66E626EBC338}" srcOrd="0" destOrd="0" presId="urn:microsoft.com/office/officeart/2005/8/layout/chevron2"/>
+    <dgm:cxn modelId="{784EDBF9-BBE0-44D9-A097-58BBF6DD016E}" type="presOf" srcId="{6304A6C3-0030-488C-9EB8-9523AC3FA439}" destId="{8844029F-54BA-4378-83D4-32B76F91C629}" srcOrd="0" destOrd="1" presId="urn:microsoft.com/office/officeart/2005/8/layout/chevron2"/>
+    <dgm:cxn modelId="{BB680E5C-1D4A-4098-9074-292E209AAC7B}" type="presOf" srcId="{6E3AC7C8-84D4-4345-9DC4-4670CF41915F}" destId="{14F6DA88-C20D-4C32-A1B0-9E851A6032FD}" srcOrd="0" destOrd="0" presId="urn:microsoft.com/office/officeart/2005/8/layout/chevron2"/>
+    <dgm:cxn modelId="{7ABB59F4-7ADF-4F03-91AD-B69416681851}" srcId="{6E3AC7C8-84D4-4345-9DC4-4670CF41915F}" destId="{685E302A-37A3-4F69-8822-B10C05F7AAC7}" srcOrd="2" destOrd="0" parTransId="{38F0F377-8DCB-4647-B9A7-094A0533C435}" sibTransId="{4CAF93E1-4506-4895-B3E0-A63EFC1350E3}"/>
+    <dgm:cxn modelId="{3F64204A-D17F-4C69-B3BF-577354AD226E}" srcId="{6E3AC7C8-84D4-4345-9DC4-4670CF41915F}" destId="{6304A6C3-0030-488C-9EB8-9523AC3FA439}" srcOrd="1" destOrd="0" parTransId="{EF85B223-4BD8-4EC0-B241-2E797A5C44D3}" sibTransId="{A793C610-6378-4B2D-AEA1-9870826A8165}"/>
+    <dgm:cxn modelId="{B3692F9F-E32E-497A-AF55-C60856ABB9FC}" type="presOf" srcId="{685E302A-37A3-4F69-8822-B10C05F7AAC7}" destId="{8844029F-54BA-4378-83D4-32B76F91C629}" srcOrd="0" destOrd="2" presId="urn:microsoft.com/office/officeart/2005/8/layout/chevron2"/>
+    <dgm:cxn modelId="{EBCF725E-D152-423F-A151-1467035856D5}" type="presOf" srcId="{83C22955-F503-4B08-B1B1-0767DF47FC63}" destId="{12A6C3CC-A67A-4A87-8F08-82220699C3B6}" srcOrd="0" destOrd="1" presId="urn:microsoft.com/office/officeart/2005/8/layout/chevron2"/>
+    <dgm:cxn modelId="{058A84C6-31CD-41A7-91B9-2A20AFEC0F9F}" type="presOf" srcId="{1BF9C2CD-BB22-4632-BE55-59449C52EDAB}" destId="{12A6C3CC-A67A-4A87-8F08-82220699C3B6}" srcOrd="0" destOrd="2" presId="urn:microsoft.com/office/officeart/2005/8/layout/chevron2"/>
+    <dgm:cxn modelId="{6FCB299F-A92E-45D1-B219-1CD8F43438E7}" srcId="{CB31AFBE-DAEA-44D5-8415-BC73F58EFA77}" destId="{6E3AC7C8-84D4-4345-9DC4-4670CF41915F}" srcOrd="1" destOrd="0" parTransId="{AFE49948-7CB5-4A4F-995A-8DC9489B91AE}" sibTransId="{B1503AE5-DE76-4B69-8549-6D13AE2AF633}"/>
+    <dgm:cxn modelId="{F0BCD62D-75DF-4400-9F94-7C50AA410FFE}" srcId="{72C84063-AED8-4516-A41E-E9BA8105F8E0}" destId="{83C22955-F503-4B08-B1B1-0767DF47FC63}" srcOrd="1" destOrd="0" parTransId="{9B075334-32AE-457A-8357-A77AE0DB2E97}" sibTransId="{207A4BBA-C58A-4720-805E-A2157F015FCC}"/>
+    <dgm:cxn modelId="{AEF2EE8A-7CD1-4759-A943-03ED12C0638F}" type="presOf" srcId="{89DE63EF-B3C8-458D-B915-09BFE576A34F}" destId="{8844029F-54BA-4378-83D4-32B76F91C629}" srcOrd="0" destOrd="0" presId="urn:microsoft.com/office/officeart/2005/8/layout/chevron2"/>
+    <dgm:cxn modelId="{4305B82F-3B1E-490F-92D7-07768E42B250}" type="presOf" srcId="{CB31AFBE-DAEA-44D5-8415-BC73F58EFA77}" destId="{60BCFE6E-9155-4C21-A26A-328931E3A519}" srcOrd="0" destOrd="0" presId="urn:microsoft.com/office/officeart/2005/8/layout/chevron2"/>
+    <dgm:cxn modelId="{4509158E-4B8E-4830-9B0E-A378DDDD3A58}" type="presOf" srcId="{49DE29FD-06D9-462D-9CE6-8FFF9CF17177}" destId="{12A6C3CC-A67A-4A87-8F08-82220699C3B6}" srcOrd="0" destOrd="0" presId="urn:microsoft.com/office/officeart/2005/8/layout/chevron2"/>
+    <dgm:cxn modelId="{564E4A6D-5861-49EE-958D-8EBC0F233397}" srcId="{72C84063-AED8-4516-A41E-E9BA8105F8E0}" destId="{49DE29FD-06D9-462D-9CE6-8FFF9CF17177}" srcOrd="0" destOrd="0" parTransId="{284702D0-C566-4C67-9A52-8DEBBB05C0C2}" sibTransId="{A61F681B-9CC5-4335-985F-49C1CB5621B6}"/>
+    <dgm:cxn modelId="{7FF154F7-7BDA-464B-882A-5C30C0DCAFCA}" srcId="{6E3AC7C8-84D4-4345-9DC4-4670CF41915F}" destId="{89DE63EF-B3C8-458D-B915-09BFE576A34F}" srcOrd="0" destOrd="0" parTransId="{CF1D9192-744B-40CC-9BCE-E324E91D910A}" sibTransId="{9F8B87B9-8933-4E91-AB66-BB8BB1AD608D}"/>
+    <dgm:cxn modelId="{622BC44A-4F29-44CB-B56F-7547A933BE37}" srcId="{72C84063-AED8-4516-A41E-E9BA8105F8E0}" destId="{1BF9C2CD-BB22-4632-BE55-59449C52EDAB}" srcOrd="2" destOrd="0" parTransId="{A6C499AD-4A33-4425-8622-F827F4D9DDAE}" sibTransId="{2E391214-7221-421A-89D0-8F3F671A512D}"/>
+    <dgm:cxn modelId="{B84EA5E4-12AD-41A2-9BB6-E9F448A880DF}" type="presParOf" srcId="{60BCFE6E-9155-4C21-A26A-328931E3A519}" destId="{847E7D6A-EE97-42E1-B39D-9807D90F4CCF}" srcOrd="0" destOrd="0" presId="urn:microsoft.com/office/officeart/2005/8/layout/chevron2"/>
+    <dgm:cxn modelId="{EDCFE980-FA89-4C1A-A77C-CD1560413C15}" type="presParOf" srcId="{847E7D6A-EE97-42E1-B39D-9807D90F4CCF}" destId="{F86DCCC1-BE8C-451F-8334-66E626EBC338}" srcOrd="0" destOrd="0" presId="urn:microsoft.com/office/officeart/2005/8/layout/chevron2"/>
+    <dgm:cxn modelId="{4E91F0C1-3985-4EE1-8B8F-089C606E3209}" type="presParOf" srcId="{847E7D6A-EE97-42E1-B39D-9807D90F4CCF}" destId="{12A6C3CC-A67A-4A87-8F08-82220699C3B6}" srcOrd="1" destOrd="0" presId="urn:microsoft.com/office/officeart/2005/8/layout/chevron2"/>
+    <dgm:cxn modelId="{D6A11688-0C0F-4C14-AEE5-9FE81B19C1D9}" type="presParOf" srcId="{60BCFE6E-9155-4C21-A26A-328931E3A519}" destId="{0EB69E59-DAC5-4598-8747-400CA4D8A19F}" srcOrd="1" destOrd="0" presId="urn:microsoft.com/office/officeart/2005/8/layout/chevron2"/>
+    <dgm:cxn modelId="{F0900841-DF75-4C08-875C-5DCCCFF2C33D}" type="presParOf" srcId="{60BCFE6E-9155-4C21-A26A-328931E3A519}" destId="{82CC6A56-7E2D-4BC2-AD46-97E9011DC3CF}" srcOrd="2" destOrd="0" presId="urn:microsoft.com/office/officeart/2005/8/layout/chevron2"/>
+    <dgm:cxn modelId="{FE3602E4-DDAC-47A4-8C3C-FE8B98424084}" type="presParOf" srcId="{82CC6A56-7E2D-4BC2-AD46-97E9011DC3CF}" destId="{14F6DA88-C20D-4C32-A1B0-9E851A6032FD}" srcOrd="0" destOrd="0" presId="urn:microsoft.com/office/officeart/2005/8/layout/chevron2"/>
+    <dgm:cxn modelId="{44EA5351-29AC-40E5-9515-4770FD111853}" type="presParOf" srcId="{82CC6A56-7E2D-4BC2-AD46-97E9011DC3CF}" destId="{8844029F-54BA-4378-83D4-32B76F91C629}" srcOrd="1" destOrd="0" presId="urn:microsoft.com/office/officeart/2005/8/layout/chevron2"/>
+  </dgm:cxnLst>
+  <dgm:bg/>
+  <dgm:whole/>
+  <dgm:extLst>
+    <a:ext uri="http://schemas.microsoft.com/office/drawing/2008/diagram">
+      <dsp:dataModelExt xmlns:dsp="http://schemas.microsoft.com/office/drawing/2008/diagram" relId="rId6" minVer="http://schemas.openxmlformats.org/drawingml/2006/diagram"/>
+    </a:ext>
+  </dgm:extLst>
+</dgm:dataModel>
+</file>
+
+<file path=ppt/diagrams/drawing1.xml><?xml version="1.0" encoding="utf-8"?>
+<dsp:drawing xmlns:dgm="http://schemas.openxmlformats.org/drawingml/2006/diagram" xmlns:dsp="http://schemas.microsoft.com/office/drawing/2008/diagram" xmlns:a="http://schemas.openxmlformats.org/drawingml/2006/main">
+  <dsp:spTree>
+    <dsp:nvGrpSpPr>
+      <dsp:cNvPr id="0" name=""/>
+      <dsp:cNvGrpSpPr/>
+    </dsp:nvGrpSpPr>
+    <dsp:grpSpPr/>
+    <dsp:sp modelId="{F86DCCC1-BE8C-451F-8334-66E626EBC338}">
+      <dsp:nvSpPr>
+        <dsp:cNvPr id="0" name=""/>
+        <dsp:cNvSpPr/>
+      </dsp:nvSpPr>
+      <dsp:spPr>
+        <a:xfrm rot="5400000">
+          <a:off x="-417762" y="419231"/>
+          <a:ext cx="2785081" cy="1949556"/>
+        </a:xfrm>
+        <a:prstGeom prst="chevron">
+          <a:avLst/>
+        </a:prstGeom>
+        <a:solidFill>
+          <a:schemeClr val="accent3">
+            <a:hueOff val="0"/>
+            <a:satOff val="0"/>
+            <a:lumOff val="0"/>
+            <a:alphaOff val="0"/>
+          </a:schemeClr>
+        </a:solidFill>
+        <a:ln w="25400" cap="flat" cmpd="sng" algn="ctr">
+          <a:solidFill>
+            <a:schemeClr val="accent3">
+              <a:hueOff val="0"/>
+              <a:satOff val="0"/>
+              <a:lumOff val="0"/>
+              <a:alphaOff val="0"/>
+            </a:schemeClr>
+          </a:solidFill>
+          <a:prstDash val="solid"/>
+        </a:ln>
+        <a:effectLst/>
+      </dsp:spPr>
+      <dsp:style>
+        <a:lnRef idx="2">
+          <a:scrgbClr r="0" g="0" b="0"/>
+        </a:lnRef>
+        <a:fillRef idx="1">
+          <a:scrgbClr r="0" g="0" b="0"/>
+        </a:fillRef>
+        <a:effectRef idx="0">
+          <a:scrgbClr r="0" g="0" b="0"/>
+        </a:effectRef>
+        <a:fontRef idx="minor">
+          <a:schemeClr val="lt1"/>
+        </a:fontRef>
+      </dsp:style>
+      <dsp:txBody>
+        <a:bodyPr spcFirstLastPara="0" vert="horz" wrap="square" lIns="34290" tIns="34290" rIns="34290" bIns="34290" numCol="1" spcCol="1270" anchor="ctr" anchorCtr="0">
+          <a:noAutofit/>
+        </a:bodyPr>
+        <a:lstStyle/>
+        <a:p>
+          <a:pPr lvl="0" algn="ctr" defTabSz="2400300">
+            <a:lnSpc>
+              <a:spcPct val="90000"/>
+            </a:lnSpc>
+            <a:spcBef>
+              <a:spcPct val="0"/>
+            </a:spcBef>
+            <a:spcAft>
+              <a:spcPct val="35000"/>
+            </a:spcAft>
+          </a:pPr>
+          <a:r>
+            <a:rPr lang="en-US" sz="5400" kern="1200" dirty="0" smtClean="0"/>
+            <a:t>v1</a:t>
+          </a:r>
+          <a:endParaRPr lang="en-US" sz="5400" kern="1200" dirty="0"/>
+        </a:p>
+      </dsp:txBody>
+      <dsp:txXfrm rot="-5400000">
+        <a:off x="1" y="976246"/>
+        <a:ext cx="1949556" cy="835525"/>
+      </dsp:txXfrm>
+    </dsp:sp>
+    <dsp:sp modelId="{12A6C3CC-A67A-4A87-8F08-82220699C3B6}">
+      <dsp:nvSpPr>
+        <dsp:cNvPr id="0" name=""/>
+        <dsp:cNvSpPr/>
+      </dsp:nvSpPr>
+      <dsp:spPr>
+        <a:xfrm rot="5400000">
+          <a:off x="5832252" y="-3881225"/>
+          <a:ext cx="1810302" cy="9575693"/>
+        </a:xfrm>
+        <a:prstGeom prst="round2SameRect">
+          <a:avLst/>
+        </a:prstGeom>
+        <a:solidFill>
+          <a:schemeClr val="lt1">
+            <a:alpha val="90000"/>
+            <a:hueOff val="0"/>
+            <a:satOff val="0"/>
+            <a:lumOff val="0"/>
+            <a:alphaOff val="0"/>
+          </a:schemeClr>
+        </a:solidFill>
+        <a:ln w="25400" cap="flat" cmpd="sng" algn="ctr">
+          <a:solidFill>
+            <a:schemeClr val="accent3">
+              <a:hueOff val="0"/>
+              <a:satOff val="0"/>
+              <a:lumOff val="0"/>
+              <a:alphaOff val="0"/>
+            </a:schemeClr>
+          </a:solidFill>
+          <a:prstDash val="solid"/>
+        </a:ln>
+        <a:effectLst/>
+      </dsp:spPr>
+      <dsp:style>
+        <a:lnRef idx="2">
+          <a:scrgbClr r="0" g="0" b="0"/>
+        </a:lnRef>
+        <a:fillRef idx="1">
+          <a:scrgbClr r="0" g="0" b="0"/>
+        </a:fillRef>
+        <a:effectRef idx="0">
+          <a:scrgbClr r="0" g="0" b="0"/>
+        </a:effectRef>
+        <a:fontRef idx="minor"/>
+      </dsp:style>
+      <dsp:txBody>
+        <a:bodyPr spcFirstLastPara="0" vert="horz" wrap="square" lIns="206248" tIns="18415" rIns="18415" bIns="18415" numCol="1" spcCol="1270" anchor="ctr" anchorCtr="0">
+          <a:noAutofit/>
+        </a:bodyPr>
+        <a:lstStyle/>
+        <a:p>
+          <a:pPr marL="285750" lvl="1" indent="-285750" algn="l" defTabSz="1289050">
+            <a:lnSpc>
+              <a:spcPct val="90000"/>
+            </a:lnSpc>
+            <a:spcBef>
+              <a:spcPct val="0"/>
+            </a:spcBef>
+            <a:spcAft>
+              <a:spcPct val="15000"/>
+            </a:spcAft>
+            <a:buChar char="••"/>
+          </a:pPr>
+          <a:r>
+            <a:rPr lang="en-US" sz="2900" kern="1200" dirty="0" smtClean="0"/>
+            <a:t>You thought there would only be three types of dates</a:t>
+          </a:r>
+          <a:endParaRPr lang="en-US" sz="2900" kern="1200" dirty="0"/>
+        </a:p>
+        <a:p>
+          <a:pPr marL="285750" lvl="1" indent="-285750" algn="l" defTabSz="1289050">
+            <a:lnSpc>
+              <a:spcPct val="90000"/>
+            </a:lnSpc>
+            <a:spcBef>
+              <a:spcPct val="0"/>
+            </a:spcBef>
+            <a:spcAft>
+              <a:spcPct val="15000"/>
+            </a:spcAft>
+            <a:buChar char="••"/>
+          </a:pPr>
+          <a:r>
+            <a:rPr lang="en-US" sz="2900" kern="1200" dirty="0" smtClean="0"/>
+            <a:t>So you returned a single object </a:t>
+          </a:r>
+          <a:endParaRPr lang="en-US" sz="2900" kern="1200" dirty="0"/>
+        </a:p>
+        <a:p>
+          <a:pPr marL="285750" lvl="1" indent="-285750" algn="l" defTabSz="1289050">
+            <a:lnSpc>
+              <a:spcPct val="90000"/>
+            </a:lnSpc>
+            <a:spcBef>
+              <a:spcPct val="0"/>
+            </a:spcBef>
+            <a:spcAft>
+              <a:spcPct val="15000"/>
+            </a:spcAft>
+            <a:buChar char="••"/>
+          </a:pPr>
+          <a:r>
+            <a:rPr lang="en-US" sz="2900" kern="1200" dirty="0" smtClean="0"/>
+            <a:t>{ id, </a:t>
+          </a:r>
+          <a:r>
+            <a:rPr lang="en-US" sz="2900" kern="1200" dirty="0" err="1" smtClean="0"/>
+            <a:t>fooDate</a:t>
+          </a:r>
+          <a:r>
+            <a:rPr lang="en-US" sz="2900" kern="1200" dirty="0" smtClean="0"/>
+            <a:t>, </a:t>
+          </a:r>
+          <a:r>
+            <a:rPr lang="en-US" sz="2900" kern="1200" dirty="0" err="1" smtClean="0"/>
+            <a:t>barDate</a:t>
+          </a:r>
+          <a:r>
+            <a:rPr lang="en-US" sz="2900" kern="1200" dirty="0" smtClean="0"/>
+            <a:t>, </a:t>
+          </a:r>
+          <a:r>
+            <a:rPr lang="en-US" sz="2900" kern="1200" dirty="0" err="1" smtClean="0"/>
+            <a:t>widgetDate</a:t>
+          </a:r>
+          <a:r>
+            <a:rPr lang="en-US" sz="2900" kern="1200" dirty="0" smtClean="0"/>
+            <a:t> }</a:t>
+          </a:r>
+          <a:endParaRPr lang="en-US" sz="2900" kern="1200" dirty="0"/>
+        </a:p>
+      </dsp:txBody>
+      <dsp:txXfrm rot="-5400000">
+        <a:off x="1949557" y="89842"/>
+        <a:ext cx="9487321" cy="1633558"/>
+      </dsp:txXfrm>
+    </dsp:sp>
+    <dsp:sp modelId="{14F6DA88-C20D-4C32-A1B0-9E851A6032FD}">
+      <dsp:nvSpPr>
+        <dsp:cNvPr id="0" name=""/>
+        <dsp:cNvSpPr/>
+      </dsp:nvSpPr>
+      <dsp:spPr>
+        <a:xfrm rot="5400000">
+          <a:off x="-417762" y="2922349"/>
+          <a:ext cx="2785081" cy="1949556"/>
+        </a:xfrm>
+        <a:prstGeom prst="chevron">
+          <a:avLst/>
+        </a:prstGeom>
+        <a:solidFill>
+          <a:schemeClr val="accent3">
+            <a:hueOff val="11250264"/>
+            <a:satOff val="-16880"/>
+            <a:lumOff val="-2745"/>
+            <a:alphaOff val="0"/>
+          </a:schemeClr>
+        </a:solidFill>
+        <a:ln w="25400" cap="flat" cmpd="sng" algn="ctr">
+          <a:solidFill>
+            <a:schemeClr val="accent3">
+              <a:hueOff val="11250264"/>
+              <a:satOff val="-16880"/>
+              <a:lumOff val="-2745"/>
+              <a:alphaOff val="0"/>
+            </a:schemeClr>
+          </a:solidFill>
+          <a:prstDash val="solid"/>
+        </a:ln>
+        <a:effectLst/>
+      </dsp:spPr>
+      <dsp:style>
+        <a:lnRef idx="2">
+          <a:scrgbClr r="0" g="0" b="0"/>
+        </a:lnRef>
+        <a:fillRef idx="1">
+          <a:scrgbClr r="0" g="0" b="0"/>
+        </a:fillRef>
+        <a:effectRef idx="0">
+          <a:scrgbClr r="0" g="0" b="0"/>
+        </a:effectRef>
+        <a:fontRef idx="minor">
+          <a:schemeClr val="lt1"/>
+        </a:fontRef>
+      </dsp:style>
+      <dsp:txBody>
+        <a:bodyPr spcFirstLastPara="0" vert="horz" wrap="square" lIns="34290" tIns="34290" rIns="34290" bIns="34290" numCol="1" spcCol="1270" anchor="ctr" anchorCtr="0">
+          <a:noAutofit/>
+        </a:bodyPr>
+        <a:lstStyle/>
+        <a:p>
+          <a:pPr lvl="0" algn="ctr" defTabSz="2400300">
+            <a:lnSpc>
+              <a:spcPct val="90000"/>
+            </a:lnSpc>
+            <a:spcBef>
+              <a:spcPct val="0"/>
+            </a:spcBef>
+            <a:spcAft>
+              <a:spcPct val="35000"/>
+            </a:spcAft>
+          </a:pPr>
+          <a:r>
+            <a:rPr lang="en-US" sz="5400" kern="1200" dirty="0" smtClean="0"/>
+            <a:t>v2</a:t>
+          </a:r>
+          <a:endParaRPr lang="en-US" sz="5400" kern="1200" dirty="0"/>
+        </a:p>
+      </dsp:txBody>
+      <dsp:txXfrm rot="-5400000">
+        <a:off x="1" y="3479364"/>
+        <a:ext cx="1949556" cy="835525"/>
+      </dsp:txXfrm>
+    </dsp:sp>
+    <dsp:sp modelId="{8844029F-54BA-4378-83D4-32B76F91C629}">
+      <dsp:nvSpPr>
+        <dsp:cNvPr id="0" name=""/>
+        <dsp:cNvSpPr/>
+      </dsp:nvSpPr>
+      <dsp:spPr>
+        <a:xfrm rot="5400000">
+          <a:off x="5832252" y="-1378108"/>
+          <a:ext cx="1810302" cy="9575693"/>
+        </a:xfrm>
+        <a:prstGeom prst="round2SameRect">
+          <a:avLst/>
+        </a:prstGeom>
+        <a:solidFill>
+          <a:schemeClr val="lt1">
+            <a:alpha val="90000"/>
+            <a:hueOff val="0"/>
+            <a:satOff val="0"/>
+            <a:lumOff val="0"/>
+            <a:alphaOff val="0"/>
+          </a:schemeClr>
+        </a:solidFill>
+        <a:ln w="25400" cap="flat" cmpd="sng" algn="ctr">
+          <a:solidFill>
+            <a:schemeClr val="accent3">
+              <a:hueOff val="11250264"/>
+              <a:satOff val="-16880"/>
+              <a:lumOff val="-2745"/>
+              <a:alphaOff val="0"/>
+            </a:schemeClr>
+          </a:solidFill>
+          <a:prstDash val="solid"/>
+        </a:ln>
+        <a:effectLst/>
+      </dsp:spPr>
+      <dsp:style>
+        <a:lnRef idx="2">
+          <a:scrgbClr r="0" g="0" b="0"/>
+        </a:lnRef>
+        <a:fillRef idx="1">
+          <a:scrgbClr r="0" g="0" b="0"/>
+        </a:fillRef>
+        <a:effectRef idx="0">
+          <a:scrgbClr r="0" g="0" b="0"/>
+        </a:effectRef>
+        <a:fontRef idx="minor"/>
+      </dsp:style>
+      <dsp:txBody>
+        <a:bodyPr spcFirstLastPara="0" vert="horz" wrap="square" lIns="206248" tIns="18415" rIns="18415" bIns="18415" numCol="1" spcCol="1270" anchor="ctr" anchorCtr="0">
+          <a:noAutofit/>
+        </a:bodyPr>
+        <a:lstStyle/>
+        <a:p>
+          <a:pPr marL="285750" lvl="1" indent="-285750" algn="l" defTabSz="1289050">
+            <a:lnSpc>
+              <a:spcPct val="90000"/>
+            </a:lnSpc>
+            <a:spcBef>
+              <a:spcPct val="0"/>
+            </a:spcBef>
+            <a:spcAft>
+              <a:spcPct val="15000"/>
+            </a:spcAft>
+            <a:buChar char="••"/>
+          </a:pPr>
+          <a:r>
+            <a:rPr lang="en-US" sz="2900" kern="1200" dirty="0" smtClean="0"/>
+            <a:t>Things change (surprise!) and now you may have 1..n dates </a:t>
+          </a:r>
+          <a:endParaRPr lang="en-US" sz="2900" kern="1200" dirty="0"/>
+        </a:p>
+        <a:p>
+          <a:pPr marL="285750" lvl="1" indent="-285750" algn="l" defTabSz="1289050">
+            <a:lnSpc>
+              <a:spcPct val="90000"/>
+            </a:lnSpc>
+            <a:spcBef>
+              <a:spcPct val="0"/>
+            </a:spcBef>
+            <a:spcAft>
+              <a:spcPct val="15000"/>
+            </a:spcAft>
+            <a:buChar char="••"/>
+          </a:pPr>
+          <a:r>
+            <a:rPr lang="en-US" sz="2900" kern="1200" dirty="0" smtClean="0"/>
+            <a:t>So you return a set of rows instead with a date type</a:t>
+          </a:r>
+          <a:endParaRPr lang="en-US" sz="2900" kern="1200" dirty="0"/>
+        </a:p>
+        <a:p>
+          <a:pPr marL="285750" lvl="1" indent="-285750" algn="l" defTabSz="1289050">
+            <a:lnSpc>
+              <a:spcPct val="90000"/>
+            </a:lnSpc>
+            <a:spcBef>
+              <a:spcPct val="0"/>
+            </a:spcBef>
+            <a:spcAft>
+              <a:spcPct val="15000"/>
+            </a:spcAft>
+            <a:buChar char="••"/>
+          </a:pPr>
+          <a:r>
+            <a:rPr lang="en-US" sz="2900" kern="1200" dirty="0" smtClean="0"/>
+            <a:t>{id, type, date}</a:t>
+          </a:r>
+          <a:endParaRPr lang="en-US" sz="2900" kern="1200" dirty="0"/>
+        </a:p>
+      </dsp:txBody>
+      <dsp:txXfrm rot="-5400000">
+        <a:off x="1949557" y="2592959"/>
+        <a:ext cx="9487321" cy="1633558"/>
+      </dsp:txXfrm>
+    </dsp:sp>
+  </dsp:spTree>
+</dsp:drawing>
+</file>
+
+<file path=ppt/diagrams/layout1.xml><?xml version="1.0" encoding="utf-8"?>
+<dgm:layoutDef xmlns:dgm="http://schemas.openxmlformats.org/drawingml/2006/diagram" xmlns:a="http://schemas.openxmlformats.org/drawingml/2006/main" uniqueId="urn:microsoft.com/office/officeart/2005/8/layout/chevron2">
+  <dgm:title val=""/>
+  <dgm:desc val=""/>
+  <dgm:catLst>
+    <dgm:cat type="process" pri="12000"/>
+    <dgm:cat type="list" pri="16000"/>
+    <dgm:cat type="convert" pri="11000"/>
+  </dgm:catLst>
+  <dgm:sampData>
+    <dgm:dataModel>
+      <dgm:ptLst>
+        <dgm:pt modelId="0" type="doc"/>
+        <dgm:pt modelId="1">
+          <dgm:prSet phldr="1"/>
+        </dgm:pt>
+        <dgm:pt modelId="11">
+          <dgm:prSet phldr="1"/>
+        </dgm:pt>
+        <dgm:pt modelId="12">
+          <dgm:prSet phldr="1"/>
+        </dgm:pt>
+        <dgm:pt modelId="2">
+          <dgm:prSet phldr="1"/>
+        </dgm:pt>
+        <dgm:pt modelId="21">
+          <dgm:prSet phldr="1"/>
+        </dgm:pt>
+        <dgm:pt modelId="22">
+          <dgm:prSet phldr="1"/>
+        </dgm:pt>
+        <dgm:pt modelId="3">
+          <dgm:prSet phldr="1"/>
+        </dgm:pt>
+        <dgm:pt modelId="31">
+          <dgm:prSet phldr="1"/>
+        </dgm:pt>
+        <dgm:pt modelId="32">
+          <dgm:prSet phldr="1"/>
+        </dgm:pt>
+      </dgm:ptLst>
+      <dgm:cxnLst>
+        <dgm:cxn modelId="4" srcId="0" destId="1" srcOrd="0" destOrd="0"/>
+        <dgm:cxn modelId="5" srcId="0" destId="2" srcOrd="1" destOrd="0"/>
+        <dgm:cxn modelId="6" srcId="0" destId="3" srcOrd="2" destOrd="0"/>
+        <dgm:cxn modelId="13" srcId="1" destId="11" srcOrd="0" destOrd="0"/>
+        <dgm:cxn modelId="14" srcId="1" destId="12" srcOrd="1" destOrd="0"/>
+        <dgm:cxn modelId="23" srcId="2" destId="21" srcOrd="0" destOrd="0"/>
+        <dgm:cxn modelId="24" srcId="2" destId="22" srcOrd="1" destOrd="0"/>
+        <dgm:cxn modelId="33" srcId="3" destId="31" srcOrd="0" destOrd="0"/>
+        <dgm:cxn modelId="34" srcId="3" destId="32" srcOrd="1" destOrd="0"/>
+      </dgm:cxnLst>
+      <dgm:bg/>
+      <dgm:whole/>
+    </dgm:dataModel>
+  </dgm:sampData>
+  <dgm:styleData>
+    <dgm:dataModel>
+      <dgm:ptLst>
+        <dgm:pt modelId="0" type="doc"/>
+        <dgm:pt modelId="1"/>
+      </dgm:ptLst>
+      <dgm:cxnLst>
+        <dgm:cxn modelId="4" srcId="0" destId="1" srcOrd="0" destOrd="0"/>
+      </dgm:cxnLst>
+      <dgm:bg/>
+      <dgm:whole/>
+    </dgm:dataModel>
+  </dgm:styleData>
+  <dgm:clrData>
+    <dgm:dataModel>
+      <dgm:ptLst>
+        <dgm:pt modelId="0" type="doc"/>
+        <dgm:pt modelId="1"/>
+        <dgm:pt modelId="11"/>
+        <dgm:pt modelId="2"/>
+        <dgm:pt modelId="21"/>
+        <dgm:pt modelId="3"/>
+        <dgm:pt modelId="31"/>
+        <dgm:pt modelId="4"/>
+        <dgm:pt modelId="41"/>
+      </dgm:ptLst>
+      <dgm:cxnLst>
+        <dgm:cxn modelId="5" srcId="0" destId="1" srcOrd="0" destOrd="0"/>
+        <dgm:cxn modelId="6" srcId="0" destId="2" srcOrd="1" destOrd="0"/>
+        <dgm:cxn modelId="7" srcId="0" destId="3" srcOrd="2" destOrd="0"/>
+        <dgm:cxn modelId="8" srcId="0" destId="4" srcOrd="3" destOrd="0"/>
+        <dgm:cxn modelId="13" srcId="1" destId="11" srcOrd="0" destOrd="0"/>
+        <dgm:cxn modelId="23" srcId="2" destId="21" srcOrd="0" destOrd="0"/>
+        <dgm:cxn modelId="33" srcId="3" destId="31" srcOrd="0" destOrd="0"/>
+        <dgm:cxn modelId="43" srcId="4" destId="41" srcOrd="0" destOrd="0"/>
+      </dgm:cxnLst>
+      <dgm:bg/>
+      <dgm:whole/>
+    </dgm:dataModel>
+  </dgm:clrData>
+  <dgm:layoutNode name="linearFlow">
+    <dgm:varLst>
+      <dgm:dir/>
+      <dgm:animLvl val="lvl"/>
+      <dgm:resizeHandles val="exact"/>
+    </dgm:varLst>
+    <dgm:alg type="lin">
+      <dgm:param type="linDir" val="fromT"/>
+      <dgm:param type="nodeHorzAlign" val="l"/>
+    </dgm:alg>
+    <dgm:shape xmlns:r="http://schemas.openxmlformats.org/officeDocument/2006/relationships" r:blip="">
+      <dgm:adjLst/>
+    </dgm:shape>
+    <dgm:presOf/>
+    <dgm:constrLst>
+      <dgm:constr type="h" for="ch" forName="composite" refType="h"/>
+      <dgm:constr type="w" for="ch" forName="composite" refType="w"/>
+      <dgm:constr type="h" for="des" forName="parentText" op="equ"/>
+      <dgm:constr type="h" for="ch" forName="sp" val="-14.88"/>
+      <dgm:constr type="h" for="ch" forName="sp" refType="w" refFor="des" refForName="parentText" op="gte" fact="-0.3"/>
+      <dgm:constr type="primFontSz" for="des" forName="parentText" op="equ" val="65"/>
+      <dgm:constr type="primFontSz" for="des" forName="descendantText" op="equ" val="65"/>
+    </dgm:constrLst>
+    <dgm:ruleLst/>
+    <dgm:forEach name="Name0" axis="ch" ptType="node">
+      <dgm:layoutNode name="composite">
+        <dgm:alg type="composite"/>
+        <dgm:shape xmlns:r="http://schemas.openxmlformats.org/officeDocument/2006/relationships" r:blip="">
+          <dgm:adjLst/>
+        </dgm:shape>
+        <dgm:presOf/>
+        <dgm:choose name="Name1">
+          <dgm:if name="Name2" func="var" arg="dir" op="equ" val="norm">
+            <dgm:constrLst>
+              <dgm:constr type="t" for="ch" forName="parentText"/>
+              <dgm:constr type="l" for="ch" forName="parentText"/>
+              <dgm:constr type="w" for="ch" forName="parentText" refType="w" fact="0.4"/>
+              <dgm:constr type="h" for="ch" forName="parentText" refType="h"/>
+              <dgm:constr type="w" for="ch" forName="parentText" refType="w" op="lte" fact="0.5"/>
+              <dgm:constr type="w" for="ch" forName="parentText" refType="h" refFor="ch" refForName="parentText" op="lte" fact="0.7"/>
+              <dgm:constr type="h" for="ch" forName="parentText" refType="w" refFor="ch" refForName="parentText" op="lte" fact="3"/>
+              <dgm:constr type="l" for="ch" forName="descendantText" refType="w" refFor="ch" refForName="parentText"/>
+              <dgm:constr type="w" for="ch" forName="descendantText" refType="w"/>
+              <dgm:constr type="wOff" for="ch" forName="descendantText" refType="w" refFor="ch" refForName="parentText" fact="-1"/>
+              <dgm:constr type="t" for="ch" forName="descendantText"/>
+              <dgm:constr type="b" for="ch" forName="descendantText" refType="h" refFor="ch" refForName="parentText"/>
+              <dgm:constr type="bOff" for="ch" forName="descendantText" refType="w" refFor="ch" refForName="parentText" fact="-0.5"/>
+            </dgm:constrLst>
+          </dgm:if>
+          <dgm:else name="Name3">
+            <dgm:constrLst>
+              <dgm:constr type="t" for="ch" forName="parentText"/>
+              <dgm:constr type="r" for="ch" forName="parentText" refType="w"/>
+              <dgm:constr type="w" for="ch" forName="parentText" refType="w" fact="0.4"/>
+              <dgm:constr type="h" for="ch" forName="parentText" refType="h"/>
+              <dgm:constr type="w" for="ch" forName="parentText" refType="w" op="lte" fact="0.5"/>
+              <dgm:constr type="w" for="ch" forName="parentText" refType="h" refFor="ch" refForName="parentText" op="lte" fact="0.7"/>
+              <dgm:constr type="h" for="ch" forName="parentText" refType="w" refFor="ch" refForName="parentText" op="lte" fact="3"/>
+              <dgm:constr type="l" for="ch" forName="descendantText"/>
+              <dgm:constr type="w" for="ch" forName="descendantText" refType="w"/>
+              <dgm:constr type="wOff" for="ch" forName="descendantText" refType="w" refFor="ch" refForName="parentText" fact="-1"/>
+              <dgm:constr type="t" for="ch" forName="descendantText"/>
+              <dgm:constr type="b" for="ch" forName="descendantText" refType="h" refFor="ch" refForName="parentText"/>
+              <dgm:constr type="bOff" for="ch" forName="descendantText" refType="w" refFor="ch" refForName="parentText" fact="-0.5"/>
+            </dgm:constrLst>
+          </dgm:else>
+        </dgm:choose>
+        <dgm:ruleLst/>
+        <dgm:layoutNode name="parentText" styleLbl="alignNode1">
+          <dgm:varLst>
+            <dgm:chMax val="1"/>
+            <dgm:bulletEnabled val="1"/>
+          </dgm:varLst>
+          <dgm:alg type="tx"/>
+          <dgm:shape xmlns:r="http://schemas.openxmlformats.org/officeDocument/2006/relationships" rot="90" type="chevron" r:blip="">
+            <dgm:adjLst/>
+          </dgm:shape>
+          <dgm:presOf axis="self" ptType="node"/>
+          <dgm:constrLst>
+            <dgm:constr type="lMarg" refType="primFontSz" fact="0.05"/>
+            <dgm:constr type="rMarg" refType="primFontSz" fact="0.05"/>
+            <dgm:constr type="tMarg" refType="primFontSz" fact="0.05"/>
+            <dgm:constr type="bMarg" refType="primFontSz" fact="0.05"/>
+          </dgm:constrLst>
+          <dgm:ruleLst>
+            <dgm:rule type="h" val="100" fact="NaN" max="NaN"/>
+            <dgm:rule type="primFontSz" val="24" fact="NaN" max="NaN"/>
+            <dgm:rule type="h" val="110" fact="NaN" max="NaN"/>
+            <dgm:rule type="primFontSz" val="18" fact="NaN" max="NaN"/>
+            <dgm:rule type="h" val="INF" fact="NaN" max="NaN"/>
+            <dgm:rule type="primFontSz" val="5" fact="NaN" max="NaN"/>
+          </dgm:ruleLst>
+        </dgm:layoutNode>
+        <dgm:layoutNode name="descendantText" styleLbl="alignAcc1">
+          <dgm:varLst>
+            <dgm:bulletEnabled val="1"/>
+          </dgm:varLst>
+          <dgm:choose name="Name4">
+            <dgm:if name="Name5" func="var" arg="dir" op="equ" val="norm">
+              <dgm:alg type="tx">
+                <dgm:param type="stBulletLvl" val="1"/>
+                <dgm:param type="txAnchorVertCh" val="mid"/>
+              </dgm:alg>
+              <dgm:shape xmlns:r="http://schemas.openxmlformats.org/officeDocument/2006/relationships" rot="90" type="round2SameRect" r:blip="">
+                <dgm:adjLst/>
+              </dgm:shape>
+            </dgm:if>
+            <dgm:else name="Name6">
+              <dgm:alg type="tx">
+                <dgm:param type="stBulletLvl" val="1"/>
+                <dgm:param type="txAnchorVertCh" val="mid"/>
+              </dgm:alg>
+              <dgm:shape xmlns:r="http://schemas.openxmlformats.org/officeDocument/2006/relationships" rot="-90" type="round2SameRect" r:blip="">
+                <dgm:adjLst/>
+              </dgm:shape>
+            </dgm:else>
+          </dgm:choose>
+          <dgm:presOf axis="des" ptType="node"/>
+          <dgm:choose name="Name7">
+            <dgm:if name="Name8" func="var" arg="dir" op="equ" val="norm">
+              <dgm:constrLst>
+                <dgm:constr type="secFontSz" refType="primFontSz"/>
+                <dgm:constr type="tMarg" refType="primFontSz" fact="0.05"/>
+                <dgm:constr type="bMarg" refType="primFontSz" fact="0.05"/>
+                <dgm:constr type="rMarg" refType="primFontSz" fact="0.05"/>
+              </dgm:constrLst>
+            </dgm:if>
+            <dgm:else name="Name9">
+              <dgm:constrLst>
+                <dgm:constr type="secFontSz" refType="primFontSz"/>
+                <dgm:constr type="tMarg" refType="primFontSz" fact="0.05"/>
+                <dgm:constr type="bMarg" refType="primFontSz" fact="0.05"/>
+                <dgm:constr type="lMarg" refType="primFontSz" fact="0.05"/>
+              </dgm:constrLst>
+            </dgm:else>
+          </dgm:choose>
+          <dgm:ruleLst>
+            <dgm:rule type="primFontSz" val="5" fact="NaN" max="NaN"/>
+          </dgm:ruleLst>
+        </dgm:layoutNode>
+      </dgm:layoutNode>
+      <dgm:forEach name="Name10" axis="followSib" ptType="sibTrans" cnt="1">
+        <dgm:layoutNode name="sp">
+          <dgm:alg type="sp"/>
+          <dgm:shape xmlns:r="http://schemas.openxmlformats.org/officeDocument/2006/relationships" r:blip="">
+            <dgm:adjLst/>
+          </dgm:shape>
+          <dgm:presOf axis="self"/>
+          <dgm:constrLst>
+            <dgm:constr type="w" val="1"/>
+            <dgm:constr type="h" val="37.5"/>
+          </dgm:constrLst>
+          <dgm:ruleLst/>
+        </dgm:layoutNode>
+      </dgm:forEach>
+    </dgm:forEach>
+  </dgm:layoutNode>
+</dgm:layoutDef>
+</file>
+
+<file path=ppt/diagrams/quickStyle1.xml><?xml version="1.0" encoding="utf-8"?>
+<dgm:styleDef xmlns:dgm="http://schemas.openxmlformats.org/drawingml/2006/diagram" xmlns:a="http://schemas.openxmlformats.org/drawingml/2006/main" uniqueId="urn:microsoft.com/office/officeart/2005/8/quickstyle/simple1">
+  <dgm:title val=""/>
+  <dgm:desc val=""/>
+  <dgm:catLst>
+    <dgm:cat type="simple" pri="10100"/>
+  </dgm:catLst>
+  <dgm:scene3d>
+    <a:camera prst="orthographicFront"/>
+    <a:lightRig rig="threePt" dir="t"/>
+  </dgm:scene3d>
+  <dgm:styleLbl name="node0">
+    <dgm:scene3d>
+      <a:camera prst="orthographicFront"/>
+      <a:lightRig rig="threePt" dir="t"/>
+    </dgm:scene3d>
+    <dgm:sp3d/>
+    <dgm:txPr/>
+    <dgm:style>
+      <a:lnRef idx="2">
+        <a:scrgbClr r="0" g="0" b="0"/>
+      </a:lnRef>
+      <a:fillRef idx="1">
+        <a:scrgbClr r="0" g="0" b="0"/>
+      </a:fillRef>
+      <a:effectRef idx="0">
+        <a:scrgbClr r="0" g="0" b="0"/>
+      </a:effectRef>
+      <a:fontRef idx="minor">
+        <a:schemeClr val="lt1"/>
+      </a:fontRef>
+    </dgm:style>
+  </dgm:styleLbl>
+  <dgm:styleLbl name="lnNode1">
+    <dgm:scene3d>
+      <a:camera prst="orthographicFront"/>
+      <a:lightRig rig="threePt" dir="t"/>
+    </dgm:scene3d>
+    <dgm:sp3d/>
+    <dgm:txPr/>
+    <dgm:style>
+      <a:lnRef idx="2">
+        <a:scrgbClr r="0" g="0" b="0"/>
+      </a:lnRef>
+      <a:fillRef idx="1">
+        <a:scrgbClr r="0" g="0" b="0"/>
+      </a:fillRef>
+      <a:effectRef idx="0">
+        <a:scrgbClr r="0" g="0" b="0"/>
+      </a:effectRef>
+      <a:fontRef idx="minor">
+        <a:schemeClr val="lt1"/>
+      </a:fontRef>
+    </dgm:style>
+  </dgm:styleLbl>
+  <dgm:styleLbl name="vennNode1">
+    <dgm:scene3d>
+      <a:camera prst="orthographicFront"/>
+      <a:lightRig rig="threePt" dir="t"/>
+    </dgm:scene3d>
+    <dgm:sp3d/>
+    <dgm:txPr/>
+    <dgm:style>
+      <a:lnRef idx="2">
+        <a:scrgbClr r="0" g="0" b="0"/>
+      </a:lnRef>
+      <a:fillRef idx="1">
+        <a:scrgbClr r="0" g="0" b="0"/>
+      </a:fillRef>
+      <a:effectRef idx="0">
+        <a:scrgbClr r="0" g="0" b="0"/>
+      </a:effectRef>
+      <a:fontRef idx="minor">
+        <a:schemeClr val="tx1"/>
+      </a:fontRef>
+    </dgm:style>
+  </dgm:styleLbl>
+  <dgm:styleLbl name="alignNode1">
+    <dgm:scene3d>
+      <a:camera prst="orthographicFront"/>
+      <a:lightRig rig="threePt" dir="t"/>
+    </dgm:scene3d>
+    <dgm:sp3d/>
+    <dgm:txPr/>
+    <dgm:style>
+      <a:lnRef idx="2">
+        <a:scrgbClr r="0" g="0" b="0"/>
+      </a:lnRef>
+      <a:fillRef idx="1">
+        <a:scrgbClr r="0" g="0" b="0"/>
+      </a:fillRef>
+      <a:effectRef idx="0">
+        <a:scrgbClr r="0" g="0" b="0"/>
+      </a:effectRef>
+      <a:fontRef idx="minor">
+        <a:schemeClr val="lt1"/>
+      </a:fontRef>
+    </dgm:style>
+  </dgm:styleLbl>
+  <dgm:styleLbl name="node1">
+    <dgm:scene3d>
+      <a:camera prst="orthographicFront"/>
+      <a:lightRig rig="threePt" dir="t"/>
+    </dgm:scene3d>
+    <dgm:sp3d/>
+    <dgm:txPr/>
+    <dgm:style>
+      <a:lnRef idx="2">
+        <a:scrgbClr r="0" g="0" b="0"/>
+      </a:lnRef>
+      <a:fillRef idx="1">
+        <a:scrgbClr r="0" g="0" b="0"/>
+      </a:fillRef>
+      <a:effectRef idx="0">
+        <a:scrgbClr r="0" g="0" b="0"/>
+      </a:effectRef>
+      <a:fontRef idx="minor">
+        <a:schemeClr val="lt1"/>
+      </a:fontRef>
+    </dgm:style>
+  </dgm:styleLbl>
+  <dgm:styleLbl name="node2">
+    <dgm:scene3d>
+      <a:camera prst="orthographicFront"/>
+      <a:lightRig rig="threePt" dir="t"/>
+    </dgm:scene3d>
+    <dgm:sp3d/>
+    <dgm:txPr/>
+    <dgm:style>
+      <a:lnRef idx="2">
+        <a:scrgbClr r="0" g="0" b="0"/>
+      </a:lnRef>
+      <a:fillRef idx="1">
+        <a:scrgbClr r="0" g="0" b="0"/>
+      </a:fillRef>
+      <a:effectRef idx="0">
+        <a:scrgbClr r="0" g="0" b="0"/>
+      </a:effectRef>
+      <a:fontRef idx="minor">
+        <a:schemeClr val="lt1"/>
+      </a:fontRef>
+    </dgm:style>
+  </dgm:styleLbl>
+  <dgm:styleLbl name="node3">
+    <dgm:scene3d>
+      <a:camera prst="orthographicFront"/>
+      <a:lightRig rig="threePt" dir="t"/>
+    </dgm:scene3d>
+    <dgm:sp3d/>
+    <dgm:txPr/>
+    <dgm:style>
+      <a:lnRef idx="2">
+        <a:scrgbClr r="0" g="0" b="0"/>
+      </a:lnRef>
+      <a:fillRef idx="1">
+        <a:scrgbClr r="0" g="0" b="0"/>
+      </a:fillRef>
+      <a:effectRef idx="0">
+        <a:scrgbClr r="0" g="0" b="0"/>
+      </a:effectRef>
+      <a:fontRef idx="minor">
+        <a:schemeClr val="lt1"/>
+      </a:fontRef>
+    </dgm:style>
+  </dgm:styleLbl>
+  <dgm:styleLbl name="node4">
+    <dgm:scene3d>
+      <a:camera prst="orthographicFront"/>
+      <a:lightRig rig="threePt" dir="t"/>
+    </dgm:scene3d>
+    <dgm:sp3d/>
+    <dgm:txPr/>
+    <dgm:style>
+      <a:lnRef idx="2">
+        <a:scrgbClr r="0" g="0" b="0"/>
+      </a:lnRef>
+      <a:fillRef idx="1">
+        <a:scrgbClr r="0" g="0" b="0"/>
+      </a:fillRef>
+      <a:effectRef idx="0">
+        <a:scrgbClr r="0" g="0" b="0"/>
+      </a:effectRef>
+      <a:fontRef idx="minor">
+        <a:schemeClr val="lt1"/>
+      </a:fontRef>
+    </dgm:style>
+  </dgm:styleLbl>
+  <dgm:styleLbl name="fgImgPlace1">
+    <dgm:scene3d>
+      <a:camera prst="orthographicFront"/>
+      <a:lightRig rig="threePt" dir="t"/>
+    </dgm:scene3d>
+    <dgm:sp3d/>
+    <dgm:txPr/>
+    <dgm:style>
+      <a:lnRef idx="2">
+        <a:scrgbClr r="0" g="0" b="0"/>
+      </a:lnRef>
+      <a:fillRef idx="1">
+        <a:scrgbClr r="0" g="0" b="0"/>
+      </a:fillRef>
+      <a:effectRef idx="0">
+        <a:scrgbClr r="0" g="0" b="0"/>
+      </a:effectRef>
+      <a:fontRef idx="minor"/>
+    </dgm:style>
+  </dgm:styleLbl>
+  <dgm:styleLbl name="alignImgPlace1">
+    <dgm:scene3d>
+      <a:camera prst="orthographicFront"/>
+      <a:lightRig rig="threePt" dir="t"/>
+    </dgm:scene3d>
+    <dgm:sp3d/>
+    <dgm:txPr/>
+    <dgm:style>
+      <a:lnRef idx="2">
+        <a:scrgbClr r="0" g="0" b="0"/>
+      </a:lnRef>
+      <a:fillRef idx="1">
+        <a:scrgbClr r="0" g="0" b="0"/>
+      </a:fillRef>
+      <a:effectRef idx="0">
+        <a:scrgbClr r="0" g="0" b="0"/>
+      </a:effectRef>
+      <a:fontRef idx="minor"/>
+    </dgm:style>
+  </dgm:styleLbl>
+  <dgm:styleLbl name="bgImgPlace1">
+    <dgm:scene3d>
+      <a:camera prst="orthographicFront"/>
+      <a:lightRig rig="threePt" dir="t"/>
+    </dgm:scene3d>
+    <dgm:sp3d/>
+    <dgm:txPr/>
+    <dgm:style>
+      <a:lnRef idx="2">
+        <a:scrgbClr r="0" g="0" b="0"/>
+      </a:lnRef>
+      <a:fillRef idx="1">
+        <a:scrgbClr r="0" g="0" b="0"/>
+      </a:fillRef>
+      <a:effectRef idx="0">
+        <a:scrgbClr r="0" g="0" b="0"/>
+      </a:effectRef>
+      <a:fontRef idx="minor"/>
+    </dgm:style>
+  </dgm:styleLbl>
+  <dgm:styleLbl name="sibTrans2D1">
+    <dgm:scene3d>
+      <a:camera prst="orthographicFront"/>
+      <a:lightRig rig="threePt" dir="t"/>
+    </dgm:scene3d>
+    <dgm:sp3d/>
+    <dgm:txPr/>
+    <dgm:style>
+      <a:lnRef idx="0">
+        <a:scrgbClr r="0" g="0" b="0"/>
+      </a:lnRef>
+      <a:fillRef idx="1">
+        <a:scrgbClr r="0" g="0" b="0"/>
+      </a:fillRef>
+      <a:effectRef idx="0">
+        <a:scrgbClr r="0" g="0" b="0"/>
+      </a:effectRef>
+      <a:fontRef idx="minor">
+        <a:schemeClr val="lt1"/>
+      </a:fontRef>
+    </dgm:style>
+  </dgm:styleLbl>
+  <dgm:styleLbl name="fgSibTrans2D1">
+    <dgm:scene3d>
+      <a:camera prst="orthographicFront"/>
+      <a:lightRig rig="threePt" dir="t"/>
+    </dgm:scene3d>
+    <dgm:sp3d/>
+    <dgm:txPr/>
+    <dgm:style>
+      <a:lnRef idx="0">
+        <a:scrgbClr r="0" g="0" b="0"/>
+      </a:lnRef>
+      <a:fillRef idx="1">
+        <a:scrgbClr r="0" g="0" b="0"/>
+      </a:fillRef>
+      <a:effectRef idx="0">
+        <a:scrgbClr r="0" g="0" b="0"/>
+      </a:effectRef>
+      <a:fontRef idx="minor">
+        <a:schemeClr val="lt1"/>
+      </a:fontRef>
+    </dgm:style>
+  </dgm:styleLbl>
+  <dgm:styleLbl name="bgSibTrans2D1">
+    <dgm:scene3d>
+      <a:camera prst="orthographicFront"/>
+      <a:lightRig rig="threePt" dir="t"/>
+    </dgm:scene3d>
+    <dgm:sp3d/>
+    <dgm:txPr/>
+    <dgm:style>
+      <a:lnRef idx="0">
+        <a:scrgbClr r="0" g="0" b="0"/>
+      </a:lnRef>
+      <a:fillRef idx="1">
+        <a:scrgbClr r="0" g="0" b="0"/>
+      </a:fillRef>
+      <a:effectRef idx="0">
+        <a:scrgbClr r="0" g="0" b="0"/>
+      </a:effectRef>
+      <a:fontRef idx="minor">
+        <a:schemeClr val="lt1"/>
+      </a:fontRef>
+    </dgm:style>
+  </dgm:styleLbl>
+  <dgm:styleLbl name="sibTrans1D1">
+    <dgm:scene3d>
+      <a:camera prst="orthographicFront"/>
+      <a:lightRig rig="threePt" dir="t"/>
+    </dgm:scene3d>
+    <dgm:sp3d/>
+    <dgm:txPr/>
+    <dgm:style>
+      <a:lnRef idx="1">
+        <a:scrgbClr r="0" g="0" b="0"/>
+      </a:lnRef>
+      <a:fillRef idx="0">
+        <a:scrgbClr r="0" g="0" b="0"/>
+      </a:fillRef>
+      <a:effectRef idx="0">
+        <a:scrgbClr r="0" g="0" b="0"/>
+      </a:effectRef>
+      <a:fontRef idx="minor"/>
+    </dgm:style>
+  </dgm:styleLbl>
+  <dgm:styleLbl name="callout">
+    <dgm:scene3d>
+      <a:camera prst="orthographicFront"/>
+      <a:lightRig rig="threePt" dir="t"/>
+    </dgm:scene3d>
+    <dgm:sp3d/>
+    <dgm:txPr/>
+    <dgm:style>
+      <a:lnRef idx="2">
+        <a:scrgbClr r="0" g="0" b="0"/>
+      </a:lnRef>
+      <a:fillRef idx="1">
+        <a:scrgbClr r="0" g="0" b="0"/>
+      </a:fillRef>
+      <a:effectRef idx="0">
+        <a:scrgbClr r="0" g="0" b="0"/>
+      </a:effectRef>
+      <a:fontRef idx="minor"/>
+    </dgm:style>
+  </dgm:styleLbl>
+  <dgm:styleLbl name="asst0">
+    <dgm:scene3d>
+      <a:camera prst="orthographicFront"/>
+      <a:lightRig rig="threePt" dir="t"/>
+    </dgm:scene3d>
+    <dgm:sp3d/>
+    <dgm:txPr/>
+    <dgm:style>
+      <a:lnRef idx="2">
+        <a:scrgbClr r="0" g="0" b="0"/>
+      </a:lnRef>
+      <a:fillRef idx="1">
+        <a:scrgbClr r="0" g="0" b="0"/>
+      </a:fillRef>
+      <a:effectRef idx="0">
+        <a:scrgbClr r="0" g="0" b="0"/>
+      </a:effectRef>
+      <a:fontRef idx="minor">
+        <a:schemeClr val="lt1"/>
+      </a:fontRef>
+    </dgm:style>
+  </dgm:styleLbl>
+  <dgm:styleLbl name="asst1">
+    <dgm:scene3d>
+      <a:camera prst="orthographicFront"/>
+      <a:lightRig rig="threePt" dir="t"/>
+    </dgm:scene3d>
+    <dgm:sp3d/>
+    <dgm:txPr/>
+    <dgm:style>
+      <a:lnRef idx="2">
+        <a:scrgbClr r="0" g="0" b="0"/>
+      </a:lnRef>
+      <a:fillRef idx="1">
+        <a:scrgbClr r="0" g="0" b="0"/>
+      </a:fillRef>
+      <a:effectRef idx="0">
+        <a:scrgbClr r="0" g="0" b="0"/>
+      </a:effectRef>
+      <a:fontRef idx="minor">
+        <a:schemeClr val="lt1"/>
+      </a:fontRef>
+    </dgm:style>
+  </dgm:styleLbl>
+  <dgm:styleLbl name="asst2">
+    <dgm:scene3d>
+      <a:camera prst="orthographicFront"/>
+      <a:lightRig rig="threePt" dir="t"/>
+    </dgm:scene3d>
+    <dgm:sp3d/>
+    <dgm:txPr/>
+    <dgm:style>
+      <a:lnRef idx="2">
+        <a:scrgbClr r="0" g="0" b="0"/>
+      </a:lnRef>
+      <a:fillRef idx="1">
+        <a:scrgbClr r="0" g="0" b="0"/>
+      </a:fillRef>
+      <a:effectRef idx="0">
+        <a:scrgbClr r="0" g="0" b="0"/>
+      </a:effectRef>
+      <a:fontRef idx="minor">
+        <a:schemeClr val="lt1"/>
+      </a:fontRef>
+    </dgm:style>
+  </dgm:styleLbl>
+  <dgm:styleLbl name="asst3">
+    <dgm:scene3d>
+      <a:camera prst="orthographicFront"/>
+      <a:lightRig rig="threePt" dir="t"/>
+    </dgm:scene3d>
+    <dgm:sp3d/>
+    <dgm:txPr/>
+    <dgm:style>
+      <a:lnRef idx="2">
+        <a:scrgbClr r="0" g="0" b="0"/>
+      </a:lnRef>
+      <a:fillRef idx="1">
+        <a:scrgbClr r="0" g="0" b="0"/>
+      </a:fillRef>
+      <a:effectRef idx="0">
+        <a:scrgbClr r="0" g="0" b="0"/>
+      </a:effectRef>
+      <a:fontRef idx="minor">
+        <a:schemeClr val="lt1"/>
+      </a:fontRef>
+    </dgm:style>
+  </dgm:styleLbl>
+  <dgm:styleLbl name="asst4">
+    <dgm:scene3d>
+      <a:camera prst="orthographicFront"/>
+      <a:lightRig rig="threePt" dir="t"/>
+    </dgm:scene3d>
+    <dgm:sp3d/>
+    <dgm:txPr/>
+    <dgm:style>
+      <a:lnRef idx="2">
+        <a:scrgbClr r="0" g="0" b="0"/>
+      </a:lnRef>
+      <a:fillRef idx="1">
+        <a:scrgbClr r="0" g="0" b="0"/>
+      </a:fillRef>
+      <a:effectRef idx="0">
+        <a:scrgbClr r="0" g="0" b="0"/>
+      </a:effectRef>
+      <a:fontRef idx="minor">
+        <a:schemeClr val="lt1"/>
+      </a:fontRef>
+    </dgm:style>
+  </dgm:styleLbl>
+  <dgm:styleLbl name="parChTrans2D1">
+    <dgm:scene3d>
+      <a:camera prst="orthographicFront"/>
+      <a:lightRig rig="threePt" dir="t"/>
+    </dgm:scene3d>
+    <dgm:sp3d/>
+    <dgm:txPr/>
+    <dgm:style>
+      <a:lnRef idx="2">
+        <a:scrgbClr r="0" g="0" b="0"/>
+      </a:lnRef>
+      <a:fillRef idx="1">
+        <a:scrgbClr r="0" g="0" b="0"/>
+      </a:fillRef>
+      <a:effectRef idx="0">
+        <a:scrgbClr r="0" g="0" b="0"/>
+      </a:effectRef>
+      <a:fontRef idx="minor">
+        <a:schemeClr val="lt1"/>
+      </a:fontRef>
+    </dgm:style>
+  </dgm:styleLbl>
+  <dgm:styleLbl name="parChTrans2D2">
+    <dgm:scene3d>
+      <a:camera prst="orthographicFront"/>
+      <a:lightRig rig="threePt" dir="t"/>
+    </dgm:scene3d>
+    <dgm:sp3d/>
+    <dgm:txPr/>
+    <dgm:style>
+      <a:lnRef idx="2">
+        <a:scrgbClr r="0" g="0" b="0"/>
+      </a:lnRef>
+      <a:fillRef idx="1">
+        <a:scrgbClr r="0" g="0" b="0"/>
+      </a:fillRef>
+      <a:effectRef idx="0">
+        <a:scrgbClr r="0" g="0" b="0"/>
+      </a:effectRef>
+      <a:fontRef idx="minor">
+        <a:schemeClr val="lt1"/>
+      </a:fontRef>
+    </dgm:style>
+  </dgm:styleLbl>
+  <dgm:styleLbl name="parChTrans2D3">
+    <dgm:scene3d>
+      <a:camera prst="orthographicFront"/>
+      <a:lightRig rig="threePt" dir="t"/>
+    </dgm:scene3d>
+    <dgm:sp3d/>
+    <dgm:txPr/>
+    <dgm:style>
+      <a:lnRef idx="2">
+        <a:scrgbClr r="0" g="0" b="0"/>
+      </a:lnRef>
+      <a:fillRef idx="1">
+        <a:scrgbClr r="0" g="0" b="0"/>
+      </a:fillRef>
+      <a:effectRef idx="0">
+        <a:scrgbClr r="0" g="0" b="0"/>
+      </a:effectRef>
+      <a:fontRef idx="minor">
+        <a:schemeClr val="lt1"/>
+      </a:fontRef>
+    </dgm:style>
+  </dgm:styleLbl>
+  <dgm:styleLbl name="parChTrans2D4">
+    <dgm:scene3d>
+      <a:camera prst="orthographicFront"/>
+      <a:lightRig rig="threePt" dir="t"/>
+    </dgm:scene3d>
+    <dgm:sp3d/>
+    <dgm:txPr/>
+    <dgm:style>
+      <a:lnRef idx="2">
+        <a:scrgbClr r="0" g="0" b="0"/>
+      </a:lnRef>
+      <a:fillRef idx="1">
+        <a:scrgbClr r="0" g="0" b="0"/>
+      </a:fillRef>
+      <a:effectRef idx="0">
+        <a:scrgbClr r="0" g="0" b="0"/>
+      </a:effectRef>
+      <a:fontRef idx="minor">
+        <a:schemeClr val="lt1"/>
+      </a:fontRef>
+    </dgm:style>
+  </dgm:styleLbl>
+  <dgm:styleLbl name="parChTrans1D1">
+    <dgm:scene3d>
+      <a:camera prst="orthographicFront"/>
+      <a:lightRig rig="threePt" dir="t"/>
+    </dgm:scene3d>
+    <dgm:sp3d/>
+    <dgm:txPr/>
+    <dgm:style>
+      <a:lnRef idx="2">
+        <a:scrgbClr r="0" g="0" b="0"/>
+      </a:lnRef>
+      <a:fillRef idx="0">
+        <a:scrgbClr r="0" g="0" b="0"/>
+      </a:fillRef>
+      <a:effectRef idx="0">
+        <a:scrgbClr r="0" g="0" b="0"/>
+      </a:effectRef>
+      <a:fontRef idx="minor"/>
+    </dgm:style>
+  </dgm:styleLbl>
+  <dgm:styleLbl name="parChTrans1D2">
+    <dgm:scene3d>
+      <a:camera prst="orthographicFront"/>
+      <a:lightRig rig="threePt" dir="t"/>
+    </dgm:scene3d>
+    <dgm:sp3d/>
+    <dgm:txPr/>
+    <dgm:style>
+      <a:lnRef idx="2">
+        <a:scrgbClr r="0" g="0" b="0"/>
+      </a:lnRef>
+      <a:fillRef idx="0">
+        <a:scrgbClr r="0" g="0" b="0"/>
+      </a:fillRef>
+      <a:effectRef idx="0">
+        <a:scrgbClr r="0" g="0" b="0"/>
+      </a:effectRef>
+      <a:fontRef idx="minor"/>
+    </dgm:style>
+  </dgm:styleLbl>
+  <dgm:styleLbl name="parChTrans1D3">
+    <dgm:scene3d>
+      <a:camera prst="orthographicFront"/>
+      <a:lightRig rig="threePt" dir="t"/>
+    </dgm:scene3d>
+    <dgm:sp3d/>
+    <dgm:txPr/>
+    <dgm:style>
+      <a:lnRef idx="2">
+        <a:scrgbClr r="0" g="0" b="0"/>
+      </a:lnRef>
+      <a:fillRef idx="0">
+        <a:scrgbClr r="0" g="0" b="0"/>
+      </a:fillRef>
+      <a:effectRef idx="0">
+        <a:scrgbClr r="0" g="0" b="0"/>
+      </a:effectRef>
+      <a:fontRef idx="minor"/>
+    </dgm:style>
+  </dgm:styleLbl>
+  <dgm:styleLbl name="parChTrans1D4">
+    <dgm:scene3d>
+      <a:camera prst="orthographicFront"/>
+      <a:lightRig rig="threePt" dir="t"/>
+    </dgm:scene3d>
+    <dgm:sp3d/>
+    <dgm:txPr/>
+    <dgm:style>
+      <a:lnRef idx="2">
+        <a:scrgbClr r="0" g="0" b="0"/>
+      </a:lnRef>
+      <a:fillRef idx="0">
+        <a:scrgbClr r="0" g="0" b="0"/>
+      </a:fillRef>
+      <a:effectRef idx="0">
+        <a:scrgbClr r="0" g="0" b="0"/>
+      </a:effectRef>
+      <a:fontRef idx="minor"/>
+    </dgm:style>
+  </dgm:styleLbl>
+  <dgm:styleLbl name="fgAcc1">
+    <dgm:scene3d>
+      <a:camera prst="orthographicFront"/>
+      <a:lightRig rig="threePt" dir="t"/>
+    </dgm:scene3d>
+    <dgm:sp3d/>
+    <dgm:txPr/>
+    <dgm:style>
+      <a:lnRef idx="2">
+        <a:scrgbClr r="0" g="0" b="0"/>
+      </a:lnRef>
+      <a:fillRef idx="1">
+        <a:scrgbClr r="0" g="0" b="0"/>
+      </a:fillRef>
+      <a:effectRef idx="0">
+        <a:scrgbClr r="0" g="0" b="0"/>
+      </a:effectRef>
+      <a:fontRef idx="minor"/>
+    </dgm:style>
+  </dgm:styleLbl>
+  <dgm:styleLbl name="conFgAcc1">
+    <dgm:scene3d>
+      <a:camera prst="orthographicFront"/>
+      <a:lightRig rig="threePt" dir="t"/>
+    </dgm:scene3d>
+    <dgm:sp3d/>
+    <dgm:txPr/>
+    <dgm:style>
+      <a:lnRef idx="2">
+        <a:scrgbClr r="0" g="0" b="0"/>
+      </a:lnRef>
+      <a:fillRef idx="1">
+        <a:scrgbClr r="0" g="0" b="0"/>
+      </a:fillRef>
+      <a:effectRef idx="0">
+        <a:scrgbClr r="0" g="0" b="0"/>
+      </a:effectRef>
+      <a:fontRef idx="minor"/>
+    </dgm:style>
+  </dgm:styleLbl>
+  <dgm:styleLbl name="alignAcc1">
+    <dgm:scene3d>
+      <a:camera prst="orthographicFront"/>
+      <a:lightRig rig="threePt" dir="t"/>
+    </dgm:scene3d>
+    <dgm:sp3d/>
+    <dgm:txPr/>
+    <dgm:style>
+      <a:lnRef idx="2">
+        <a:scrgbClr r="0" g="0" b="0"/>
+      </a:lnRef>
+      <a:fillRef idx="1">
+        <a:scrgbClr r="0" g="0" b="0"/>
+      </a:fillRef>
+      <a:effectRef idx="0">
+        <a:scrgbClr r="0" g="0" b="0"/>
+      </a:effectRef>
+      <a:fontRef idx="minor"/>
+    </dgm:style>
+  </dgm:styleLbl>
+  <dgm:styleLbl name="trAlignAcc1">
+    <dgm:scene3d>
+      <a:camera prst="orthographicFront"/>
+      <a:lightRig rig="threePt" dir="t"/>
+    </dgm:scene3d>
+    <dgm:sp3d/>
+    <dgm:txPr/>
+    <dgm:style>
+      <a:lnRef idx="1">
+        <a:scrgbClr r="0" g="0" b="0"/>
+      </a:lnRef>
+      <a:fillRef idx="1">
+        <a:scrgbClr r="0" g="0" b="0"/>
+      </a:fillRef>
+      <a:effectRef idx="0">
+        <a:scrgbClr r="0" g="0" b="0"/>
+      </a:effectRef>
+      <a:fontRef idx="minor"/>
+    </dgm:style>
+  </dgm:styleLbl>
+  <dgm:styleLbl name="bgAcc1">
+    <dgm:scene3d>
+      <a:camera prst="orthographicFront"/>
+      <a:lightRig rig="threePt" dir="t"/>
+    </dgm:scene3d>
+    <dgm:sp3d/>
+    <dgm:txPr/>
+    <dgm:style>
+      <a:lnRef idx="2">
+        <a:scrgbClr r="0" g="0" b="0"/>
+      </a:lnRef>
+      <a:fillRef idx="1">
+        <a:scrgbClr r="0" g="0" b="0"/>
+      </a:fillRef>
+      <a:effectRef idx="0">
+        <a:scrgbClr r="0" g="0" b="0"/>
+      </a:effectRef>
+      <a:fontRef idx="minor"/>
+    </dgm:style>
+  </dgm:styleLbl>
+  <dgm:styleLbl name="solidFgAcc1">
+    <dgm:scene3d>
+      <a:camera prst="orthographicFront"/>
+      <a:lightRig rig="threePt" dir="t"/>
+    </dgm:scene3d>
+    <dgm:sp3d/>
+    <dgm:txPr/>
+    <dgm:style>
+      <a:lnRef idx="2">
+        <a:scrgbClr r="0" g="0" b="0"/>
+      </a:lnRef>
+      <a:fillRef idx="1">
+        <a:scrgbClr r="0" g="0" b="0"/>
+      </a:fillRef>
+      <a:effectRef idx="0">
+        <a:scrgbClr r="0" g="0" b="0"/>
+      </a:effectRef>
+      <a:fontRef idx="minor"/>
+    </dgm:style>
+  </dgm:styleLbl>
+  <dgm:styleLbl name="solidAlignAcc1">
+    <dgm:scene3d>
+      <a:camera prst="orthographicFront"/>
+      <a:lightRig rig="threePt" dir="t"/>
+    </dgm:scene3d>
+    <dgm:sp3d/>
+    <dgm:txPr/>
+    <dgm:style>
+      <a:lnRef idx="2">
+        <a:scrgbClr r="0" g="0" b="0"/>
+      </a:lnRef>
+      <a:fillRef idx="1">
+        <a:scrgbClr r="0" g="0" b="0"/>
+      </a:fillRef>
+      <a:effectRef idx="0">
+        <a:scrgbClr r="0" g="0" b="0"/>
+      </a:effectRef>
+      <a:fontRef idx="minor"/>
+    </dgm:style>
+  </dgm:styleLbl>
+  <dgm:styleLbl name="solidBgAcc1">
+    <dgm:scene3d>
+      <a:camera prst="orthographicFront"/>
+      <a:lightRig rig="threePt" dir="t"/>
+    </dgm:scene3d>
+    <dgm:sp3d/>
+    <dgm:txPr/>
+    <dgm:style>
+      <a:lnRef idx="2">
+        <a:scrgbClr r="0" g="0" b="0"/>
+      </a:lnRef>
+      <a:fillRef idx="1">
+        <a:scrgbClr r="0" g="0" b="0"/>
+      </a:fillRef>
+      <a:effectRef idx="0">
+        <a:scrgbClr r="0" g="0" b="0"/>
+      </a:effectRef>
+      <a:fontRef idx="minor"/>
+    </dgm:style>
+  </dgm:styleLbl>
+  <dgm:styleLbl name="fgAccFollowNode1">
+    <dgm:scene3d>
+      <a:camera prst="orthographicFront"/>
+      <a:lightRig rig="threePt" dir="t"/>
+    </dgm:scene3d>
+    <dgm:sp3d/>
+    <dgm:txPr/>
+    <dgm:style>
+      <a:lnRef idx="2">
+        <a:scrgbClr r="0" g="0" b="0"/>
+      </a:lnRef>
+      <a:fillRef idx="1">
+        <a:scrgbClr r="0" g="0" b="0"/>
+      </a:fillRef>
+      <a:effectRef idx="0">
+        <a:scrgbClr r="0" g="0" b="0"/>
+      </a:effectRef>
+      <a:fontRef idx="minor"/>
+    </dgm:style>
+  </dgm:styleLbl>
+  <dgm:styleLbl name="alignAccFollowNode1">
+    <dgm:scene3d>
+      <a:camera prst="orthographicFront"/>
+      <a:lightRig rig="threePt" dir="t"/>
+    </dgm:scene3d>
+    <dgm:sp3d/>
+    <dgm:txPr/>
+    <dgm:style>
+      <a:lnRef idx="2">
+        <a:scrgbClr r="0" g="0" b="0"/>
+      </a:lnRef>
+      <a:fillRef idx="1">
+        <a:scrgbClr r="0" g="0" b="0"/>
+      </a:fillRef>
+      <a:effectRef idx="0">
+        <a:scrgbClr r="0" g="0" b="0"/>
+      </a:effectRef>
+      <a:fontRef idx="minor"/>
+    </dgm:style>
+  </dgm:styleLbl>
+  <dgm:styleLbl name="bgAccFollowNode1">
+    <dgm:scene3d>
+      <a:camera prst="orthographicFront"/>
+      <a:lightRig rig="threePt" dir="t"/>
+    </dgm:scene3d>
+    <dgm:sp3d/>
+    <dgm:txPr/>
+    <dgm:style>
+      <a:lnRef idx="2">
+        <a:scrgbClr r="0" g="0" b="0"/>
+      </a:lnRef>
+      <a:fillRef idx="1">
+        <a:scrgbClr r="0" g="0" b="0"/>
+      </a:fillRef>
+      <a:effectRef idx="0">
+        <a:scrgbClr r="0" g="0" b="0"/>
+      </a:effectRef>
+      <a:fontRef idx="minor"/>
+    </dgm:style>
+  </dgm:styleLbl>
+  <dgm:styleLbl name="fgAcc0">
+    <dgm:scene3d>
+      <a:camera prst="orthographicFront"/>
+      <a:lightRig rig="threePt" dir="t"/>
+    </dgm:scene3d>
+    <dgm:sp3d/>
+    <dgm:txPr/>
+    <dgm:style>
+      <a:lnRef idx="2">
+        <a:scrgbClr r="0" g="0" b="0"/>
+      </a:lnRef>
+      <a:fillRef idx="1">
+        <a:scrgbClr r="0" g="0" b="0"/>
+      </a:fillRef>
+      <a:effectRef idx="0">
+        <a:scrgbClr r="0" g="0" b="0"/>
+      </a:effectRef>
+      <a:fontRef idx="minor"/>
+    </dgm:style>
+  </dgm:styleLbl>
+  <dgm:styleLbl name="fgAcc2">
+    <dgm:scene3d>
+      <a:camera prst="orthographicFront"/>
+      <a:lightRig rig="threePt" dir="t"/>
+    </dgm:scene3d>
+    <dgm:sp3d/>
+    <dgm:txPr/>
+    <dgm:style>
+      <a:lnRef idx="2">
+        <a:scrgbClr r="0" g="0" b="0"/>
+      </a:lnRef>
+      <a:fillRef idx="1">
+        <a:scrgbClr r="0" g="0" b="0"/>
+      </a:fillRef>
+      <a:effectRef idx="0">
+        <a:scrgbClr r="0" g="0" b="0"/>
+      </a:effectRef>
+      <a:fontRef idx="minor"/>
+    </dgm:style>
+  </dgm:styleLbl>
+  <dgm:styleLbl name="fgAcc3">
+    <dgm:scene3d>
+      <a:camera prst="orthographicFront"/>
+      <a:lightRig rig="threePt" dir="t"/>
+    </dgm:scene3d>
+    <dgm:sp3d/>
+    <dgm:txPr/>
+    <dgm:style>
+      <a:lnRef idx="2">
+        <a:scrgbClr r="0" g="0" b="0"/>
+      </a:lnRef>
+      <a:fillRef idx="1">
+        <a:scrgbClr r="0" g="0" b="0"/>
+      </a:fillRef>
+      <a:effectRef idx="0">
+        <a:scrgbClr r="0" g="0" b="0"/>
+      </a:effectRef>
+      <a:fontRef idx="minor"/>
+    </dgm:style>
+  </dgm:styleLbl>
+  <dgm:styleLbl name="fgAcc4">
+    <dgm:scene3d>
+      <a:camera prst="orthographicFront"/>
+      <a:lightRig rig="threePt" dir="t"/>
+    </dgm:scene3d>
+    <dgm:sp3d/>
+    <dgm:txPr/>
+    <dgm:style>
+      <a:lnRef idx="2">
+        <a:scrgbClr r="0" g="0" b="0"/>
+      </a:lnRef>
+      <a:fillRef idx="1">
+        <a:scrgbClr r="0" g="0" b="0"/>
+      </a:fillRef>
+      <a:effectRef idx="0">
+        <a:scrgbClr r="0" g="0" b="0"/>
+      </a:effectRef>
+      <a:fontRef idx="minor"/>
+    </dgm:style>
+  </dgm:styleLbl>
+  <dgm:styleLbl name="bgShp">
+    <dgm:scene3d>
+      <a:camera prst="orthographicFront"/>
+      <a:lightRig rig="threePt" dir="t"/>
+    </dgm:scene3d>
+    <dgm:sp3d/>
+    <dgm:txPr/>
+    <dgm:style>
+      <a:lnRef idx="0">
+        <a:scrgbClr r="0" g="0" b="0"/>
+      </a:lnRef>
+      <a:fillRef idx="1">
+        <a:scrgbClr r="0" g="0" b="0"/>
+      </a:fillRef>
+      <a:effectRef idx="0">
+        <a:scrgbClr r="0" g="0" b="0"/>
+      </a:effectRef>
+      <a:fontRef idx="minor"/>
+    </dgm:style>
+  </dgm:styleLbl>
+  <dgm:styleLbl name="dkBgShp">
+    <dgm:scene3d>
+      <a:camera prst="orthographicFront"/>
+      <a:lightRig rig="threePt" dir="t"/>
+    </dgm:scene3d>
+    <dgm:sp3d/>
+    <dgm:txPr/>
+    <dgm:style>
+      <a:lnRef idx="0">
+        <a:scrgbClr r="0" g="0" b="0"/>
+      </a:lnRef>
+      <a:fillRef idx="1">
+        <a:scrgbClr r="0" g="0" b="0"/>
+      </a:fillRef>
+      <a:effectRef idx="0">
+        <a:scrgbClr r="0" g="0" b="0"/>
+      </a:effectRef>
+      <a:fontRef idx="minor"/>
+    </dgm:style>
+  </dgm:styleLbl>
+  <dgm:styleLbl name="trBgShp">
+    <dgm:scene3d>
+      <a:camera prst="orthographicFront"/>
+      <a:lightRig rig="threePt" dir="t"/>
+    </dgm:scene3d>
+    <dgm:sp3d/>
+    <dgm:txPr/>
+    <dgm:style>
+      <a:lnRef idx="0">
+        <a:scrgbClr r="0" g="0" b="0"/>
+      </a:lnRef>
+      <a:fillRef idx="1">
+        <a:scrgbClr r="0" g="0" b="0"/>
+      </a:fillRef>
+      <a:effectRef idx="0">
+        <a:scrgbClr r="0" g="0" b="0"/>
+      </a:effectRef>
+      <a:fontRef idx="minor"/>
+    </dgm:style>
+  </dgm:styleLbl>
+  <dgm:styleLbl name="fgShp">
+    <dgm:scene3d>
+      <a:camera prst="orthographicFront"/>
+      <a:lightRig rig="threePt" dir="t"/>
+    </dgm:scene3d>
+    <dgm:sp3d/>
+    <dgm:txPr/>
+    <dgm:style>
+      <a:lnRef idx="2">
+        <a:scrgbClr r="0" g="0" b="0"/>
+      </a:lnRef>
+      <a:fillRef idx="1">
+        <a:scrgbClr r="0" g="0" b="0"/>
+      </a:fillRef>
+      <a:effectRef idx="0">
+        <a:scrgbClr r="0" g="0" b="0"/>
+      </a:effectRef>
+      <a:fontRef idx="minor"/>
+    </dgm:style>
+  </dgm:styleLbl>
+  <dgm:styleLbl name="revTx">
+    <dgm:scene3d>
+      <a:camera prst="orthographicFront"/>
+      <a:lightRig rig="threePt" dir="t"/>
+    </dgm:scene3d>
+    <dgm:sp3d/>
+    <dgm:txPr/>
+    <dgm:style>
+      <a:lnRef idx="0">
+        <a:scrgbClr r="0" g="0" b="0"/>
+      </a:lnRef>
+      <a:fillRef idx="0">
+        <a:scrgbClr r="0" g="0" b="0"/>
+      </a:fillRef>
+      <a:effectRef idx="0">
+        <a:scrgbClr r="0" g="0" b="0"/>
+      </a:effectRef>
+      <a:fontRef idx="minor"/>
+    </dgm:style>
+  </dgm:styleLbl>
+</dgm:styleDef>
+</file>
+
 <file path=ppt/handoutMasters/handoutMaster1.xml><?xml version="1.0" encoding="utf-8"?>
 <p:handoutMaster xmlns:a="http://schemas.openxmlformats.org/drawingml/2006/main" xmlns:r="http://schemas.openxmlformats.org/officeDocument/2006/relationships" xmlns:p="http://schemas.openxmlformats.org/presentationml/2006/main">
   <p:cSld>
@@ -215,7 +3152,7 @@
           <a:p>
             <a:fld id="{312E7B4A-039C-48A2-9B2C-AF16AA3873D8}" type="datetimeFigureOut">
               <a:rPr lang="en-US" smtClean="0"/>
-              <a:t>1/19/2015</a:t>
+              <a:t>1/20/2015</a:t>
             </a:fld>
             <a:endParaRPr lang="en-US"/>
           </a:p>
@@ -380,7 +3317,7 @@
           <a:p>
             <a:fld id="{DA005A0C-54D9-45AA-87D4-C551D08DFCE1}" type="datetimeFigureOut">
               <a:rPr lang="en-US" smtClean="0"/>
-              <a:t>1/19/2015</a:t>
+              <a:t>1/20/2015</a:t>
             </a:fld>
             <a:endParaRPr lang="en-US"/>
           </a:p>
@@ -1147,6 +4084,142 @@
     <p:extLst>
       <p:ext uri="{BB962C8B-B14F-4D97-AF65-F5344CB8AC3E}">
         <p14:creationId xmlns:p14="http://schemas.microsoft.com/office/powerpoint/2010/main" val="2798586617"/>
+      </p:ext>
+    </p:extLst>
+  </p:cSld>
+  <p:clrMapOvr>
+    <a:masterClrMapping/>
+  </p:clrMapOvr>
+</p:notes>
+</file>
+
+<file path=ppt/notesSlides/notesSlide6.xml><?xml version="1.0" encoding="utf-8"?>
+<p:notes xmlns:a="http://schemas.openxmlformats.org/drawingml/2006/main" xmlns:r="http://schemas.openxmlformats.org/officeDocument/2006/relationships" xmlns:p="http://schemas.openxmlformats.org/presentationml/2006/main">
+  <p:cSld>
+    <p:spTree>
+      <p:nvGrpSpPr>
+        <p:cNvPr id="1" name=""/>
+        <p:cNvGrpSpPr/>
+        <p:nvPr/>
+      </p:nvGrpSpPr>
+      <p:grpSpPr>
+        <a:xfrm>
+          <a:off x="0" y="0"/>
+          <a:ext cx="0" cy="0"/>
+          <a:chOff x="0" y="0"/>
+          <a:chExt cx="0" cy="0"/>
+        </a:xfrm>
+      </p:grpSpPr>
+      <p:sp>
+        <p:nvSpPr>
+          <p:cNvPr id="2" name="Slide Image Placeholder 1"/>
+          <p:cNvSpPr>
+            <a:spLocks noGrp="1" noRot="1" noChangeAspect="1"/>
+          </p:cNvSpPr>
+          <p:nvPr>
+            <p:ph type="sldImg"/>
+          </p:nvPr>
+        </p:nvSpPr>
+        <p:spPr/>
+      </p:sp>
+      <p:sp>
+        <p:nvSpPr>
+          <p:cNvPr id="3" name="Notes Placeholder 2"/>
+          <p:cNvSpPr>
+            <a:spLocks noGrp="1"/>
+          </p:cNvSpPr>
+          <p:nvPr>
+            <p:ph type="body" idx="1"/>
+          </p:nvPr>
+        </p:nvSpPr>
+        <p:spPr/>
+        <p:txBody>
+          <a:bodyPr/>
+          <a:lstStyle/>
+          <a:p>
+            <a:r>
+              <a:rPr lang="en-US" dirty="0" smtClean="0"/>
+              <a:t>01cModelBinders</a:t>
+            </a:r>
+          </a:p>
+          <a:p>
+            <a:r>
+              <a:rPr lang="en-US" dirty="0" smtClean="0"/>
+              <a:t>/</a:t>
+            </a:r>
+            <a:r>
+              <a:rPr lang="en-US" dirty="0" err="1" smtClean="0"/>
+              <a:t>api</a:t>
+            </a:r>
+            <a:r>
+              <a:rPr lang="en-US" dirty="0" smtClean="0"/>
+              <a:t>/vectors/</a:t>
+            </a:r>
+            <a:r>
+              <a:rPr lang="en-US" dirty="0" err="1" smtClean="0"/>
+              <a:t>nobinding</a:t>
+            </a:r>
+            <a:r>
+              <a:rPr lang="en-US" dirty="0" smtClean="0"/>
+              <a:t> requires for data (</a:t>
+            </a:r>
+            <a:r>
+              <a:rPr lang="en-US" dirty="0" err="1" smtClean="0"/>
+              <a:t>Origin.X</a:t>
+            </a:r>
+            <a:r>
+              <a:rPr lang="en-US" dirty="0" smtClean="0"/>
+              <a:t>, etc.) </a:t>
+            </a:r>
+          </a:p>
+          <a:p>
+            <a:r>
+              <a:rPr lang="en-US" dirty="0" smtClean="0"/>
+              <a:t>/</a:t>
+            </a:r>
+            <a:r>
+              <a:rPr lang="en-US" dirty="0" err="1" smtClean="0"/>
+              <a:t>api</a:t>
+            </a:r>
+            <a:r>
+              <a:rPr lang="en-US" dirty="0" smtClean="0"/>
+              <a:t>/vectors/binding can take a ?vector=1|2|3|4|5|6</a:t>
+            </a:r>
+            <a:r>
+              <a:rPr lang="en-US" baseline="0" dirty="0" smtClean="0"/>
+              <a:t> post</a:t>
+            </a:r>
+            <a:endParaRPr lang="en-US" dirty="0"/>
+          </a:p>
+        </p:txBody>
+      </p:sp>
+      <p:sp>
+        <p:nvSpPr>
+          <p:cNvPr id="4" name="Slide Number Placeholder 3"/>
+          <p:cNvSpPr>
+            <a:spLocks noGrp="1"/>
+          </p:cNvSpPr>
+          <p:nvPr>
+            <p:ph type="sldNum" sz="quarter" idx="10"/>
+          </p:nvPr>
+        </p:nvSpPr>
+        <p:spPr/>
+        <p:txBody>
+          <a:bodyPr/>
+          <a:lstStyle/>
+          <a:p>
+            <a:fld id="{4CFD207A-07DF-40AD-A916-9872E089CE7A}" type="slidenum">
+              <a:rPr lang="en-US" smtClean="0"/>
+              <a:t>11</a:t>
+            </a:fld>
+            <a:endParaRPr lang="en-US"/>
+          </a:p>
+        </p:txBody>
+      </p:sp>
+    </p:spTree>
+    <p:extLst>
+      <p:ext uri="{BB962C8B-B14F-4D97-AF65-F5344CB8AC3E}">
+        <p14:creationId xmlns:p14="http://schemas.microsoft.com/office/powerpoint/2010/main" val="805771091"/>
       </p:ext>
     </p:extLst>
   </p:cSld>
@@ -3928,15 +7001,7 @@
             <a:pPr marL="914400" indent="-914400"/>
             <a:r>
               <a:rPr lang="en-US" dirty="0" smtClean="0"/>
-              <a:t>06 </a:t>
-            </a:r>
-            <a:r>
-              <a:rPr lang="en-US" dirty="0" smtClean="0"/>
-              <a:t>| </a:t>
-            </a:r>
-            <a:r>
-              <a:rPr lang="en-US" dirty="0" smtClean="0"/>
-              <a:t>Advanced Design</a:t>
+              <a:t>06 | Advanced Design</a:t>
             </a:r>
             <a:endParaRPr lang="en-US" dirty="0"/>
           </a:p>
@@ -4030,12 +7095,12 @@
       </p:grpSpPr>
       <p:sp>
         <p:nvSpPr>
-          <p:cNvPr id="5" name="Text Placeholder 4"/>
+          <p:cNvPr id="2" name="Title 1"/>
           <p:cNvSpPr>
             <a:spLocks noGrp="1"/>
           </p:cNvSpPr>
           <p:nvPr>
-            <p:ph type="body" sz="quarter" idx="10"/>
+            <p:ph type="title"/>
           </p:nvPr>
         </p:nvSpPr>
         <p:spPr/>
@@ -4045,7 +7110,7 @@
           <a:p>
             <a:r>
               <a:rPr lang="en-US" dirty="0" smtClean="0"/>
-              <a:t>Versioning</a:t>
+              <a:t>Model-Binding</a:t>
             </a:r>
             <a:endParaRPr lang="en-US" dirty="0"/>
           </a:p>
@@ -4053,12 +7118,12 @@
       </p:sp>
       <p:sp>
         <p:nvSpPr>
-          <p:cNvPr id="4" name="Subtitle 3"/>
+          <p:cNvPr id="3" name="Content Placeholder 2"/>
           <p:cNvSpPr>
             <a:spLocks noGrp="1"/>
           </p:cNvSpPr>
           <p:nvPr>
-            <p:ph type="subTitle" idx="1"/>
+            <p:ph sz="quarter" idx="10"/>
           </p:nvPr>
         </p:nvSpPr>
         <p:spPr/>
@@ -4068,16 +7133,55 @@
           <a:p>
             <a:r>
               <a:rPr lang="en-US" dirty="0" smtClean="0"/>
-              <a:t>Wait? You mean your APIs get updates?</a:t>
-            </a:r>
-            <a:endParaRPr lang="en-US" dirty="0"/>
+              <a:t>More specific solution than type conversion</a:t>
+            </a:r>
+          </a:p>
+          <a:p>
+            <a:r>
+              <a:rPr lang="en-US" dirty="0" smtClean="0"/>
+              <a:t>Access to the HTTP Context and actions</a:t>
+            </a:r>
+          </a:p>
+          <a:p>
+            <a:r>
+              <a:rPr lang="en-US" dirty="0" smtClean="0"/>
+              <a:t>Can apply to parameter, type, or register a provider</a:t>
+            </a:r>
+          </a:p>
+          <a:p>
+            <a:r>
+              <a:rPr lang="en-US" dirty="0" smtClean="0"/>
+              <a:t>Implement </a:t>
+            </a:r>
+            <a:r>
+              <a:rPr lang="en-US" dirty="0" err="1" smtClean="0"/>
+              <a:t>IModelBinder</a:t>
+            </a:r>
+            <a:endParaRPr lang="en-US" dirty="0" smtClean="0"/>
+          </a:p>
+          <a:p>
+            <a:r>
+              <a:rPr lang="en-US" dirty="0" err="1" smtClean="0"/>
+              <a:t>BindModel</a:t>
+            </a:r>
+            <a:r>
+              <a:rPr lang="en-US" dirty="0" smtClean="0"/>
+              <a:t> returns false if the model cannot be processed</a:t>
+            </a:r>
+            <a:endParaRPr lang="en-US" dirty="0" smtClean="0"/>
+          </a:p>
+          <a:p>
+            <a:endParaRPr lang="en-US" dirty="0" smtClean="0"/>
+          </a:p>
+          <a:p>
+            <a:endParaRPr lang="en-US" dirty="0" smtClean="0"/>
           </a:p>
         </p:txBody>
       </p:sp>
     </p:spTree>
     <p:extLst>
       <p:ext uri="{BB962C8B-B14F-4D97-AF65-F5344CB8AC3E}">
-        <p14:creationId xmlns:p14="http://schemas.microsoft.com/office/powerpoint/2010/main" val="704507945"/>
+        <p14:creationId xmlns:p14="http://schemas.microsoft.com/office/powerpoint/2010/main" val="2926174185"/>
       </p:ext>
     </p:extLst>
   </p:cSld>
@@ -4113,54 +7217,33 @@
       </p:grpSpPr>
       <p:sp>
         <p:nvSpPr>
-          <p:cNvPr id="5" name="Text Placeholder 4"/>
+          <p:cNvPr id="4" name="Title 3"/>
           <p:cNvSpPr>
             <a:spLocks noGrp="1"/>
           </p:cNvSpPr>
           <p:nvPr>
-            <p:ph type="body" sz="quarter" idx="10"/>
+            <p:ph type="title"/>
           </p:nvPr>
         </p:nvSpPr>
         <p:spPr/>
         <p:txBody>
-          <a:bodyPr/>
+          <a:bodyPr>
+            <a:normAutofit/>
+          </a:bodyPr>
           <a:lstStyle/>
           <a:p>
             <a:r>
-              <a:rPr lang="en-US" dirty="0" smtClean="0"/>
-              <a:t>Azure API Services</a:t>
-            </a:r>
-            <a:endParaRPr lang="en-US" dirty="0"/>
-          </a:p>
-        </p:txBody>
-      </p:sp>
-      <p:sp>
-        <p:nvSpPr>
-          <p:cNvPr id="4" name="Subtitle 3"/>
-          <p:cNvSpPr>
-            <a:spLocks noGrp="1"/>
-          </p:cNvSpPr>
-          <p:nvPr>
-            <p:ph type="subTitle" idx="1"/>
-          </p:nvPr>
-        </p:nvSpPr>
-        <p:spPr/>
-        <p:txBody>
-          <a:bodyPr/>
-          <a:lstStyle/>
-          <a:p>
-            <a:r>
-              <a:rPr lang="en-US" dirty="0" smtClean="0"/>
-              <a:t>Take your Web API to the cloud and beyond</a:t>
-            </a:r>
-            <a:endParaRPr lang="en-US" dirty="0"/>
+              <a:rPr lang="en-US" b="1" dirty="0" smtClean="0"/>
+              <a:t>Model-Binding</a:t>
+            </a:r>
+            <a:endParaRPr lang="en-US" b="1" dirty="0"/>
           </a:p>
         </p:txBody>
       </p:sp>
     </p:spTree>
     <p:extLst>
       <p:ext uri="{BB962C8B-B14F-4D97-AF65-F5344CB8AC3E}">
-        <p14:creationId xmlns:p14="http://schemas.microsoft.com/office/powerpoint/2010/main" val="3698693145"/>
+        <p14:creationId xmlns:p14="http://schemas.microsoft.com/office/powerpoint/2010/main" val="2151588490"/>
       </p:ext>
     </p:extLst>
   </p:cSld>
@@ -4211,6 +7294,418 @@
           <a:p>
             <a:r>
               <a:rPr lang="en-US" dirty="0" smtClean="0"/>
+              <a:t>Versioning</a:t>
+            </a:r>
+            <a:endParaRPr lang="en-US" dirty="0"/>
+          </a:p>
+        </p:txBody>
+      </p:sp>
+      <p:sp>
+        <p:nvSpPr>
+          <p:cNvPr id="4" name="Subtitle 3"/>
+          <p:cNvSpPr>
+            <a:spLocks noGrp="1"/>
+          </p:cNvSpPr>
+          <p:nvPr>
+            <p:ph type="subTitle" idx="1"/>
+          </p:nvPr>
+        </p:nvSpPr>
+        <p:spPr/>
+        <p:txBody>
+          <a:bodyPr/>
+          <a:lstStyle/>
+          <a:p>
+            <a:r>
+              <a:rPr lang="en-US" dirty="0" smtClean="0"/>
+              <a:t>Wait? You mean your APIs get updates?</a:t>
+            </a:r>
+            <a:endParaRPr lang="en-US" dirty="0"/>
+          </a:p>
+        </p:txBody>
+      </p:sp>
+    </p:spTree>
+    <p:extLst>
+      <p:ext uri="{BB962C8B-B14F-4D97-AF65-F5344CB8AC3E}">
+        <p14:creationId xmlns:p14="http://schemas.microsoft.com/office/powerpoint/2010/main" val="704507945"/>
+      </p:ext>
+    </p:extLst>
+  </p:cSld>
+  <p:clrMapOvr>
+    <a:masterClrMapping/>
+  </p:clrMapOvr>
+  <p:timing>
+    <p:tnLst>
+      <p:par>
+        <p:cTn id="1" dur="indefinite" restart="never" nodeType="tmRoot"/>
+      </p:par>
+    </p:tnLst>
+  </p:timing>
+</p:sld>
+</file>
+
+<file path=ppt/slides/slide13.xml><?xml version="1.0" encoding="utf-8"?>
+<p:sld xmlns:a="http://schemas.openxmlformats.org/drawingml/2006/main" xmlns:r="http://schemas.openxmlformats.org/officeDocument/2006/relationships" xmlns:p="http://schemas.openxmlformats.org/presentationml/2006/main">
+  <p:cSld>
+    <p:spTree>
+      <p:nvGrpSpPr>
+        <p:cNvPr id="1" name=""/>
+        <p:cNvGrpSpPr/>
+        <p:nvPr/>
+      </p:nvGrpSpPr>
+      <p:grpSpPr>
+        <a:xfrm>
+          <a:off x="0" y="0"/>
+          <a:ext cx="0" cy="0"/>
+          <a:chOff x="0" y="0"/>
+          <a:chExt cx="0" cy="0"/>
+        </a:xfrm>
+      </p:grpSpPr>
+      <p:sp>
+        <p:nvSpPr>
+          <p:cNvPr id="2" name="Title 1"/>
+          <p:cNvSpPr>
+            <a:spLocks noGrp="1"/>
+          </p:cNvSpPr>
+          <p:nvPr>
+            <p:ph type="title"/>
+          </p:nvPr>
+        </p:nvSpPr>
+        <p:spPr/>
+        <p:txBody>
+          <a:bodyPr/>
+          <a:lstStyle/>
+          <a:p>
+            <a:r>
+              <a:rPr lang="en-US" dirty="0" smtClean="0"/>
+              <a:t>Versioning</a:t>
+            </a:r>
+            <a:endParaRPr lang="en-US" dirty="0"/>
+          </a:p>
+        </p:txBody>
+      </p:sp>
+      <p:sp>
+        <p:nvSpPr>
+          <p:cNvPr id="3" name="Content Placeholder 2"/>
+          <p:cNvSpPr>
+            <a:spLocks noGrp="1"/>
+          </p:cNvSpPr>
+          <p:nvPr>
+            <p:ph sz="quarter" idx="10"/>
+          </p:nvPr>
+        </p:nvSpPr>
+        <p:spPr/>
+        <p:txBody>
+          <a:bodyPr/>
+          <a:lstStyle/>
+          <a:p>
+            <a:r>
+              <a:rPr lang="en-US" dirty="0" smtClean="0"/>
+              <a:t>Must-have feature for publicly consumed API</a:t>
+            </a:r>
+          </a:p>
+          <a:p>
+            <a:r>
+              <a:rPr lang="en-US" dirty="0" smtClean="0"/>
+              <a:t>Good to have feature even if it is internally consumed</a:t>
+            </a:r>
+          </a:p>
+          <a:p>
+            <a:r>
+              <a:rPr lang="en-US" dirty="0" smtClean="0"/>
+              <a:t>There is no one accepted standard, but several approaches that you can support: </a:t>
+            </a:r>
+          </a:p>
+          <a:p>
+            <a:pPr lvl="1"/>
+            <a:r>
+              <a:rPr lang="en-US" dirty="0" smtClean="0"/>
+              <a:t>Part of the path, i.e. /</a:t>
+            </a:r>
+            <a:r>
+              <a:rPr lang="en-US" dirty="0" err="1" smtClean="0"/>
+              <a:t>api</a:t>
+            </a:r>
+            <a:r>
+              <a:rPr lang="en-US" dirty="0" smtClean="0"/>
+              <a:t>/v1/versions </a:t>
+            </a:r>
+          </a:p>
+          <a:p>
+            <a:pPr lvl="1"/>
+            <a:r>
+              <a:rPr lang="en-US" dirty="0" smtClean="0"/>
+              <a:t>Parameter, i.e. /</a:t>
+            </a:r>
+            <a:r>
+              <a:rPr lang="en-US" dirty="0" err="1" smtClean="0"/>
+              <a:t>api</a:t>
+            </a:r>
+            <a:r>
+              <a:rPr lang="en-US" dirty="0" smtClean="0"/>
+              <a:t>/</a:t>
+            </a:r>
+            <a:r>
+              <a:rPr lang="en-US" dirty="0" err="1" smtClean="0"/>
+              <a:t>versions?version</a:t>
+            </a:r>
+            <a:r>
+              <a:rPr lang="en-US" dirty="0" smtClean="0"/>
+              <a:t>=v1 </a:t>
+            </a:r>
+          </a:p>
+          <a:p>
+            <a:pPr lvl="1"/>
+            <a:r>
+              <a:rPr lang="en-US" dirty="0" smtClean="0"/>
+              <a:t>Accept, i.e. application/v1+json or application/</a:t>
+            </a:r>
+            <a:r>
+              <a:rPr lang="en-US" dirty="0" err="1" smtClean="0"/>
+              <a:t>json;v</a:t>
+            </a:r>
+            <a:r>
+              <a:rPr lang="en-US" dirty="0" smtClean="0"/>
+              <a:t>=1</a:t>
+            </a:r>
+          </a:p>
+          <a:p>
+            <a:pPr lvl="1"/>
+            <a:r>
+              <a:rPr lang="en-US" dirty="0" smtClean="0"/>
+              <a:t>Request header, i.e. version 1.0  </a:t>
+            </a:r>
+            <a:endParaRPr lang="en-US" dirty="0" smtClean="0"/>
+          </a:p>
+          <a:p>
+            <a:endParaRPr lang="en-US" dirty="0" smtClean="0"/>
+          </a:p>
+          <a:p>
+            <a:endParaRPr lang="en-US" dirty="0" smtClean="0"/>
+          </a:p>
+        </p:txBody>
+      </p:sp>
+    </p:spTree>
+    <p:extLst>
+      <p:ext uri="{BB962C8B-B14F-4D97-AF65-F5344CB8AC3E}">
+        <p14:creationId xmlns:p14="http://schemas.microsoft.com/office/powerpoint/2010/main" val="4246098429"/>
+      </p:ext>
+    </p:extLst>
+  </p:cSld>
+  <p:clrMapOvr>
+    <a:masterClrMapping/>
+  </p:clrMapOvr>
+  <p:timing>
+    <p:tnLst>
+      <p:par>
+        <p:cTn id="1" dur="indefinite" restart="never" nodeType="tmRoot"/>
+      </p:par>
+    </p:tnLst>
+  </p:timing>
+</p:sld>
+</file>
+
+<file path=ppt/slides/slide14.xml><?xml version="1.0" encoding="utf-8"?>
+<p:sld xmlns:a="http://schemas.openxmlformats.org/drawingml/2006/main" xmlns:r="http://schemas.openxmlformats.org/officeDocument/2006/relationships" xmlns:p="http://schemas.openxmlformats.org/presentationml/2006/main">
+  <p:cSld>
+    <p:spTree>
+      <p:nvGrpSpPr>
+        <p:cNvPr id="1" name=""/>
+        <p:cNvGrpSpPr/>
+        <p:nvPr/>
+      </p:nvGrpSpPr>
+      <p:grpSpPr>
+        <a:xfrm>
+          <a:off x="0" y="0"/>
+          <a:ext cx="0" cy="0"/>
+          <a:chOff x="0" y="0"/>
+          <a:chExt cx="0" cy="0"/>
+        </a:xfrm>
+      </p:grpSpPr>
+      <p:sp>
+        <p:nvSpPr>
+          <p:cNvPr id="2" name="Title 1"/>
+          <p:cNvSpPr>
+            <a:spLocks noGrp="1"/>
+          </p:cNvSpPr>
+          <p:nvPr>
+            <p:ph type="title"/>
+          </p:nvPr>
+        </p:nvSpPr>
+        <p:spPr/>
+        <p:txBody>
+          <a:bodyPr/>
+          <a:lstStyle/>
+          <a:p>
+            <a:r>
+              <a:rPr lang="en-US" dirty="0" smtClean="0"/>
+              <a:t>Versioning Scenario</a:t>
+            </a:r>
+            <a:endParaRPr lang="en-US" dirty="0"/>
+          </a:p>
+        </p:txBody>
+      </p:sp>
+      <p:graphicFrame>
+        <p:nvGraphicFramePr>
+          <p:cNvPr id="5" name="Content Placeholder 4"/>
+          <p:cNvGraphicFramePr>
+            <a:graphicFrameLocks noGrp="1"/>
+          </p:cNvGraphicFramePr>
+          <p:nvPr>
+            <p:ph sz="quarter" idx="10"/>
+            <p:extLst>
+              <p:ext uri="{D42A27DB-BD31-4B8C-83A1-F6EECF244321}">
+                <p14:modId xmlns:p14="http://schemas.microsoft.com/office/powerpoint/2010/main" val="2694545990"/>
+              </p:ext>
+            </p:extLst>
+          </p:nvPr>
+        </p:nvGraphicFramePr>
+        <p:xfrm>
+          <a:off x="379413" y="1387475"/>
+          <a:ext cx="11525250" cy="5291138"/>
+        </p:xfrm>
+        <a:graphic>
+          <a:graphicData uri="http://schemas.openxmlformats.org/drawingml/2006/diagram">
+            <dgm:relIds xmlns:dgm="http://schemas.openxmlformats.org/drawingml/2006/diagram" xmlns:r="http://schemas.openxmlformats.org/officeDocument/2006/relationships" r:dm="rId2" r:lo="rId3" r:qs="rId4" r:cs="rId5"/>
+          </a:graphicData>
+        </a:graphic>
+      </p:graphicFrame>
+    </p:spTree>
+    <p:extLst>
+      <p:ext uri="{BB962C8B-B14F-4D97-AF65-F5344CB8AC3E}">
+        <p14:creationId xmlns:p14="http://schemas.microsoft.com/office/powerpoint/2010/main" val="464149572"/>
+      </p:ext>
+    </p:extLst>
+  </p:cSld>
+  <p:clrMapOvr>
+    <a:masterClrMapping/>
+  </p:clrMapOvr>
+  <p:timing>
+    <p:tnLst>
+      <p:par>
+        <p:cTn id="1" dur="indefinite" restart="never" nodeType="tmRoot"/>
+      </p:par>
+    </p:tnLst>
+  </p:timing>
+</p:sld>
+</file>
+
+<file path=ppt/slides/slide15.xml><?xml version="1.0" encoding="utf-8"?>
+<p:sld xmlns:a="http://schemas.openxmlformats.org/drawingml/2006/main" xmlns:r="http://schemas.openxmlformats.org/officeDocument/2006/relationships" xmlns:p="http://schemas.openxmlformats.org/presentationml/2006/main">
+  <p:cSld>
+    <p:spTree>
+      <p:nvGrpSpPr>
+        <p:cNvPr id="1" name=""/>
+        <p:cNvGrpSpPr/>
+        <p:nvPr/>
+      </p:nvGrpSpPr>
+      <p:grpSpPr>
+        <a:xfrm>
+          <a:off x="0" y="0"/>
+          <a:ext cx="0" cy="0"/>
+          <a:chOff x="0" y="0"/>
+          <a:chExt cx="0" cy="0"/>
+        </a:xfrm>
+      </p:grpSpPr>
+      <p:sp>
+        <p:nvSpPr>
+          <p:cNvPr id="5" name="Text Placeholder 4"/>
+          <p:cNvSpPr>
+            <a:spLocks noGrp="1"/>
+          </p:cNvSpPr>
+          <p:nvPr>
+            <p:ph type="body" sz="quarter" idx="10"/>
+          </p:nvPr>
+        </p:nvSpPr>
+        <p:spPr/>
+        <p:txBody>
+          <a:bodyPr/>
+          <a:lstStyle/>
+          <a:p>
+            <a:r>
+              <a:rPr lang="en-US" dirty="0" smtClean="0"/>
+              <a:t>Azure API Services</a:t>
+            </a:r>
+            <a:endParaRPr lang="en-US" dirty="0"/>
+          </a:p>
+        </p:txBody>
+      </p:sp>
+      <p:sp>
+        <p:nvSpPr>
+          <p:cNvPr id="4" name="Subtitle 3"/>
+          <p:cNvSpPr>
+            <a:spLocks noGrp="1"/>
+          </p:cNvSpPr>
+          <p:nvPr>
+            <p:ph type="subTitle" idx="1"/>
+          </p:nvPr>
+        </p:nvSpPr>
+        <p:spPr/>
+        <p:txBody>
+          <a:bodyPr/>
+          <a:lstStyle/>
+          <a:p>
+            <a:r>
+              <a:rPr lang="en-US" dirty="0" smtClean="0"/>
+              <a:t>Take your Web API to the cloud and beyond</a:t>
+            </a:r>
+            <a:endParaRPr lang="en-US" dirty="0"/>
+          </a:p>
+        </p:txBody>
+      </p:sp>
+    </p:spTree>
+    <p:extLst>
+      <p:ext uri="{BB962C8B-B14F-4D97-AF65-F5344CB8AC3E}">
+        <p14:creationId xmlns:p14="http://schemas.microsoft.com/office/powerpoint/2010/main" val="3698693145"/>
+      </p:ext>
+    </p:extLst>
+  </p:cSld>
+  <p:clrMapOvr>
+    <a:masterClrMapping/>
+  </p:clrMapOvr>
+  <p:timing>
+    <p:tnLst>
+      <p:par>
+        <p:cTn id="1" dur="indefinite" restart="never" nodeType="tmRoot"/>
+      </p:par>
+    </p:tnLst>
+  </p:timing>
+</p:sld>
+</file>
+
+<file path=ppt/slides/slide16.xml><?xml version="1.0" encoding="utf-8"?>
+<p:sld xmlns:a="http://schemas.openxmlformats.org/drawingml/2006/main" xmlns:r="http://schemas.openxmlformats.org/officeDocument/2006/relationships" xmlns:p="http://schemas.openxmlformats.org/presentationml/2006/main">
+  <p:cSld>
+    <p:spTree>
+      <p:nvGrpSpPr>
+        <p:cNvPr id="1" name=""/>
+        <p:cNvGrpSpPr/>
+        <p:nvPr/>
+      </p:nvGrpSpPr>
+      <p:grpSpPr>
+        <a:xfrm>
+          <a:off x="0" y="0"/>
+          <a:ext cx="0" cy="0"/>
+          <a:chOff x="0" y="0"/>
+          <a:chExt cx="0" cy="0"/>
+        </a:xfrm>
+      </p:grpSpPr>
+      <p:sp>
+        <p:nvSpPr>
+          <p:cNvPr id="5" name="Text Placeholder 4"/>
+          <p:cNvSpPr>
+            <a:spLocks noGrp="1"/>
+          </p:cNvSpPr>
+          <p:nvPr>
+            <p:ph type="body" sz="quarter" idx="10"/>
+          </p:nvPr>
+        </p:nvSpPr>
+        <p:spPr/>
+        <p:txBody>
+          <a:bodyPr/>
+          <a:lstStyle/>
+          <a:p>
+            <a:r>
+              <a:rPr lang="en-US" dirty="0" smtClean="0"/>
               <a:t>Conclusion</a:t>
             </a:r>
             <a:endParaRPr lang="en-US" dirty="0"/>
@@ -4260,7 +7755,7 @@
 </p:sld>
 </file>
 
-<file path=ppt/slides/slide13.xml><?xml version="1.0" encoding="utf-8"?>
+<file path=ppt/slides/slide17.xml><?xml version="1.0" encoding="utf-8"?>
 <p:sld xmlns:a="http://schemas.openxmlformats.org/drawingml/2006/main" xmlns:r="http://schemas.openxmlformats.org/officeDocument/2006/relationships" xmlns:p="http://schemas.openxmlformats.org/presentationml/2006/main">
   <p:cSld>
     <p:spTree>
@@ -4365,7 +7860,6 @@
               <a:rPr lang="en-GB" dirty="0" smtClean="0"/>
               <a:t>Conclusion</a:t>
             </a:r>
-            <a:endParaRPr lang="en-GB" dirty="0" smtClean="0"/>
           </a:p>
         </p:txBody>
       </p:sp>
@@ -4924,7 +8418,6 @@
               <a:rPr lang="en-US" dirty="0" smtClean="0"/>
               <a:t> to add for classes in another library</a:t>
             </a:r>
-            <a:endParaRPr lang="en-US" dirty="0" smtClean="0"/>
           </a:p>
           <a:p>
             <a:endParaRPr lang="en-US" dirty="0" smtClean="0"/>
@@ -5910,12 +9403,16 @@
 </file>
 
 <file path=customXml/item1.xml><?xml version="1.0" encoding="utf-8"?>
-<?mso-contentType ?>
-<FormTemplates xmlns="http://schemas.microsoft.com/sharepoint/v3/contenttype/forms">
-  <Display>DocumentLibraryForm</Display>
-  <Edit>DocumentLibraryForm</Edit>
-  <New>DocumentLibraryForm</New>
-</FormTemplates>
+<p:properties xmlns:p="http://schemas.microsoft.com/office/2006/metadata/properties" xmlns:xsi="http://www.w3.org/2001/XMLSchema-instance" xmlns:pc="http://schemas.microsoft.com/office/infopath/2007/PartnerControls">
+  <documentManagement>
+    <TaxCatchAll xmlns="230e9df3-be65-4c73-a93b-d1236ebd677e"/>
+    <PublishingExpirationDate xmlns="http://schemas.microsoft.com/sharepoint/v3" xsi:nil="true"/>
+    <PublishingStartDate xmlns="http://schemas.microsoft.com/sharepoint/v3" xsi:nil="true"/>
+    <TaxKeywordTaxHTField xmlns="230e9df3-be65-4c73-a93b-d1236ebd677e">
+      <Terms xmlns="http://schemas.microsoft.com/office/infopath/2007/PartnerControls"/>
+    </TaxKeywordTaxHTField>
+  </documentManagement>
+</p:properties>
 </file>
 
 <file path=customXml/item2.xml><?xml version="1.0" encoding="utf-8"?>
@@ -6101,22 +9598,28 @@
 </file>
 
 <file path=customXml/item3.xml><?xml version="1.0" encoding="utf-8"?>
-<p:properties xmlns:p="http://schemas.microsoft.com/office/2006/metadata/properties" xmlns:xsi="http://www.w3.org/2001/XMLSchema-instance" xmlns:pc="http://schemas.microsoft.com/office/infopath/2007/PartnerControls">
-  <documentManagement>
-    <TaxCatchAll xmlns="230e9df3-be65-4c73-a93b-d1236ebd677e"/>
-    <PublishingExpirationDate xmlns="http://schemas.microsoft.com/sharepoint/v3" xsi:nil="true"/>
-    <PublishingStartDate xmlns="http://schemas.microsoft.com/sharepoint/v3" xsi:nil="true"/>
-    <TaxKeywordTaxHTField xmlns="230e9df3-be65-4c73-a93b-d1236ebd677e">
-      <Terms xmlns="http://schemas.microsoft.com/office/infopath/2007/PartnerControls"/>
-    </TaxKeywordTaxHTField>
-  </documentManagement>
-</p:properties>
+<?mso-contentType ?>
+<FormTemplates xmlns="http://schemas.microsoft.com/sharepoint/v3/contenttype/forms">
+  <Display>DocumentLibraryForm</Display>
+  <Edit>DocumentLibraryForm</Edit>
+  <New>DocumentLibraryForm</New>
+</FormTemplates>
 </file>
 
 <file path=customXml/itemProps1.xml><?xml version="1.0" encoding="utf-8"?>
-<ds:datastoreItem xmlns:ds="http://schemas.openxmlformats.org/officeDocument/2006/customXml" ds:itemID="{B0CA13EC-1D3C-4D6F-8D1C-E8A452CFC79A}">
+<ds:datastoreItem xmlns:ds="http://schemas.openxmlformats.org/officeDocument/2006/customXml" ds:itemID="{7025FDD9-4C58-4084-9F89-0E6ADD6FFF55}">
   <ds:schemaRefs>
-    <ds:schemaRef ds:uri="http://schemas.microsoft.com/sharepoint/v3/contenttype/forms"/>
+    <ds:schemaRef ds:uri="27aa9422-7f1f-4c84-9cdf-302b1a67e513"/>
+    <ds:schemaRef ds:uri="http://schemas.microsoft.com/office/2006/documentManagement/types"/>
+    <ds:schemaRef ds:uri="http://schemas.microsoft.com/office/2006/metadata/properties"/>
+    <ds:schemaRef ds:uri="http://purl.org/dc/elements/1.1/"/>
+    <ds:schemaRef ds:uri="230e9df3-be65-4c73-a93b-d1236ebd677e"/>
+    <ds:schemaRef ds:uri="http://purl.org/dc/terms/"/>
+    <ds:schemaRef ds:uri="http://schemas.openxmlformats.org/package/2006/metadata/core-properties"/>
+    <ds:schemaRef ds:uri="http://purl.org/dc/dcmitype/"/>
+    <ds:schemaRef ds:uri="http://schemas.microsoft.com/office/infopath/2007/PartnerControls"/>
+    <ds:schemaRef ds:uri="http://schemas.microsoft.com/sharepoint/v3"/>
+    <ds:schemaRef ds:uri="http://www.w3.org/XML/1998/namespace"/>
   </ds:schemaRefs>
 </ds:datastoreItem>
 </file>
@@ -6142,19 +9645,9 @@
 </file>
 
 <file path=customXml/itemProps3.xml><?xml version="1.0" encoding="utf-8"?>
-<ds:datastoreItem xmlns:ds="http://schemas.openxmlformats.org/officeDocument/2006/customXml" ds:itemID="{7025FDD9-4C58-4084-9F89-0E6ADD6FFF55}">
+<ds:datastoreItem xmlns:ds="http://schemas.openxmlformats.org/officeDocument/2006/customXml" ds:itemID="{B0CA13EC-1D3C-4D6F-8D1C-E8A452CFC79A}">
   <ds:schemaRefs>
-    <ds:schemaRef ds:uri="27aa9422-7f1f-4c84-9cdf-302b1a67e513"/>
-    <ds:schemaRef ds:uri="http://schemas.microsoft.com/office/2006/documentManagement/types"/>
-    <ds:schemaRef ds:uri="http://schemas.microsoft.com/office/2006/metadata/properties"/>
-    <ds:schemaRef ds:uri="http://purl.org/dc/elements/1.1/"/>
-    <ds:schemaRef ds:uri="230e9df3-be65-4c73-a93b-d1236ebd677e"/>
-    <ds:schemaRef ds:uri="http://purl.org/dc/terms/"/>
-    <ds:schemaRef ds:uri="http://schemas.openxmlformats.org/package/2006/metadata/core-properties"/>
-    <ds:schemaRef ds:uri="http://purl.org/dc/dcmitype/"/>
-    <ds:schemaRef ds:uri="http://schemas.microsoft.com/office/infopath/2007/PartnerControls"/>
-    <ds:schemaRef ds:uri="http://schemas.microsoft.com/sharepoint/v3"/>
-    <ds:schemaRef ds:uri="http://www.w3.org/XML/1998/namespace"/>
+    <ds:schemaRef ds:uri="http://schemas.microsoft.com/sharepoint/v3/contenttype/forms"/>
   </ds:schemaRefs>
 </ds:datastoreItem>
 </file>
</xml_diff>

<commit_message>
Add versioning slides and demo
Versioning
</commit_message>
<xml_diff>
--- a/Slides/Module 6 - Web API Advanced Design.pptx
+++ b/Slides/Module 6 - Web API Advanced Design.pptx
@@ -5,10 +5,10 @@
     <p:sldMasterId id="2147483660" r:id="rId4"/>
   </p:sldMasterIdLst>
   <p:notesMasterIdLst>
-    <p:notesMasterId r:id="rId22"/>
+    <p:notesMasterId r:id="rId23"/>
   </p:notesMasterIdLst>
   <p:handoutMasterIdLst>
-    <p:handoutMasterId r:id="rId23"/>
+    <p:handoutMasterId r:id="rId24"/>
   </p:handoutMasterIdLst>
   <p:sldIdLst>
     <p:sldId id="277" r:id="rId5"/>
@@ -23,11 +23,12 @@
     <p:sldId id="313" r:id="rId14"/>
     <p:sldId id="314" r:id="rId15"/>
     <p:sldId id="300" r:id="rId16"/>
-    <p:sldId id="315" r:id="rId17"/>
-    <p:sldId id="316" r:id="rId18"/>
-    <p:sldId id="304" r:id="rId19"/>
-    <p:sldId id="309" r:id="rId20"/>
-    <p:sldId id="269" r:id="rId21"/>
+    <p:sldId id="316" r:id="rId17"/>
+    <p:sldId id="315" r:id="rId18"/>
+    <p:sldId id="317" r:id="rId19"/>
+    <p:sldId id="304" r:id="rId20"/>
+    <p:sldId id="309" r:id="rId21"/>
+    <p:sldId id="269" r:id="rId22"/>
   </p:sldIdLst>
   <p:sldSz cx="12192000" cy="6858000"/>
   <p:notesSz cx="6858000" cy="9144000"/>
@@ -1262,6 +1263,13 @@
         </dgm:presLayoutVars>
       </dgm:prSet>
       <dgm:spPr/>
+      <dgm:t>
+        <a:bodyPr/>
+        <a:lstStyle/>
+        <a:p>
+          <a:endParaRPr lang="en-US"/>
+        </a:p>
+      </dgm:t>
     </dgm:pt>
     <dgm:pt modelId="{847E7D6A-EE97-42E1-B39D-9807D90F4CCF}" type="pres">
       <dgm:prSet presAssocID="{72C84063-AED8-4516-A41E-E9BA8105F8E0}" presName="composite" presStyleCnt="0"/>
@@ -1275,6 +1283,13 @@
         </dgm:presLayoutVars>
       </dgm:prSet>
       <dgm:spPr/>
+      <dgm:t>
+        <a:bodyPr/>
+        <a:lstStyle/>
+        <a:p>
+          <a:endParaRPr lang="en-US"/>
+        </a:p>
+      </dgm:t>
     </dgm:pt>
     <dgm:pt modelId="{12A6C3CC-A67A-4A87-8F08-82220699C3B6}" type="pres">
       <dgm:prSet presAssocID="{72C84063-AED8-4516-A41E-E9BA8105F8E0}" presName="descendantText" presStyleLbl="alignAcc1" presStyleIdx="0" presStyleCnt="2">
@@ -1307,6 +1322,13 @@
         </dgm:presLayoutVars>
       </dgm:prSet>
       <dgm:spPr/>
+      <dgm:t>
+        <a:bodyPr/>
+        <a:lstStyle/>
+        <a:p>
+          <a:endParaRPr lang="en-US"/>
+        </a:p>
+      </dgm:t>
     </dgm:pt>
     <dgm:pt modelId="{8844029F-54BA-4378-83D4-32B76F91C629}" type="pres">
       <dgm:prSet presAssocID="{6E3AC7C8-84D4-4345-9DC4-4670CF41915F}" presName="descendantText" presStyleLbl="alignAcc1" presStyleIdx="1" presStyleCnt="2">
@@ -1325,23 +1347,23 @@
     </dgm:pt>
   </dgm:ptLst>
   <dgm:cxnLst>
+    <dgm:cxn modelId="{6FCB299F-A92E-45D1-B219-1CD8F43438E7}" srcId="{CB31AFBE-DAEA-44D5-8415-BC73F58EFA77}" destId="{6E3AC7C8-84D4-4345-9DC4-4670CF41915F}" srcOrd="1" destOrd="0" parTransId="{AFE49948-7CB5-4A4F-995A-8DC9489B91AE}" sibTransId="{B1503AE5-DE76-4B69-8549-6D13AE2AF633}"/>
     <dgm:cxn modelId="{10C96502-9343-42B3-827E-F0F98F88DF63}" srcId="{CB31AFBE-DAEA-44D5-8415-BC73F58EFA77}" destId="{72C84063-AED8-4516-A41E-E9BA8105F8E0}" srcOrd="0" destOrd="0" parTransId="{8778F2AB-B655-4817-A0FA-13313E2B11F6}" sibTransId="{25FB5F2D-6BE7-4F33-A184-61770FAC2072}"/>
     <dgm:cxn modelId="{CBBB2562-5E6D-4CBC-8C8F-4932580F61C2}" type="presOf" srcId="{72C84063-AED8-4516-A41E-E9BA8105F8E0}" destId="{F86DCCC1-BE8C-451F-8334-66E626EBC338}" srcOrd="0" destOrd="0" presId="urn:microsoft.com/office/officeart/2005/8/layout/chevron2"/>
-    <dgm:cxn modelId="{784EDBF9-BBE0-44D9-A097-58BBF6DD016E}" type="presOf" srcId="{6304A6C3-0030-488C-9EB8-9523AC3FA439}" destId="{8844029F-54BA-4378-83D4-32B76F91C629}" srcOrd="0" destOrd="1" presId="urn:microsoft.com/office/officeart/2005/8/layout/chevron2"/>
-    <dgm:cxn modelId="{BB680E5C-1D4A-4098-9074-292E209AAC7B}" type="presOf" srcId="{6E3AC7C8-84D4-4345-9DC4-4670CF41915F}" destId="{14F6DA88-C20D-4C32-A1B0-9E851A6032FD}" srcOrd="0" destOrd="0" presId="urn:microsoft.com/office/officeart/2005/8/layout/chevron2"/>
     <dgm:cxn modelId="{7ABB59F4-7ADF-4F03-91AD-B69416681851}" srcId="{6E3AC7C8-84D4-4345-9DC4-4670CF41915F}" destId="{685E302A-37A3-4F69-8822-B10C05F7AAC7}" srcOrd="2" destOrd="0" parTransId="{38F0F377-8DCB-4647-B9A7-094A0533C435}" sibTransId="{4CAF93E1-4506-4895-B3E0-A63EFC1350E3}"/>
-    <dgm:cxn modelId="{3F64204A-D17F-4C69-B3BF-577354AD226E}" srcId="{6E3AC7C8-84D4-4345-9DC4-4670CF41915F}" destId="{6304A6C3-0030-488C-9EB8-9523AC3FA439}" srcOrd="1" destOrd="0" parTransId="{EF85B223-4BD8-4EC0-B241-2E797A5C44D3}" sibTransId="{A793C610-6378-4B2D-AEA1-9870826A8165}"/>
-    <dgm:cxn modelId="{B3692F9F-E32E-497A-AF55-C60856ABB9FC}" type="presOf" srcId="{685E302A-37A3-4F69-8822-B10C05F7AAC7}" destId="{8844029F-54BA-4378-83D4-32B76F91C629}" srcOrd="0" destOrd="2" presId="urn:microsoft.com/office/officeart/2005/8/layout/chevron2"/>
-    <dgm:cxn modelId="{EBCF725E-D152-423F-A151-1467035856D5}" type="presOf" srcId="{83C22955-F503-4B08-B1B1-0767DF47FC63}" destId="{12A6C3CC-A67A-4A87-8F08-82220699C3B6}" srcOrd="0" destOrd="1" presId="urn:microsoft.com/office/officeart/2005/8/layout/chevron2"/>
-    <dgm:cxn modelId="{058A84C6-31CD-41A7-91B9-2A20AFEC0F9F}" type="presOf" srcId="{1BF9C2CD-BB22-4632-BE55-59449C52EDAB}" destId="{12A6C3CC-A67A-4A87-8F08-82220699C3B6}" srcOrd="0" destOrd="2" presId="urn:microsoft.com/office/officeart/2005/8/layout/chevron2"/>
-    <dgm:cxn modelId="{6FCB299F-A92E-45D1-B219-1CD8F43438E7}" srcId="{CB31AFBE-DAEA-44D5-8415-BC73F58EFA77}" destId="{6E3AC7C8-84D4-4345-9DC4-4670CF41915F}" srcOrd="1" destOrd="0" parTransId="{AFE49948-7CB5-4A4F-995A-8DC9489B91AE}" sibTransId="{B1503AE5-DE76-4B69-8549-6D13AE2AF633}"/>
-    <dgm:cxn modelId="{F0BCD62D-75DF-4400-9F94-7C50AA410FFE}" srcId="{72C84063-AED8-4516-A41E-E9BA8105F8E0}" destId="{83C22955-F503-4B08-B1B1-0767DF47FC63}" srcOrd="1" destOrd="0" parTransId="{9B075334-32AE-457A-8357-A77AE0DB2E97}" sibTransId="{207A4BBA-C58A-4720-805E-A2157F015FCC}"/>
     <dgm:cxn modelId="{AEF2EE8A-7CD1-4759-A943-03ED12C0638F}" type="presOf" srcId="{89DE63EF-B3C8-458D-B915-09BFE576A34F}" destId="{8844029F-54BA-4378-83D4-32B76F91C629}" srcOrd="0" destOrd="0" presId="urn:microsoft.com/office/officeart/2005/8/layout/chevron2"/>
-    <dgm:cxn modelId="{4305B82F-3B1E-490F-92D7-07768E42B250}" type="presOf" srcId="{CB31AFBE-DAEA-44D5-8415-BC73F58EFA77}" destId="{60BCFE6E-9155-4C21-A26A-328931E3A519}" srcOrd="0" destOrd="0" presId="urn:microsoft.com/office/officeart/2005/8/layout/chevron2"/>
     <dgm:cxn modelId="{4509158E-4B8E-4830-9B0E-A378DDDD3A58}" type="presOf" srcId="{49DE29FD-06D9-462D-9CE6-8FFF9CF17177}" destId="{12A6C3CC-A67A-4A87-8F08-82220699C3B6}" srcOrd="0" destOrd="0" presId="urn:microsoft.com/office/officeart/2005/8/layout/chevron2"/>
     <dgm:cxn modelId="{564E4A6D-5861-49EE-958D-8EBC0F233397}" srcId="{72C84063-AED8-4516-A41E-E9BA8105F8E0}" destId="{49DE29FD-06D9-462D-9CE6-8FFF9CF17177}" srcOrd="0" destOrd="0" parTransId="{284702D0-C566-4C67-9A52-8DEBBB05C0C2}" sibTransId="{A61F681B-9CC5-4335-985F-49C1CB5621B6}"/>
+    <dgm:cxn modelId="{BB680E5C-1D4A-4098-9074-292E209AAC7B}" type="presOf" srcId="{6E3AC7C8-84D4-4345-9DC4-4670CF41915F}" destId="{14F6DA88-C20D-4C32-A1B0-9E851A6032FD}" srcOrd="0" destOrd="0" presId="urn:microsoft.com/office/officeart/2005/8/layout/chevron2"/>
+    <dgm:cxn modelId="{058A84C6-31CD-41A7-91B9-2A20AFEC0F9F}" type="presOf" srcId="{1BF9C2CD-BB22-4632-BE55-59449C52EDAB}" destId="{12A6C3CC-A67A-4A87-8F08-82220699C3B6}" srcOrd="0" destOrd="2" presId="urn:microsoft.com/office/officeart/2005/8/layout/chevron2"/>
+    <dgm:cxn modelId="{622BC44A-4F29-44CB-B56F-7547A933BE37}" srcId="{72C84063-AED8-4516-A41E-E9BA8105F8E0}" destId="{1BF9C2CD-BB22-4632-BE55-59449C52EDAB}" srcOrd="2" destOrd="0" parTransId="{A6C499AD-4A33-4425-8622-F827F4D9DDAE}" sibTransId="{2E391214-7221-421A-89D0-8F3F671A512D}"/>
+    <dgm:cxn modelId="{EBCF725E-D152-423F-A151-1467035856D5}" type="presOf" srcId="{83C22955-F503-4B08-B1B1-0767DF47FC63}" destId="{12A6C3CC-A67A-4A87-8F08-82220699C3B6}" srcOrd="0" destOrd="1" presId="urn:microsoft.com/office/officeart/2005/8/layout/chevron2"/>
+    <dgm:cxn modelId="{4305B82F-3B1E-490F-92D7-07768E42B250}" type="presOf" srcId="{CB31AFBE-DAEA-44D5-8415-BC73F58EFA77}" destId="{60BCFE6E-9155-4C21-A26A-328931E3A519}" srcOrd="0" destOrd="0" presId="urn:microsoft.com/office/officeart/2005/8/layout/chevron2"/>
+    <dgm:cxn modelId="{784EDBF9-BBE0-44D9-A097-58BBF6DD016E}" type="presOf" srcId="{6304A6C3-0030-488C-9EB8-9523AC3FA439}" destId="{8844029F-54BA-4378-83D4-32B76F91C629}" srcOrd="0" destOrd="1" presId="urn:microsoft.com/office/officeart/2005/8/layout/chevron2"/>
     <dgm:cxn modelId="{7FF154F7-7BDA-464B-882A-5C30C0DCAFCA}" srcId="{6E3AC7C8-84D4-4345-9DC4-4670CF41915F}" destId="{89DE63EF-B3C8-458D-B915-09BFE576A34F}" srcOrd="0" destOrd="0" parTransId="{CF1D9192-744B-40CC-9BCE-E324E91D910A}" sibTransId="{9F8B87B9-8933-4E91-AB66-BB8BB1AD608D}"/>
-    <dgm:cxn modelId="{622BC44A-4F29-44CB-B56F-7547A933BE37}" srcId="{72C84063-AED8-4516-A41E-E9BA8105F8E0}" destId="{1BF9C2CD-BB22-4632-BE55-59449C52EDAB}" srcOrd="2" destOrd="0" parTransId="{A6C499AD-4A33-4425-8622-F827F4D9DDAE}" sibTransId="{2E391214-7221-421A-89D0-8F3F671A512D}"/>
+    <dgm:cxn modelId="{3F64204A-D17F-4C69-B3BF-577354AD226E}" srcId="{6E3AC7C8-84D4-4345-9DC4-4670CF41915F}" destId="{6304A6C3-0030-488C-9EB8-9523AC3FA439}" srcOrd="1" destOrd="0" parTransId="{EF85B223-4BD8-4EC0-B241-2E797A5C44D3}" sibTransId="{A793C610-6378-4B2D-AEA1-9870826A8165}"/>
+    <dgm:cxn modelId="{F0BCD62D-75DF-4400-9F94-7C50AA410FFE}" srcId="{72C84063-AED8-4516-A41E-E9BA8105F8E0}" destId="{83C22955-F503-4B08-B1B1-0767DF47FC63}" srcOrd="1" destOrd="0" parTransId="{9B075334-32AE-457A-8357-A77AE0DB2E97}" sibTransId="{207A4BBA-C58A-4720-805E-A2157F015FCC}"/>
+    <dgm:cxn modelId="{B3692F9F-E32E-497A-AF55-C60856ABB9FC}" type="presOf" srcId="{685E302A-37A3-4F69-8822-B10C05F7AAC7}" destId="{8844029F-54BA-4378-83D4-32B76F91C629}" srcOrd="0" destOrd="2" presId="urn:microsoft.com/office/officeart/2005/8/layout/chevron2"/>
     <dgm:cxn modelId="{B84EA5E4-12AD-41A2-9BB6-E9F448A880DF}" type="presParOf" srcId="{60BCFE6E-9155-4C21-A26A-328931E3A519}" destId="{847E7D6A-EE97-42E1-B39D-9807D90F4CCF}" srcOrd="0" destOrd="0" presId="urn:microsoft.com/office/officeart/2005/8/layout/chevron2"/>
     <dgm:cxn modelId="{EDCFE980-FA89-4C1A-A77C-CD1560413C15}" type="presParOf" srcId="{847E7D6A-EE97-42E1-B39D-9807D90F4CCF}" destId="{F86DCCC1-BE8C-451F-8334-66E626EBC338}" srcOrd="0" destOrd="0" presId="urn:microsoft.com/office/officeart/2005/8/layout/chevron2"/>
     <dgm:cxn modelId="{4E91F0C1-3985-4EE1-8B8F-089C606E3209}" type="presParOf" srcId="{847E7D6A-EE97-42E1-B39D-9807D90F4CCF}" destId="{12A6C3CC-A67A-4A87-8F08-82220699C3B6}" srcOrd="1" destOrd="0" presId="urn:microsoft.com/office/officeart/2005/8/layout/chevron2"/>
@@ -3152,7 +3174,7 @@
           <a:p>
             <a:fld id="{312E7B4A-039C-48A2-9B2C-AF16AA3873D8}" type="datetimeFigureOut">
               <a:rPr lang="en-US" smtClean="0"/>
-              <a:t>1/20/2015</a:t>
+              <a:t>1/22/2015</a:t>
             </a:fld>
             <a:endParaRPr lang="en-US"/>
           </a:p>
@@ -3317,7 +3339,7 @@
           <a:p>
             <a:fld id="{DA005A0C-54D9-45AA-87D4-C551D08DFCE1}" type="datetimeFigureOut">
               <a:rPr lang="en-US" smtClean="0"/>
-              <a:t>1/20/2015</a:t>
+              <a:t>1/22/2015</a:t>
             </a:fld>
             <a:endParaRPr lang="en-US"/>
           </a:p>
@@ -4220,6 +4242,97 @@
     <p:extLst>
       <p:ext uri="{BB962C8B-B14F-4D97-AF65-F5344CB8AC3E}">
         <p14:creationId xmlns:p14="http://schemas.microsoft.com/office/powerpoint/2010/main" val="805771091"/>
+      </p:ext>
+    </p:extLst>
+  </p:cSld>
+  <p:clrMapOvr>
+    <a:masterClrMapping/>
+  </p:clrMapOvr>
+</p:notes>
+</file>
+
+<file path=ppt/notesSlides/notesSlide7.xml><?xml version="1.0" encoding="utf-8"?>
+<p:notes xmlns:a="http://schemas.openxmlformats.org/drawingml/2006/main" xmlns:r="http://schemas.openxmlformats.org/officeDocument/2006/relationships" xmlns:p="http://schemas.openxmlformats.org/presentationml/2006/main">
+  <p:cSld>
+    <p:spTree>
+      <p:nvGrpSpPr>
+        <p:cNvPr id="1" name=""/>
+        <p:cNvGrpSpPr/>
+        <p:nvPr/>
+      </p:nvGrpSpPr>
+      <p:grpSpPr>
+        <a:xfrm>
+          <a:off x="0" y="0"/>
+          <a:ext cx="0" cy="0"/>
+          <a:chOff x="0" y="0"/>
+          <a:chExt cx="0" cy="0"/>
+        </a:xfrm>
+      </p:grpSpPr>
+      <p:sp>
+        <p:nvSpPr>
+          <p:cNvPr id="2" name="Slide Image Placeholder 1"/>
+          <p:cNvSpPr>
+            <a:spLocks noGrp="1" noRot="1" noChangeAspect="1"/>
+          </p:cNvSpPr>
+          <p:nvPr>
+            <p:ph type="sldImg"/>
+          </p:nvPr>
+        </p:nvSpPr>
+        <p:spPr/>
+      </p:sp>
+      <p:sp>
+        <p:nvSpPr>
+          <p:cNvPr id="3" name="Notes Placeholder 2"/>
+          <p:cNvSpPr>
+            <a:spLocks noGrp="1"/>
+          </p:cNvSpPr>
+          <p:nvPr>
+            <p:ph type="body" idx="1"/>
+          </p:nvPr>
+        </p:nvSpPr>
+        <p:spPr/>
+        <p:txBody>
+          <a:bodyPr/>
+          <a:lstStyle/>
+          <a:p>
+            <a:r>
+              <a:rPr lang="en-US" dirty="0" smtClean="0"/>
+              <a:t>06dVersioning – attribute based and non-attribute</a:t>
+            </a:r>
+            <a:endParaRPr lang="en-US" dirty="0" smtClean="0"/>
+          </a:p>
+          <a:p>
+            <a:endParaRPr lang="en-US" dirty="0"/>
+          </a:p>
+        </p:txBody>
+      </p:sp>
+      <p:sp>
+        <p:nvSpPr>
+          <p:cNvPr id="4" name="Slide Number Placeholder 3"/>
+          <p:cNvSpPr>
+            <a:spLocks noGrp="1"/>
+          </p:cNvSpPr>
+          <p:nvPr>
+            <p:ph type="sldNum" sz="quarter" idx="10"/>
+          </p:nvPr>
+        </p:nvSpPr>
+        <p:spPr/>
+        <p:txBody>
+          <a:bodyPr/>
+          <a:lstStyle/>
+          <a:p>
+            <a:fld id="{4CFD207A-07DF-40AD-A916-9872E089CE7A}" type="slidenum">
+              <a:rPr lang="en-US" smtClean="0"/>
+              <a:t>15</a:t>
+            </a:fld>
+            <a:endParaRPr lang="en-US"/>
+          </a:p>
+        </p:txBody>
+      </p:sp>
+    </p:spTree>
+    <p:extLst>
+      <p:ext uri="{BB962C8B-B14F-4D97-AF65-F5344CB8AC3E}">
+        <p14:creationId xmlns:p14="http://schemas.microsoft.com/office/powerpoint/2010/main" val="1713863422"/>
       </p:ext>
     </p:extLst>
   </p:cSld>
@@ -7168,7 +7281,6 @@
               <a:rPr lang="en-US" dirty="0" smtClean="0"/>
               <a:t> returns false if the model cannot be processed</a:t>
             </a:r>
-            <a:endParaRPr lang="en-US" dirty="0" smtClean="0"/>
           </a:p>
           <a:p>
             <a:endParaRPr lang="en-US" dirty="0" smtClean="0"/>
@@ -7377,117 +7489,41 @@
           <a:p>
             <a:r>
               <a:rPr lang="en-US" dirty="0" smtClean="0"/>
-              <a:t>Versioning</a:t>
+              <a:t>Versioning Scenario</a:t>
             </a:r>
             <a:endParaRPr lang="en-US" dirty="0"/>
           </a:p>
         </p:txBody>
       </p:sp>
-      <p:sp>
-        <p:nvSpPr>
-          <p:cNvPr id="3" name="Content Placeholder 2"/>
-          <p:cNvSpPr>
-            <a:spLocks noGrp="1"/>
-          </p:cNvSpPr>
+      <p:graphicFrame>
+        <p:nvGraphicFramePr>
+          <p:cNvPr id="5" name="Content Placeholder 4"/>
+          <p:cNvGraphicFramePr>
+            <a:graphicFrameLocks noGrp="1"/>
+          </p:cNvGraphicFramePr>
           <p:nvPr>
             <p:ph sz="quarter" idx="10"/>
+            <p:extLst>
+              <p:ext uri="{D42A27DB-BD31-4B8C-83A1-F6EECF244321}">
+                <p14:modId xmlns:p14="http://schemas.microsoft.com/office/powerpoint/2010/main" val="2694545990"/>
+              </p:ext>
+            </p:extLst>
           </p:nvPr>
-        </p:nvSpPr>
-        <p:spPr/>
-        <p:txBody>
-          <a:bodyPr/>
-          <a:lstStyle/>
-          <a:p>
-            <a:r>
-              <a:rPr lang="en-US" dirty="0" smtClean="0"/>
-              <a:t>Must-have feature for publicly consumed API</a:t>
-            </a:r>
-          </a:p>
-          <a:p>
-            <a:r>
-              <a:rPr lang="en-US" dirty="0" smtClean="0"/>
-              <a:t>Good to have feature even if it is internally consumed</a:t>
-            </a:r>
-          </a:p>
-          <a:p>
-            <a:r>
-              <a:rPr lang="en-US" dirty="0" smtClean="0"/>
-              <a:t>There is no one accepted standard, but several approaches that you can support: </a:t>
-            </a:r>
-          </a:p>
-          <a:p>
-            <a:pPr lvl="1"/>
-            <a:r>
-              <a:rPr lang="en-US" dirty="0" smtClean="0"/>
-              <a:t>Part of the path, i.e. /</a:t>
-            </a:r>
-            <a:r>
-              <a:rPr lang="en-US" dirty="0" err="1" smtClean="0"/>
-              <a:t>api</a:t>
-            </a:r>
-            <a:r>
-              <a:rPr lang="en-US" dirty="0" smtClean="0"/>
-              <a:t>/v1/versions </a:t>
-            </a:r>
-          </a:p>
-          <a:p>
-            <a:pPr lvl="1"/>
-            <a:r>
-              <a:rPr lang="en-US" dirty="0" smtClean="0"/>
-              <a:t>Parameter, i.e. /</a:t>
-            </a:r>
-            <a:r>
-              <a:rPr lang="en-US" dirty="0" err="1" smtClean="0"/>
-              <a:t>api</a:t>
-            </a:r>
-            <a:r>
-              <a:rPr lang="en-US" dirty="0" smtClean="0"/>
-              <a:t>/</a:t>
-            </a:r>
-            <a:r>
-              <a:rPr lang="en-US" dirty="0" err="1" smtClean="0"/>
-              <a:t>versions?version</a:t>
-            </a:r>
-            <a:r>
-              <a:rPr lang="en-US" dirty="0" smtClean="0"/>
-              <a:t>=v1 </a:t>
-            </a:r>
-          </a:p>
-          <a:p>
-            <a:pPr lvl="1"/>
-            <a:r>
-              <a:rPr lang="en-US" dirty="0" smtClean="0"/>
-              <a:t>Accept, i.e. application/v1+json or application/</a:t>
-            </a:r>
-            <a:r>
-              <a:rPr lang="en-US" dirty="0" err="1" smtClean="0"/>
-              <a:t>json;v</a:t>
-            </a:r>
-            <a:r>
-              <a:rPr lang="en-US" dirty="0" smtClean="0"/>
-              <a:t>=1</a:t>
-            </a:r>
-          </a:p>
-          <a:p>
-            <a:pPr lvl="1"/>
-            <a:r>
-              <a:rPr lang="en-US" dirty="0" smtClean="0"/>
-              <a:t>Request header, i.e. version 1.0  </a:t>
-            </a:r>
-            <a:endParaRPr lang="en-US" dirty="0" smtClean="0"/>
-          </a:p>
-          <a:p>
-            <a:endParaRPr lang="en-US" dirty="0" smtClean="0"/>
-          </a:p>
-          <a:p>
-            <a:endParaRPr lang="en-US" dirty="0" smtClean="0"/>
-          </a:p>
-        </p:txBody>
-      </p:sp>
+        </p:nvGraphicFramePr>
+        <p:xfrm>
+          <a:off x="379413" y="1387475"/>
+          <a:ext cx="11525250" cy="5291138"/>
+        </p:xfrm>
+        <a:graphic>
+          <a:graphicData uri="http://schemas.openxmlformats.org/drawingml/2006/diagram">
+            <dgm:relIds xmlns:dgm="http://schemas.openxmlformats.org/drawingml/2006/diagram" xmlns:r="http://schemas.openxmlformats.org/officeDocument/2006/relationships" r:dm="rId2" r:lo="rId3" r:qs="rId4" r:cs="rId5"/>
+          </a:graphicData>
+        </a:graphic>
+      </p:graphicFrame>
     </p:spTree>
     <p:extLst>
       <p:ext uri="{BB962C8B-B14F-4D97-AF65-F5344CB8AC3E}">
-        <p14:creationId xmlns:p14="http://schemas.microsoft.com/office/powerpoint/2010/main" val="4246098429"/>
+        <p14:creationId xmlns:p14="http://schemas.microsoft.com/office/powerpoint/2010/main" val="464149572"/>
       </p:ext>
     </p:extLst>
   </p:cSld>
@@ -7538,41 +7574,124 @@
           <a:p>
             <a:r>
               <a:rPr lang="en-US" dirty="0" smtClean="0"/>
-              <a:t>Versioning Scenario</a:t>
+              <a:t>Versioning</a:t>
             </a:r>
             <a:endParaRPr lang="en-US" dirty="0"/>
           </a:p>
         </p:txBody>
       </p:sp>
-      <p:graphicFrame>
-        <p:nvGraphicFramePr>
-          <p:cNvPr id="5" name="Content Placeholder 4"/>
-          <p:cNvGraphicFramePr>
-            <a:graphicFrameLocks noGrp="1"/>
-          </p:cNvGraphicFramePr>
+      <p:sp>
+        <p:nvSpPr>
+          <p:cNvPr id="3" name="Content Placeholder 2"/>
+          <p:cNvSpPr>
+            <a:spLocks noGrp="1"/>
+          </p:cNvSpPr>
           <p:nvPr>
             <p:ph sz="quarter" idx="10"/>
-            <p:extLst>
-              <p:ext uri="{D42A27DB-BD31-4B8C-83A1-F6EECF244321}">
-                <p14:modId xmlns:p14="http://schemas.microsoft.com/office/powerpoint/2010/main" val="2694545990"/>
-              </p:ext>
-            </p:extLst>
           </p:nvPr>
-        </p:nvGraphicFramePr>
-        <p:xfrm>
-          <a:off x="379413" y="1387475"/>
-          <a:ext cx="11525250" cy="5291138"/>
-        </p:xfrm>
-        <a:graphic>
-          <a:graphicData uri="http://schemas.openxmlformats.org/drawingml/2006/diagram">
-            <dgm:relIds xmlns:dgm="http://schemas.openxmlformats.org/drawingml/2006/diagram" xmlns:r="http://schemas.openxmlformats.org/officeDocument/2006/relationships" r:dm="rId2" r:lo="rId3" r:qs="rId4" r:cs="rId5"/>
-          </a:graphicData>
-        </a:graphic>
-      </p:graphicFrame>
+        </p:nvSpPr>
+        <p:spPr/>
+        <p:txBody>
+          <a:bodyPr/>
+          <a:lstStyle/>
+          <a:p>
+            <a:r>
+              <a:rPr lang="en-US" dirty="0" smtClean="0"/>
+              <a:t>Must-have feature for publicly consumed API</a:t>
+            </a:r>
+          </a:p>
+          <a:p>
+            <a:r>
+              <a:rPr lang="en-US" dirty="0" smtClean="0"/>
+              <a:t>Good to have feature even if it is internally consumed</a:t>
+            </a:r>
+          </a:p>
+          <a:p>
+            <a:r>
+              <a:rPr lang="en-US" dirty="0" smtClean="0"/>
+              <a:t>There is no one accepted standard, but several approaches that you can support: </a:t>
+            </a:r>
+          </a:p>
+          <a:p>
+            <a:pPr lvl="1"/>
+            <a:r>
+              <a:rPr lang="en-US" dirty="0" smtClean="0"/>
+              <a:t>Part of the path, i.e. /</a:t>
+            </a:r>
+            <a:r>
+              <a:rPr lang="en-US" dirty="0" err="1" smtClean="0"/>
+              <a:t>api</a:t>
+            </a:r>
+            <a:r>
+              <a:rPr lang="en-US" dirty="0" smtClean="0"/>
+              <a:t>/v1/versions </a:t>
+            </a:r>
+          </a:p>
+          <a:p>
+            <a:pPr lvl="1"/>
+            <a:r>
+              <a:rPr lang="en-US" dirty="0" smtClean="0"/>
+              <a:t>Parameter, i.e. /</a:t>
+            </a:r>
+            <a:r>
+              <a:rPr lang="en-US" dirty="0" err="1" smtClean="0"/>
+              <a:t>api</a:t>
+            </a:r>
+            <a:r>
+              <a:rPr lang="en-US" dirty="0" smtClean="0"/>
+              <a:t>/</a:t>
+            </a:r>
+            <a:r>
+              <a:rPr lang="en-US" dirty="0" err="1" smtClean="0"/>
+              <a:t>versions?version</a:t>
+            </a:r>
+            <a:r>
+              <a:rPr lang="en-US" dirty="0" smtClean="0"/>
+              <a:t>=v1 </a:t>
+            </a:r>
+          </a:p>
+          <a:p>
+            <a:pPr lvl="1"/>
+            <a:r>
+              <a:rPr lang="en-US" dirty="0" smtClean="0"/>
+              <a:t>Accept, i.e. application/v1+json or application/</a:t>
+            </a:r>
+            <a:r>
+              <a:rPr lang="en-US" dirty="0" err="1" smtClean="0"/>
+              <a:t>json;v</a:t>
+            </a:r>
+            <a:r>
+              <a:rPr lang="en-US" dirty="0" smtClean="0"/>
+              <a:t>=1</a:t>
+            </a:r>
+          </a:p>
+          <a:p>
+            <a:pPr lvl="1"/>
+            <a:r>
+              <a:rPr lang="en-US" dirty="0" smtClean="0"/>
+              <a:t>Request header, i.e. version 1.0  </a:t>
+            </a:r>
+            <a:endParaRPr lang="en-US" dirty="0" smtClean="0"/>
+          </a:p>
+          <a:p>
+            <a:r>
+              <a:rPr lang="en-US" dirty="0" smtClean="0"/>
+              <a:t>There are several approaches</a:t>
+            </a:r>
+            <a:endParaRPr lang="en-US" dirty="0" smtClean="0"/>
+          </a:p>
+          <a:p>
+            <a:endParaRPr lang="en-US" dirty="0" smtClean="0"/>
+          </a:p>
+          <a:p>
+            <a:endParaRPr lang="en-US" dirty="0" smtClean="0"/>
+          </a:p>
+        </p:txBody>
+      </p:sp>
     </p:spTree>
     <p:extLst>
       <p:ext uri="{BB962C8B-B14F-4D97-AF65-F5344CB8AC3E}">
-        <p14:creationId xmlns:p14="http://schemas.microsoft.com/office/powerpoint/2010/main" val="464149572"/>
+        <p14:creationId xmlns:p14="http://schemas.microsoft.com/office/powerpoint/2010/main" val="4246098429"/>
       </p:ext>
     </p:extLst>
   </p:cSld>
@@ -7608,54 +7727,33 @@
       </p:grpSpPr>
       <p:sp>
         <p:nvSpPr>
-          <p:cNvPr id="5" name="Text Placeholder 4"/>
+          <p:cNvPr id="4" name="Title 3"/>
           <p:cNvSpPr>
             <a:spLocks noGrp="1"/>
           </p:cNvSpPr>
           <p:nvPr>
-            <p:ph type="body" sz="quarter" idx="10"/>
+            <p:ph type="title"/>
           </p:nvPr>
         </p:nvSpPr>
         <p:spPr/>
         <p:txBody>
-          <a:bodyPr/>
+          <a:bodyPr>
+            <a:normAutofit/>
+          </a:bodyPr>
           <a:lstStyle/>
           <a:p>
             <a:r>
-              <a:rPr lang="en-US" dirty="0" smtClean="0"/>
-              <a:t>Azure API Services</a:t>
-            </a:r>
-            <a:endParaRPr lang="en-US" dirty="0"/>
-          </a:p>
-        </p:txBody>
-      </p:sp>
-      <p:sp>
-        <p:nvSpPr>
-          <p:cNvPr id="4" name="Subtitle 3"/>
-          <p:cNvSpPr>
-            <a:spLocks noGrp="1"/>
-          </p:cNvSpPr>
-          <p:nvPr>
-            <p:ph type="subTitle" idx="1"/>
-          </p:nvPr>
-        </p:nvSpPr>
-        <p:spPr/>
-        <p:txBody>
-          <a:bodyPr/>
-          <a:lstStyle/>
-          <a:p>
-            <a:r>
-              <a:rPr lang="en-US" dirty="0" smtClean="0"/>
-              <a:t>Take your Web API to the cloud and beyond</a:t>
-            </a:r>
-            <a:endParaRPr lang="en-US" dirty="0"/>
+              <a:rPr lang="en-US" b="1" dirty="0" smtClean="0"/>
+              <a:t>Versioning</a:t>
+            </a:r>
+            <a:endParaRPr lang="en-US" b="1" dirty="0"/>
           </a:p>
         </p:txBody>
       </p:sp>
     </p:spTree>
     <p:extLst>
       <p:ext uri="{BB962C8B-B14F-4D97-AF65-F5344CB8AC3E}">
-        <p14:creationId xmlns:p14="http://schemas.microsoft.com/office/powerpoint/2010/main" val="3698693145"/>
+        <p14:creationId xmlns:p14="http://schemas.microsoft.com/office/powerpoint/2010/main" val="816884382"/>
       </p:ext>
     </p:extLst>
   </p:cSld>
@@ -7706,6 +7804,89 @@
           <a:p>
             <a:r>
               <a:rPr lang="en-US" dirty="0" smtClean="0"/>
+              <a:t>Azure API Services</a:t>
+            </a:r>
+            <a:endParaRPr lang="en-US" dirty="0"/>
+          </a:p>
+        </p:txBody>
+      </p:sp>
+      <p:sp>
+        <p:nvSpPr>
+          <p:cNvPr id="4" name="Subtitle 3"/>
+          <p:cNvSpPr>
+            <a:spLocks noGrp="1"/>
+          </p:cNvSpPr>
+          <p:nvPr>
+            <p:ph type="subTitle" idx="1"/>
+          </p:nvPr>
+        </p:nvSpPr>
+        <p:spPr/>
+        <p:txBody>
+          <a:bodyPr/>
+          <a:lstStyle/>
+          <a:p>
+            <a:r>
+              <a:rPr lang="en-US" dirty="0" smtClean="0"/>
+              <a:t>Take your Web API to the cloud and beyond</a:t>
+            </a:r>
+            <a:endParaRPr lang="en-US" dirty="0"/>
+          </a:p>
+        </p:txBody>
+      </p:sp>
+    </p:spTree>
+    <p:extLst>
+      <p:ext uri="{BB962C8B-B14F-4D97-AF65-F5344CB8AC3E}">
+        <p14:creationId xmlns:p14="http://schemas.microsoft.com/office/powerpoint/2010/main" val="3698693145"/>
+      </p:ext>
+    </p:extLst>
+  </p:cSld>
+  <p:clrMapOvr>
+    <a:masterClrMapping/>
+  </p:clrMapOvr>
+  <p:timing>
+    <p:tnLst>
+      <p:par>
+        <p:cTn id="1" dur="indefinite" restart="never" nodeType="tmRoot"/>
+      </p:par>
+    </p:tnLst>
+  </p:timing>
+</p:sld>
+</file>
+
+<file path=ppt/slides/slide17.xml><?xml version="1.0" encoding="utf-8"?>
+<p:sld xmlns:a="http://schemas.openxmlformats.org/drawingml/2006/main" xmlns:r="http://schemas.openxmlformats.org/officeDocument/2006/relationships" xmlns:p="http://schemas.openxmlformats.org/presentationml/2006/main">
+  <p:cSld>
+    <p:spTree>
+      <p:nvGrpSpPr>
+        <p:cNvPr id="1" name=""/>
+        <p:cNvGrpSpPr/>
+        <p:nvPr/>
+      </p:nvGrpSpPr>
+      <p:grpSpPr>
+        <a:xfrm>
+          <a:off x="0" y="0"/>
+          <a:ext cx="0" cy="0"/>
+          <a:chOff x="0" y="0"/>
+          <a:chExt cx="0" cy="0"/>
+        </a:xfrm>
+      </p:grpSpPr>
+      <p:sp>
+        <p:nvSpPr>
+          <p:cNvPr id="5" name="Text Placeholder 4"/>
+          <p:cNvSpPr>
+            <a:spLocks noGrp="1"/>
+          </p:cNvSpPr>
+          <p:nvPr>
+            <p:ph type="body" sz="quarter" idx="10"/>
+          </p:nvPr>
+        </p:nvSpPr>
+        <p:spPr/>
+        <p:txBody>
+          <a:bodyPr/>
+          <a:lstStyle/>
+          <a:p>
+            <a:r>
+              <a:rPr lang="en-US" dirty="0" smtClean="0"/>
               <a:t>Conclusion</a:t>
             </a:r>
             <a:endParaRPr lang="en-US" dirty="0"/>
@@ -7755,7 +7936,7 @@
 </p:sld>
 </file>
 
-<file path=ppt/slides/slide17.xml><?xml version="1.0" encoding="utf-8"?>
+<file path=ppt/slides/slide18.xml><?xml version="1.0" encoding="utf-8"?>
 <p:sld xmlns:a="http://schemas.openxmlformats.org/drawingml/2006/main" xmlns:r="http://schemas.openxmlformats.org/officeDocument/2006/relationships" xmlns:p="http://schemas.openxmlformats.org/presentationml/2006/main">
   <p:cSld>
     <p:spTree>

</xml_diff>

<commit_message>
Azure API Management slides
Added Azure API Management slides
</commit_message>
<xml_diff>
--- a/Slides/Module 6 - Web API Advanced Design.pptx
+++ b/Slides/Module 6 - Web API Advanced Design.pptx
@@ -5,10 +5,10 @@
     <p:sldMasterId id="2147483660" r:id="rId4"/>
   </p:sldMasterIdLst>
   <p:notesMasterIdLst>
-    <p:notesMasterId r:id="rId23"/>
+    <p:notesMasterId r:id="rId28"/>
   </p:notesMasterIdLst>
   <p:handoutMasterIdLst>
-    <p:handoutMasterId r:id="rId24"/>
+    <p:handoutMasterId r:id="rId29"/>
   </p:handoutMasterIdLst>
   <p:sldIdLst>
     <p:sldId id="277" r:id="rId5"/>
@@ -27,8 +27,13 @@
     <p:sldId id="315" r:id="rId18"/>
     <p:sldId id="317" r:id="rId19"/>
     <p:sldId id="304" r:id="rId20"/>
-    <p:sldId id="309" r:id="rId21"/>
-    <p:sldId id="269" r:id="rId22"/>
+    <p:sldId id="318" r:id="rId21"/>
+    <p:sldId id="319" r:id="rId22"/>
+    <p:sldId id="320" r:id="rId23"/>
+    <p:sldId id="321" r:id="rId24"/>
+    <p:sldId id="309" r:id="rId25"/>
+    <p:sldId id="322" r:id="rId26"/>
+    <p:sldId id="269" r:id="rId27"/>
   </p:sldIdLst>
   <p:sldSz cx="12192000" cy="6858000"/>
   <p:notesSz cx="6858000" cy="9144000"/>
@@ -1390,414 +1395,6 @@
       <dsp:cNvGrpSpPr/>
     </dsp:nvGrpSpPr>
     <dsp:grpSpPr/>
-    <dsp:sp modelId="{F86DCCC1-BE8C-451F-8334-66E626EBC338}">
-      <dsp:nvSpPr>
-        <dsp:cNvPr id="0" name=""/>
-        <dsp:cNvSpPr/>
-      </dsp:nvSpPr>
-      <dsp:spPr>
-        <a:xfrm rot="5400000">
-          <a:off x="-417762" y="419231"/>
-          <a:ext cx="2785081" cy="1949556"/>
-        </a:xfrm>
-        <a:prstGeom prst="chevron">
-          <a:avLst/>
-        </a:prstGeom>
-        <a:solidFill>
-          <a:schemeClr val="accent3">
-            <a:hueOff val="0"/>
-            <a:satOff val="0"/>
-            <a:lumOff val="0"/>
-            <a:alphaOff val="0"/>
-          </a:schemeClr>
-        </a:solidFill>
-        <a:ln w="25400" cap="flat" cmpd="sng" algn="ctr">
-          <a:solidFill>
-            <a:schemeClr val="accent3">
-              <a:hueOff val="0"/>
-              <a:satOff val="0"/>
-              <a:lumOff val="0"/>
-              <a:alphaOff val="0"/>
-            </a:schemeClr>
-          </a:solidFill>
-          <a:prstDash val="solid"/>
-        </a:ln>
-        <a:effectLst/>
-      </dsp:spPr>
-      <dsp:style>
-        <a:lnRef idx="2">
-          <a:scrgbClr r="0" g="0" b="0"/>
-        </a:lnRef>
-        <a:fillRef idx="1">
-          <a:scrgbClr r="0" g="0" b="0"/>
-        </a:fillRef>
-        <a:effectRef idx="0">
-          <a:scrgbClr r="0" g="0" b="0"/>
-        </a:effectRef>
-        <a:fontRef idx="minor">
-          <a:schemeClr val="lt1"/>
-        </a:fontRef>
-      </dsp:style>
-      <dsp:txBody>
-        <a:bodyPr spcFirstLastPara="0" vert="horz" wrap="square" lIns="34290" tIns="34290" rIns="34290" bIns="34290" numCol="1" spcCol="1270" anchor="ctr" anchorCtr="0">
-          <a:noAutofit/>
-        </a:bodyPr>
-        <a:lstStyle/>
-        <a:p>
-          <a:pPr lvl="0" algn="ctr" defTabSz="2400300">
-            <a:lnSpc>
-              <a:spcPct val="90000"/>
-            </a:lnSpc>
-            <a:spcBef>
-              <a:spcPct val="0"/>
-            </a:spcBef>
-            <a:spcAft>
-              <a:spcPct val="35000"/>
-            </a:spcAft>
-          </a:pPr>
-          <a:r>
-            <a:rPr lang="en-US" sz="5400" kern="1200" dirty="0" smtClean="0"/>
-            <a:t>v1</a:t>
-          </a:r>
-          <a:endParaRPr lang="en-US" sz="5400" kern="1200" dirty="0"/>
-        </a:p>
-      </dsp:txBody>
-      <dsp:txXfrm rot="-5400000">
-        <a:off x="1" y="976246"/>
-        <a:ext cx="1949556" cy="835525"/>
-      </dsp:txXfrm>
-    </dsp:sp>
-    <dsp:sp modelId="{12A6C3CC-A67A-4A87-8F08-82220699C3B6}">
-      <dsp:nvSpPr>
-        <dsp:cNvPr id="0" name=""/>
-        <dsp:cNvSpPr/>
-      </dsp:nvSpPr>
-      <dsp:spPr>
-        <a:xfrm rot="5400000">
-          <a:off x="5832252" y="-3881225"/>
-          <a:ext cx="1810302" cy="9575693"/>
-        </a:xfrm>
-        <a:prstGeom prst="round2SameRect">
-          <a:avLst/>
-        </a:prstGeom>
-        <a:solidFill>
-          <a:schemeClr val="lt1">
-            <a:alpha val="90000"/>
-            <a:hueOff val="0"/>
-            <a:satOff val="0"/>
-            <a:lumOff val="0"/>
-            <a:alphaOff val="0"/>
-          </a:schemeClr>
-        </a:solidFill>
-        <a:ln w="25400" cap="flat" cmpd="sng" algn="ctr">
-          <a:solidFill>
-            <a:schemeClr val="accent3">
-              <a:hueOff val="0"/>
-              <a:satOff val="0"/>
-              <a:lumOff val="0"/>
-              <a:alphaOff val="0"/>
-            </a:schemeClr>
-          </a:solidFill>
-          <a:prstDash val="solid"/>
-        </a:ln>
-        <a:effectLst/>
-      </dsp:spPr>
-      <dsp:style>
-        <a:lnRef idx="2">
-          <a:scrgbClr r="0" g="0" b="0"/>
-        </a:lnRef>
-        <a:fillRef idx="1">
-          <a:scrgbClr r="0" g="0" b="0"/>
-        </a:fillRef>
-        <a:effectRef idx="0">
-          <a:scrgbClr r="0" g="0" b="0"/>
-        </a:effectRef>
-        <a:fontRef idx="minor"/>
-      </dsp:style>
-      <dsp:txBody>
-        <a:bodyPr spcFirstLastPara="0" vert="horz" wrap="square" lIns="206248" tIns="18415" rIns="18415" bIns="18415" numCol="1" spcCol="1270" anchor="ctr" anchorCtr="0">
-          <a:noAutofit/>
-        </a:bodyPr>
-        <a:lstStyle/>
-        <a:p>
-          <a:pPr marL="285750" lvl="1" indent="-285750" algn="l" defTabSz="1289050">
-            <a:lnSpc>
-              <a:spcPct val="90000"/>
-            </a:lnSpc>
-            <a:spcBef>
-              <a:spcPct val="0"/>
-            </a:spcBef>
-            <a:spcAft>
-              <a:spcPct val="15000"/>
-            </a:spcAft>
-            <a:buChar char="••"/>
-          </a:pPr>
-          <a:r>
-            <a:rPr lang="en-US" sz="2900" kern="1200" dirty="0" smtClean="0"/>
-            <a:t>You thought there would only be three types of dates</a:t>
-          </a:r>
-          <a:endParaRPr lang="en-US" sz="2900" kern="1200" dirty="0"/>
-        </a:p>
-        <a:p>
-          <a:pPr marL="285750" lvl="1" indent="-285750" algn="l" defTabSz="1289050">
-            <a:lnSpc>
-              <a:spcPct val="90000"/>
-            </a:lnSpc>
-            <a:spcBef>
-              <a:spcPct val="0"/>
-            </a:spcBef>
-            <a:spcAft>
-              <a:spcPct val="15000"/>
-            </a:spcAft>
-            <a:buChar char="••"/>
-          </a:pPr>
-          <a:r>
-            <a:rPr lang="en-US" sz="2900" kern="1200" dirty="0" smtClean="0"/>
-            <a:t>So you returned a single object </a:t>
-          </a:r>
-          <a:endParaRPr lang="en-US" sz="2900" kern="1200" dirty="0"/>
-        </a:p>
-        <a:p>
-          <a:pPr marL="285750" lvl="1" indent="-285750" algn="l" defTabSz="1289050">
-            <a:lnSpc>
-              <a:spcPct val="90000"/>
-            </a:lnSpc>
-            <a:spcBef>
-              <a:spcPct val="0"/>
-            </a:spcBef>
-            <a:spcAft>
-              <a:spcPct val="15000"/>
-            </a:spcAft>
-            <a:buChar char="••"/>
-          </a:pPr>
-          <a:r>
-            <a:rPr lang="en-US" sz="2900" kern="1200" dirty="0" smtClean="0"/>
-            <a:t>{ id, </a:t>
-          </a:r>
-          <a:r>
-            <a:rPr lang="en-US" sz="2900" kern="1200" dirty="0" err="1" smtClean="0"/>
-            <a:t>fooDate</a:t>
-          </a:r>
-          <a:r>
-            <a:rPr lang="en-US" sz="2900" kern="1200" dirty="0" smtClean="0"/>
-            <a:t>, </a:t>
-          </a:r>
-          <a:r>
-            <a:rPr lang="en-US" sz="2900" kern="1200" dirty="0" err="1" smtClean="0"/>
-            <a:t>barDate</a:t>
-          </a:r>
-          <a:r>
-            <a:rPr lang="en-US" sz="2900" kern="1200" dirty="0" smtClean="0"/>
-            <a:t>, </a:t>
-          </a:r>
-          <a:r>
-            <a:rPr lang="en-US" sz="2900" kern="1200" dirty="0" err="1" smtClean="0"/>
-            <a:t>widgetDate</a:t>
-          </a:r>
-          <a:r>
-            <a:rPr lang="en-US" sz="2900" kern="1200" dirty="0" smtClean="0"/>
-            <a:t> }</a:t>
-          </a:r>
-          <a:endParaRPr lang="en-US" sz="2900" kern="1200" dirty="0"/>
-        </a:p>
-      </dsp:txBody>
-      <dsp:txXfrm rot="-5400000">
-        <a:off x="1949557" y="89842"/>
-        <a:ext cx="9487321" cy="1633558"/>
-      </dsp:txXfrm>
-    </dsp:sp>
-    <dsp:sp modelId="{14F6DA88-C20D-4C32-A1B0-9E851A6032FD}">
-      <dsp:nvSpPr>
-        <dsp:cNvPr id="0" name=""/>
-        <dsp:cNvSpPr/>
-      </dsp:nvSpPr>
-      <dsp:spPr>
-        <a:xfrm rot="5400000">
-          <a:off x="-417762" y="2922349"/>
-          <a:ext cx="2785081" cy="1949556"/>
-        </a:xfrm>
-        <a:prstGeom prst="chevron">
-          <a:avLst/>
-        </a:prstGeom>
-        <a:solidFill>
-          <a:schemeClr val="accent3">
-            <a:hueOff val="11250264"/>
-            <a:satOff val="-16880"/>
-            <a:lumOff val="-2745"/>
-            <a:alphaOff val="0"/>
-          </a:schemeClr>
-        </a:solidFill>
-        <a:ln w="25400" cap="flat" cmpd="sng" algn="ctr">
-          <a:solidFill>
-            <a:schemeClr val="accent3">
-              <a:hueOff val="11250264"/>
-              <a:satOff val="-16880"/>
-              <a:lumOff val="-2745"/>
-              <a:alphaOff val="0"/>
-            </a:schemeClr>
-          </a:solidFill>
-          <a:prstDash val="solid"/>
-        </a:ln>
-        <a:effectLst/>
-      </dsp:spPr>
-      <dsp:style>
-        <a:lnRef idx="2">
-          <a:scrgbClr r="0" g="0" b="0"/>
-        </a:lnRef>
-        <a:fillRef idx="1">
-          <a:scrgbClr r="0" g="0" b="0"/>
-        </a:fillRef>
-        <a:effectRef idx="0">
-          <a:scrgbClr r="0" g="0" b="0"/>
-        </a:effectRef>
-        <a:fontRef idx="minor">
-          <a:schemeClr val="lt1"/>
-        </a:fontRef>
-      </dsp:style>
-      <dsp:txBody>
-        <a:bodyPr spcFirstLastPara="0" vert="horz" wrap="square" lIns="34290" tIns="34290" rIns="34290" bIns="34290" numCol="1" spcCol="1270" anchor="ctr" anchorCtr="0">
-          <a:noAutofit/>
-        </a:bodyPr>
-        <a:lstStyle/>
-        <a:p>
-          <a:pPr lvl="0" algn="ctr" defTabSz="2400300">
-            <a:lnSpc>
-              <a:spcPct val="90000"/>
-            </a:lnSpc>
-            <a:spcBef>
-              <a:spcPct val="0"/>
-            </a:spcBef>
-            <a:spcAft>
-              <a:spcPct val="35000"/>
-            </a:spcAft>
-          </a:pPr>
-          <a:r>
-            <a:rPr lang="en-US" sz="5400" kern="1200" dirty="0" smtClean="0"/>
-            <a:t>v2</a:t>
-          </a:r>
-          <a:endParaRPr lang="en-US" sz="5400" kern="1200" dirty="0"/>
-        </a:p>
-      </dsp:txBody>
-      <dsp:txXfrm rot="-5400000">
-        <a:off x="1" y="3479364"/>
-        <a:ext cx="1949556" cy="835525"/>
-      </dsp:txXfrm>
-    </dsp:sp>
-    <dsp:sp modelId="{8844029F-54BA-4378-83D4-32B76F91C629}">
-      <dsp:nvSpPr>
-        <dsp:cNvPr id="0" name=""/>
-        <dsp:cNvSpPr/>
-      </dsp:nvSpPr>
-      <dsp:spPr>
-        <a:xfrm rot="5400000">
-          <a:off x="5832252" y="-1378108"/>
-          <a:ext cx="1810302" cy="9575693"/>
-        </a:xfrm>
-        <a:prstGeom prst="round2SameRect">
-          <a:avLst/>
-        </a:prstGeom>
-        <a:solidFill>
-          <a:schemeClr val="lt1">
-            <a:alpha val="90000"/>
-            <a:hueOff val="0"/>
-            <a:satOff val="0"/>
-            <a:lumOff val="0"/>
-            <a:alphaOff val="0"/>
-          </a:schemeClr>
-        </a:solidFill>
-        <a:ln w="25400" cap="flat" cmpd="sng" algn="ctr">
-          <a:solidFill>
-            <a:schemeClr val="accent3">
-              <a:hueOff val="11250264"/>
-              <a:satOff val="-16880"/>
-              <a:lumOff val="-2745"/>
-              <a:alphaOff val="0"/>
-            </a:schemeClr>
-          </a:solidFill>
-          <a:prstDash val="solid"/>
-        </a:ln>
-        <a:effectLst/>
-      </dsp:spPr>
-      <dsp:style>
-        <a:lnRef idx="2">
-          <a:scrgbClr r="0" g="0" b="0"/>
-        </a:lnRef>
-        <a:fillRef idx="1">
-          <a:scrgbClr r="0" g="0" b="0"/>
-        </a:fillRef>
-        <a:effectRef idx="0">
-          <a:scrgbClr r="0" g="0" b="0"/>
-        </a:effectRef>
-        <a:fontRef idx="minor"/>
-      </dsp:style>
-      <dsp:txBody>
-        <a:bodyPr spcFirstLastPara="0" vert="horz" wrap="square" lIns="206248" tIns="18415" rIns="18415" bIns="18415" numCol="1" spcCol="1270" anchor="ctr" anchorCtr="0">
-          <a:noAutofit/>
-        </a:bodyPr>
-        <a:lstStyle/>
-        <a:p>
-          <a:pPr marL="285750" lvl="1" indent="-285750" algn="l" defTabSz="1289050">
-            <a:lnSpc>
-              <a:spcPct val="90000"/>
-            </a:lnSpc>
-            <a:spcBef>
-              <a:spcPct val="0"/>
-            </a:spcBef>
-            <a:spcAft>
-              <a:spcPct val="15000"/>
-            </a:spcAft>
-            <a:buChar char="••"/>
-          </a:pPr>
-          <a:r>
-            <a:rPr lang="en-US" sz="2900" kern="1200" dirty="0" smtClean="0"/>
-            <a:t>Things change (surprise!) and now you may have 1..n dates </a:t>
-          </a:r>
-          <a:endParaRPr lang="en-US" sz="2900" kern="1200" dirty="0"/>
-        </a:p>
-        <a:p>
-          <a:pPr marL="285750" lvl="1" indent="-285750" algn="l" defTabSz="1289050">
-            <a:lnSpc>
-              <a:spcPct val="90000"/>
-            </a:lnSpc>
-            <a:spcBef>
-              <a:spcPct val="0"/>
-            </a:spcBef>
-            <a:spcAft>
-              <a:spcPct val="15000"/>
-            </a:spcAft>
-            <a:buChar char="••"/>
-          </a:pPr>
-          <a:r>
-            <a:rPr lang="en-US" sz="2900" kern="1200" dirty="0" smtClean="0"/>
-            <a:t>So you return a set of rows instead with a date type</a:t>
-          </a:r>
-          <a:endParaRPr lang="en-US" sz="2900" kern="1200" dirty="0"/>
-        </a:p>
-        <a:p>
-          <a:pPr marL="285750" lvl="1" indent="-285750" algn="l" defTabSz="1289050">
-            <a:lnSpc>
-              <a:spcPct val="90000"/>
-            </a:lnSpc>
-            <a:spcBef>
-              <a:spcPct val="0"/>
-            </a:spcBef>
-            <a:spcAft>
-              <a:spcPct val="15000"/>
-            </a:spcAft>
-            <a:buChar char="••"/>
-          </a:pPr>
-          <a:r>
-            <a:rPr lang="en-US" sz="2900" kern="1200" dirty="0" smtClean="0"/>
-            <a:t>{id, type, date}</a:t>
-          </a:r>
-          <a:endParaRPr lang="en-US" sz="2900" kern="1200" dirty="0"/>
-        </a:p>
-      </dsp:txBody>
-      <dsp:txXfrm rot="-5400000">
-        <a:off x="1949557" y="2592959"/>
-        <a:ext cx="9487321" cy="1633558"/>
-      </dsp:txXfrm>
-    </dsp:sp>
   </dsp:spTree>
 </dsp:drawing>
 </file>
@@ -4299,7 +3896,6 @@
               <a:rPr lang="en-US" dirty="0" smtClean="0"/>
               <a:t>06dVersioning – attribute based and non-attribute</a:t>
             </a:r>
-            <a:endParaRPr lang="en-US" dirty="0" smtClean="0"/>
           </a:p>
           <a:p>
             <a:endParaRPr lang="en-US" dirty="0"/>
@@ -7671,14 +7267,12 @@
               <a:rPr lang="en-US" dirty="0" smtClean="0"/>
               <a:t>Request header, i.e. version 1.0  </a:t>
             </a:r>
-            <a:endParaRPr lang="en-US" dirty="0" smtClean="0"/>
           </a:p>
           <a:p>
             <a:r>
               <a:rPr lang="en-US" dirty="0" smtClean="0"/>
               <a:t>There are several approaches</a:t>
             </a:r>
-            <a:endParaRPr lang="en-US" dirty="0" smtClean="0"/>
           </a:p>
           <a:p>
             <a:endParaRPr lang="en-US" dirty="0" smtClean="0"/>
@@ -7872,12 +7466,12 @@
       </p:grpSpPr>
       <p:sp>
         <p:nvSpPr>
-          <p:cNvPr id="5" name="Text Placeholder 4"/>
+          <p:cNvPr id="2" name="Title 1"/>
           <p:cNvSpPr>
             <a:spLocks noGrp="1"/>
           </p:cNvSpPr>
           <p:nvPr>
-            <p:ph type="body" sz="quarter" idx="10"/>
+            <p:ph type="title"/>
           </p:nvPr>
         </p:nvSpPr>
         <p:spPr/>
@@ -7887,7 +7481,7 @@
           <a:p>
             <a:r>
               <a:rPr lang="en-US" dirty="0" smtClean="0"/>
-              <a:t>Conclusion</a:t>
+              <a:t>Azure API Services (Management)</a:t>
             </a:r>
             <a:endParaRPr lang="en-US" dirty="0"/>
           </a:p>
@@ -7895,12 +7489,12 @@
       </p:sp>
       <p:sp>
         <p:nvSpPr>
-          <p:cNvPr id="4" name="Subtitle 3"/>
+          <p:cNvPr id="3" name="Content Placeholder 2"/>
           <p:cNvSpPr>
             <a:spLocks noGrp="1"/>
           </p:cNvSpPr>
           <p:nvPr>
-            <p:ph type="subTitle" idx="1"/>
+            <p:ph sz="quarter" idx="10"/>
           </p:nvPr>
         </p:nvSpPr>
         <p:spPr/>
@@ -7910,16 +7504,67 @@
           <a:p>
             <a:r>
               <a:rPr lang="en-US" dirty="0" smtClean="0"/>
-              <a:t>“Now that you’re gone, some will grieve on, on, and on…”</a:t>
-            </a:r>
-            <a:endParaRPr lang="en-US" dirty="0"/>
+              <a:t>Create a public portal for consumption of the API</a:t>
+            </a:r>
+          </a:p>
+          <a:p>
+            <a:r>
+              <a:rPr lang="en-US" dirty="0" smtClean="0"/>
+              <a:t>Will “wrap” your API with an Azure-managed one</a:t>
+            </a:r>
+          </a:p>
+          <a:p>
+            <a:r>
+              <a:rPr lang="en-US" dirty="0" smtClean="0"/>
+              <a:t>Adds security, access, discovery, descriptions, and more</a:t>
+            </a:r>
+          </a:p>
+          <a:p>
+            <a:r>
+              <a:rPr lang="en-US" dirty="0" smtClean="0"/>
+              <a:t>Can charge for access to services </a:t>
+            </a:r>
+          </a:p>
+          <a:p>
+            <a:r>
+              <a:rPr lang="en-US" dirty="0" smtClean="0"/>
+              <a:t>Secured via a variety of methods </a:t>
+            </a:r>
+          </a:p>
+          <a:p>
+            <a:r>
+              <a:rPr lang="en-US" dirty="0" smtClean="0"/>
+              <a:t>Transform SOAP to REST and vice versa </a:t>
+            </a:r>
+          </a:p>
+          <a:p>
+            <a:r>
+              <a:rPr lang="en-US" dirty="0" smtClean="0"/>
+              <a:t>Export definitions in WADL and Swagger</a:t>
+            </a:r>
+          </a:p>
+          <a:p>
+            <a:r>
+              <a:rPr lang="en-US" dirty="0" smtClean="0"/>
+              <a:t>Analytics</a:t>
+            </a:r>
+            <a:endParaRPr lang="en-US" dirty="0" smtClean="0"/>
+          </a:p>
+          <a:p>
+            <a:endParaRPr lang="en-US" dirty="0" smtClean="0"/>
+          </a:p>
+          <a:p>
+            <a:endParaRPr lang="en-US" dirty="0" smtClean="0"/>
+          </a:p>
+          <a:p>
+            <a:endParaRPr lang="en-US" dirty="0" smtClean="0"/>
           </a:p>
         </p:txBody>
       </p:sp>
     </p:spTree>
     <p:extLst>
       <p:ext uri="{BB962C8B-B14F-4D97-AF65-F5344CB8AC3E}">
-        <p14:creationId xmlns:p14="http://schemas.microsoft.com/office/powerpoint/2010/main" val="4065454788"/>
+        <p14:creationId xmlns:p14="http://schemas.microsoft.com/office/powerpoint/2010/main" val="4195191174"/>
       </p:ext>
     </p:extLst>
   </p:cSld>
@@ -7953,10 +7598,154 @@
           <a:chExt cx="0" cy="0"/>
         </a:xfrm>
       </p:grpSpPr>
+      <p:sp>
+        <p:nvSpPr>
+          <p:cNvPr id="2" name="Title 1"/>
+          <p:cNvSpPr>
+            <a:spLocks noGrp="1"/>
+          </p:cNvSpPr>
+          <p:nvPr>
+            <p:ph type="title"/>
+          </p:nvPr>
+        </p:nvSpPr>
+        <p:spPr/>
+        <p:txBody>
+          <a:bodyPr/>
+          <a:lstStyle/>
+          <a:p>
+            <a:r>
+              <a:rPr lang="en-US" dirty="0" smtClean="0"/>
+              <a:t>Analytics</a:t>
+            </a:r>
+            <a:endParaRPr lang="en-US" dirty="0"/>
+          </a:p>
+        </p:txBody>
+      </p:sp>
+      <p:pic>
+        <p:nvPicPr>
+          <p:cNvPr id="4" name="Content Placeholder 3"/>
+          <p:cNvPicPr>
+            <a:picLocks noGrp="1" noChangeAspect="1"/>
+          </p:cNvPicPr>
+          <p:nvPr>
+            <p:ph sz="quarter" idx="10"/>
+          </p:nvPr>
+        </p:nvPicPr>
+        <p:blipFill>
+          <a:blip r:embed="rId2"/>
+          <a:stretch>
+            <a:fillRect/>
+          </a:stretch>
+        </p:blipFill>
+        <p:spPr>
+          <a:xfrm>
+            <a:off x="2518629" y="1387475"/>
+            <a:ext cx="7246818" cy="5291138"/>
+          </a:xfrm>
+          <a:prstGeom prst="rect">
+            <a:avLst/>
+          </a:prstGeom>
+        </p:spPr>
+      </p:pic>
     </p:spTree>
     <p:extLst>
       <p:ext uri="{BB962C8B-B14F-4D97-AF65-F5344CB8AC3E}">
-        <p14:creationId xmlns:p14="http://schemas.microsoft.com/office/powerpoint/2010/main" val="898363405"/>
+        <p14:creationId xmlns:p14="http://schemas.microsoft.com/office/powerpoint/2010/main" val="2708234484"/>
+      </p:ext>
+    </p:extLst>
+  </p:cSld>
+  <p:clrMapOvr>
+    <a:masterClrMapping/>
+  </p:clrMapOvr>
+  <p:timing>
+    <p:tnLst>
+      <p:par>
+        <p:cTn id="1" dur="indefinite" restart="never" nodeType="tmRoot"/>
+      </p:par>
+    </p:tnLst>
+  </p:timing>
+</p:sld>
+</file>
+
+<file path=ppt/slides/slide19.xml><?xml version="1.0" encoding="utf-8"?>
+<p:sld xmlns:a="http://schemas.openxmlformats.org/drawingml/2006/main" xmlns:r="http://schemas.openxmlformats.org/officeDocument/2006/relationships" xmlns:p="http://schemas.openxmlformats.org/presentationml/2006/main">
+  <p:cSld>
+    <p:spTree>
+      <p:nvGrpSpPr>
+        <p:cNvPr id="1" name=""/>
+        <p:cNvGrpSpPr/>
+        <p:nvPr/>
+      </p:nvGrpSpPr>
+      <p:grpSpPr>
+        <a:xfrm>
+          <a:off x="0" y="0"/>
+          <a:ext cx="0" cy="0"/>
+          <a:chOff x="0" y="0"/>
+          <a:chExt cx="0" cy="0"/>
+        </a:xfrm>
+      </p:grpSpPr>
+      <p:sp>
+        <p:nvSpPr>
+          <p:cNvPr id="2" name="Title 1"/>
+          <p:cNvSpPr>
+            <a:spLocks noGrp="1"/>
+          </p:cNvSpPr>
+          <p:nvPr>
+            <p:ph type="title"/>
+          </p:nvPr>
+        </p:nvSpPr>
+        <p:spPr/>
+        <p:txBody>
+          <a:bodyPr>
+            <a:normAutofit fontScale="90000"/>
+          </a:bodyPr>
+          <a:lstStyle/>
+          <a:p>
+            <a:r>
+              <a:rPr lang="en-US" dirty="0" smtClean="0"/>
+              <a:t>WADL (Web Application Description</a:t>
+            </a:r>
+            <a:br>
+              <a:rPr lang="en-US" dirty="0" smtClean="0"/>
+            </a:br>
+            <a:r>
+              <a:rPr lang="en-US" dirty="0" smtClean="0"/>
+              <a:t>Language)</a:t>
+            </a:r>
+            <a:endParaRPr lang="en-US" dirty="0"/>
+          </a:p>
+        </p:txBody>
+      </p:sp>
+      <p:pic>
+        <p:nvPicPr>
+          <p:cNvPr id="5" name="Content Placeholder 4"/>
+          <p:cNvPicPr>
+            <a:picLocks noGrp="1" noChangeAspect="1"/>
+          </p:cNvPicPr>
+          <p:nvPr>
+            <p:ph sz="quarter" idx="10"/>
+          </p:nvPr>
+        </p:nvPicPr>
+        <p:blipFill>
+          <a:blip r:embed="rId2"/>
+          <a:stretch>
+            <a:fillRect/>
+          </a:stretch>
+        </p:blipFill>
+        <p:spPr>
+          <a:xfrm>
+            <a:off x="1578635" y="1293344"/>
+            <a:ext cx="9126806" cy="5479400"/>
+          </a:xfrm>
+          <a:prstGeom prst="rect">
+            <a:avLst/>
+          </a:prstGeom>
+        </p:spPr>
+      </p:pic>
+    </p:spTree>
+    <p:extLst>
+      <p:ext uri="{BB962C8B-B14F-4D97-AF65-F5344CB8AC3E}">
+        <p14:creationId xmlns:p14="http://schemas.microsoft.com/office/powerpoint/2010/main" val="2100431437"/>
       </p:ext>
     </p:extLst>
   </p:cSld>
@@ -8071,6 +7860,343 @@
     <p:extLst>
       <p:ext uri="{BB962C8B-B14F-4D97-AF65-F5344CB8AC3E}">
         <p14:creationId xmlns:p14="http://schemas.microsoft.com/office/powerpoint/2010/main" val="318349970"/>
+      </p:ext>
+    </p:extLst>
+  </p:cSld>
+  <p:clrMapOvr>
+    <a:masterClrMapping/>
+  </p:clrMapOvr>
+  <p:timing>
+    <p:tnLst>
+      <p:par>
+        <p:cTn id="1" dur="indefinite" restart="never" nodeType="tmRoot"/>
+      </p:par>
+    </p:tnLst>
+  </p:timing>
+</p:sld>
+</file>
+
+<file path=ppt/slides/slide20.xml><?xml version="1.0" encoding="utf-8"?>
+<p:sld xmlns:a="http://schemas.openxmlformats.org/drawingml/2006/main" xmlns:r="http://schemas.openxmlformats.org/officeDocument/2006/relationships" xmlns:p="http://schemas.openxmlformats.org/presentationml/2006/main">
+  <p:cSld>
+    <p:spTree>
+      <p:nvGrpSpPr>
+        <p:cNvPr id="1" name=""/>
+        <p:cNvGrpSpPr/>
+        <p:nvPr/>
+      </p:nvGrpSpPr>
+      <p:grpSpPr>
+        <a:xfrm>
+          <a:off x="0" y="0"/>
+          <a:ext cx="0" cy="0"/>
+          <a:chOff x="0" y="0"/>
+          <a:chExt cx="0" cy="0"/>
+        </a:xfrm>
+      </p:grpSpPr>
+      <p:sp>
+        <p:nvSpPr>
+          <p:cNvPr id="2" name="Title 1"/>
+          <p:cNvSpPr>
+            <a:spLocks noGrp="1"/>
+          </p:cNvSpPr>
+          <p:nvPr>
+            <p:ph type="title"/>
+          </p:nvPr>
+        </p:nvSpPr>
+        <p:spPr/>
+        <p:txBody>
+          <a:bodyPr>
+            <a:normAutofit/>
+          </a:bodyPr>
+          <a:lstStyle/>
+          <a:p>
+            <a:r>
+              <a:rPr lang="en-US" dirty="0" smtClean="0"/>
+              <a:t>Swagger</a:t>
+            </a:r>
+            <a:endParaRPr lang="en-US" dirty="0"/>
+          </a:p>
+        </p:txBody>
+      </p:sp>
+      <p:pic>
+        <p:nvPicPr>
+          <p:cNvPr id="4" name="Content Placeholder 3"/>
+          <p:cNvPicPr>
+            <a:picLocks noGrp="1" noChangeAspect="1"/>
+          </p:cNvPicPr>
+          <p:nvPr>
+            <p:ph sz="quarter" idx="10"/>
+          </p:nvPr>
+        </p:nvPicPr>
+        <p:blipFill>
+          <a:blip r:embed="rId2"/>
+          <a:stretch>
+            <a:fillRect/>
+          </a:stretch>
+        </p:blipFill>
+        <p:spPr>
+          <a:xfrm>
+            <a:off x="3349664" y="1245702"/>
+            <a:ext cx="5584748" cy="5315900"/>
+          </a:xfrm>
+          <a:prstGeom prst="rect">
+            <a:avLst/>
+          </a:prstGeom>
+        </p:spPr>
+      </p:pic>
+    </p:spTree>
+    <p:extLst>
+      <p:ext uri="{BB962C8B-B14F-4D97-AF65-F5344CB8AC3E}">
+        <p14:creationId xmlns:p14="http://schemas.microsoft.com/office/powerpoint/2010/main" val="2637009790"/>
+      </p:ext>
+    </p:extLst>
+  </p:cSld>
+  <p:clrMapOvr>
+    <a:masterClrMapping/>
+  </p:clrMapOvr>
+  <p:timing>
+    <p:tnLst>
+      <p:par>
+        <p:cTn id="1" dur="indefinite" restart="never" nodeType="tmRoot"/>
+      </p:par>
+    </p:tnLst>
+  </p:timing>
+</p:sld>
+</file>
+
+<file path=ppt/slides/slide21.xml><?xml version="1.0" encoding="utf-8"?>
+<p:sld xmlns:a="http://schemas.openxmlformats.org/drawingml/2006/main" xmlns:r="http://schemas.openxmlformats.org/officeDocument/2006/relationships" xmlns:p="http://schemas.openxmlformats.org/presentationml/2006/main">
+  <p:cSld>
+    <p:spTree>
+      <p:nvGrpSpPr>
+        <p:cNvPr id="1" name=""/>
+        <p:cNvGrpSpPr/>
+        <p:nvPr/>
+      </p:nvGrpSpPr>
+      <p:grpSpPr>
+        <a:xfrm>
+          <a:off x="0" y="0"/>
+          <a:ext cx="0" cy="0"/>
+          <a:chOff x="0" y="0"/>
+          <a:chExt cx="0" cy="0"/>
+        </a:xfrm>
+      </p:grpSpPr>
+      <p:sp>
+        <p:nvSpPr>
+          <p:cNvPr id="5" name="Text Placeholder 4"/>
+          <p:cNvSpPr>
+            <a:spLocks noGrp="1"/>
+          </p:cNvSpPr>
+          <p:nvPr>
+            <p:ph type="body" sz="quarter" idx="10"/>
+          </p:nvPr>
+        </p:nvSpPr>
+        <p:spPr/>
+        <p:txBody>
+          <a:bodyPr/>
+          <a:lstStyle/>
+          <a:p>
+            <a:r>
+              <a:rPr lang="en-US" dirty="0" smtClean="0"/>
+              <a:t>Conclusion</a:t>
+            </a:r>
+            <a:endParaRPr lang="en-US" dirty="0"/>
+          </a:p>
+        </p:txBody>
+      </p:sp>
+      <p:sp>
+        <p:nvSpPr>
+          <p:cNvPr id="4" name="Subtitle 3"/>
+          <p:cNvSpPr>
+            <a:spLocks noGrp="1"/>
+          </p:cNvSpPr>
+          <p:nvPr>
+            <p:ph type="subTitle" idx="1"/>
+          </p:nvPr>
+        </p:nvSpPr>
+        <p:spPr/>
+        <p:txBody>
+          <a:bodyPr/>
+          <a:lstStyle/>
+          <a:p>
+            <a:r>
+              <a:rPr lang="en-US" dirty="0" smtClean="0"/>
+              <a:t>“Now that you’re gone, some will grieve on, on, and on…”</a:t>
+            </a:r>
+            <a:endParaRPr lang="en-US" dirty="0"/>
+          </a:p>
+        </p:txBody>
+      </p:sp>
+    </p:spTree>
+    <p:extLst>
+      <p:ext uri="{BB962C8B-B14F-4D97-AF65-F5344CB8AC3E}">
+        <p14:creationId xmlns:p14="http://schemas.microsoft.com/office/powerpoint/2010/main" val="4065454788"/>
+      </p:ext>
+    </p:extLst>
+  </p:cSld>
+  <p:clrMapOvr>
+    <a:masterClrMapping/>
+  </p:clrMapOvr>
+  <p:timing>
+    <p:tnLst>
+      <p:par>
+        <p:cTn id="1" dur="indefinite" restart="never" nodeType="tmRoot"/>
+      </p:par>
+    </p:tnLst>
+  </p:timing>
+</p:sld>
+</file>
+
+<file path=ppt/slides/slide22.xml><?xml version="1.0" encoding="utf-8"?>
+<p:sld xmlns:a="http://schemas.openxmlformats.org/drawingml/2006/main" xmlns:r="http://schemas.openxmlformats.org/officeDocument/2006/relationships" xmlns:p="http://schemas.openxmlformats.org/presentationml/2006/main">
+  <p:cSld>
+    <p:spTree>
+      <p:nvGrpSpPr>
+        <p:cNvPr id="1" name=""/>
+        <p:cNvGrpSpPr/>
+        <p:nvPr/>
+      </p:nvGrpSpPr>
+      <p:grpSpPr>
+        <a:xfrm>
+          <a:off x="0" y="0"/>
+          <a:ext cx="0" cy="0"/>
+          <a:chOff x="0" y="0"/>
+          <a:chExt cx="0" cy="0"/>
+        </a:xfrm>
+      </p:grpSpPr>
+      <p:sp>
+        <p:nvSpPr>
+          <p:cNvPr id="2" name="Title 1"/>
+          <p:cNvSpPr>
+            <a:spLocks noGrp="1"/>
+          </p:cNvSpPr>
+          <p:nvPr>
+            <p:ph type="title"/>
+          </p:nvPr>
+        </p:nvSpPr>
+        <p:spPr/>
+        <p:txBody>
+          <a:bodyPr/>
+          <a:lstStyle/>
+          <a:p>
+            <a:r>
+              <a:rPr lang="en-US" dirty="0" smtClean="0"/>
+              <a:t>Conclusion</a:t>
+            </a:r>
+            <a:endParaRPr lang="en-US" dirty="0"/>
+          </a:p>
+        </p:txBody>
+      </p:sp>
+      <p:sp>
+        <p:nvSpPr>
+          <p:cNvPr id="3" name="Content Placeholder 2"/>
+          <p:cNvSpPr>
+            <a:spLocks noGrp="1"/>
+          </p:cNvSpPr>
+          <p:nvPr>
+            <p:ph sz="quarter" idx="10"/>
+          </p:nvPr>
+        </p:nvSpPr>
+        <p:spPr/>
+        <p:txBody>
+          <a:bodyPr/>
+          <a:lstStyle/>
+          <a:p>
+            <a:r>
+              <a:rPr lang="en-US" dirty="0" smtClean="0"/>
+              <a:t>Go out and design great APIs! </a:t>
+            </a:r>
+          </a:p>
+          <a:p>
+            <a:endParaRPr lang="en-US" dirty="0"/>
+          </a:p>
+          <a:p>
+            <a:r>
+              <a:rPr lang="en-US" dirty="0" smtClean="0"/>
+              <a:t>@</a:t>
+            </a:r>
+            <a:r>
+              <a:rPr lang="en-US" dirty="0" err="1" smtClean="0"/>
+              <a:t>JeremyLikness</a:t>
+            </a:r>
+            <a:endParaRPr lang="en-US" dirty="0" smtClean="0"/>
+          </a:p>
+          <a:p>
+            <a:r>
+              <a:rPr lang="en-US" dirty="0" smtClean="0"/>
+              <a:t>@</a:t>
+            </a:r>
+            <a:r>
+              <a:rPr lang="en-US" dirty="0" err="1" smtClean="0"/>
+              <a:t>GeekTrainer</a:t>
+            </a:r>
+            <a:r>
+              <a:rPr lang="en-US" dirty="0" smtClean="0"/>
+              <a:t> </a:t>
+            </a:r>
+          </a:p>
+          <a:p>
+            <a:endParaRPr lang="en-US" dirty="0"/>
+          </a:p>
+          <a:p>
+            <a:r>
+              <a:rPr lang="en-US" dirty="0" smtClean="0"/>
+              <a:t>Thank you!</a:t>
+            </a:r>
+            <a:endParaRPr lang="en-US" dirty="0" smtClean="0"/>
+          </a:p>
+          <a:p>
+            <a:endParaRPr lang="en-US" dirty="0" smtClean="0"/>
+          </a:p>
+          <a:p>
+            <a:endParaRPr lang="en-US" dirty="0" smtClean="0"/>
+          </a:p>
+          <a:p>
+            <a:endParaRPr lang="en-US" dirty="0" smtClean="0"/>
+          </a:p>
+        </p:txBody>
+      </p:sp>
+    </p:spTree>
+    <p:extLst>
+      <p:ext uri="{BB962C8B-B14F-4D97-AF65-F5344CB8AC3E}">
+        <p14:creationId xmlns:p14="http://schemas.microsoft.com/office/powerpoint/2010/main" val="1437540085"/>
+      </p:ext>
+    </p:extLst>
+  </p:cSld>
+  <p:clrMapOvr>
+    <a:masterClrMapping/>
+  </p:clrMapOvr>
+  <p:timing>
+    <p:tnLst>
+      <p:par>
+        <p:cTn id="1" dur="indefinite" restart="never" nodeType="tmRoot"/>
+      </p:par>
+    </p:tnLst>
+  </p:timing>
+</p:sld>
+</file>
+
+<file path=ppt/slides/slide23.xml><?xml version="1.0" encoding="utf-8"?>
+<p:sld xmlns:a="http://schemas.openxmlformats.org/drawingml/2006/main" xmlns:r="http://schemas.openxmlformats.org/officeDocument/2006/relationships" xmlns:p="http://schemas.openxmlformats.org/presentationml/2006/main">
+  <p:cSld>
+    <p:spTree>
+      <p:nvGrpSpPr>
+        <p:cNvPr id="1" name=""/>
+        <p:cNvGrpSpPr/>
+        <p:nvPr/>
+      </p:nvGrpSpPr>
+      <p:grpSpPr>
+        <a:xfrm>
+          <a:off x="0" y="0"/>
+          <a:ext cx="0" cy="0"/>
+          <a:chOff x="0" y="0"/>
+          <a:chExt cx="0" cy="0"/>
+        </a:xfrm>
+      </p:grpSpPr>
+    </p:spTree>
+    <p:extLst>
+      <p:ext uri="{BB962C8B-B14F-4D97-AF65-F5344CB8AC3E}">
+        <p14:creationId xmlns:p14="http://schemas.microsoft.com/office/powerpoint/2010/main" val="898363405"/>
       </p:ext>
     </p:extLst>
   </p:cSld>
@@ -9584,16 +9710,12 @@
 </file>
 
 <file path=customXml/item1.xml><?xml version="1.0" encoding="utf-8"?>
-<p:properties xmlns:p="http://schemas.microsoft.com/office/2006/metadata/properties" xmlns:xsi="http://www.w3.org/2001/XMLSchema-instance" xmlns:pc="http://schemas.microsoft.com/office/infopath/2007/PartnerControls">
-  <documentManagement>
-    <TaxCatchAll xmlns="230e9df3-be65-4c73-a93b-d1236ebd677e"/>
-    <PublishingExpirationDate xmlns="http://schemas.microsoft.com/sharepoint/v3" xsi:nil="true"/>
-    <PublishingStartDate xmlns="http://schemas.microsoft.com/sharepoint/v3" xsi:nil="true"/>
-    <TaxKeywordTaxHTField xmlns="230e9df3-be65-4c73-a93b-d1236ebd677e">
-      <Terms xmlns="http://schemas.microsoft.com/office/infopath/2007/PartnerControls"/>
-    </TaxKeywordTaxHTField>
-  </documentManagement>
-</p:properties>
+<?mso-contentType ?>
+<FormTemplates xmlns="http://schemas.microsoft.com/sharepoint/v3/contenttype/forms">
+  <Display>DocumentLibraryForm</Display>
+  <Edit>DocumentLibraryForm</Edit>
+  <New>DocumentLibraryForm</New>
+</FormTemplates>
 </file>
 
 <file path=customXml/item2.xml><?xml version="1.0" encoding="utf-8"?>
@@ -9779,28 +9901,22 @@
 </file>
 
 <file path=customXml/item3.xml><?xml version="1.0" encoding="utf-8"?>
-<?mso-contentType ?>
-<FormTemplates xmlns="http://schemas.microsoft.com/sharepoint/v3/contenttype/forms">
-  <Display>DocumentLibraryForm</Display>
-  <Edit>DocumentLibraryForm</Edit>
-  <New>DocumentLibraryForm</New>
-</FormTemplates>
+<p:properties xmlns:p="http://schemas.microsoft.com/office/2006/metadata/properties" xmlns:xsi="http://www.w3.org/2001/XMLSchema-instance" xmlns:pc="http://schemas.microsoft.com/office/infopath/2007/PartnerControls">
+  <documentManagement>
+    <TaxCatchAll xmlns="230e9df3-be65-4c73-a93b-d1236ebd677e"/>
+    <PublishingExpirationDate xmlns="http://schemas.microsoft.com/sharepoint/v3" xsi:nil="true"/>
+    <PublishingStartDate xmlns="http://schemas.microsoft.com/sharepoint/v3" xsi:nil="true"/>
+    <TaxKeywordTaxHTField xmlns="230e9df3-be65-4c73-a93b-d1236ebd677e">
+      <Terms xmlns="http://schemas.microsoft.com/office/infopath/2007/PartnerControls"/>
+    </TaxKeywordTaxHTField>
+  </documentManagement>
+</p:properties>
 </file>
 
 <file path=customXml/itemProps1.xml><?xml version="1.0" encoding="utf-8"?>
-<ds:datastoreItem xmlns:ds="http://schemas.openxmlformats.org/officeDocument/2006/customXml" ds:itemID="{7025FDD9-4C58-4084-9F89-0E6ADD6FFF55}">
+<ds:datastoreItem xmlns:ds="http://schemas.openxmlformats.org/officeDocument/2006/customXml" ds:itemID="{B0CA13EC-1D3C-4D6F-8D1C-E8A452CFC79A}">
   <ds:schemaRefs>
-    <ds:schemaRef ds:uri="27aa9422-7f1f-4c84-9cdf-302b1a67e513"/>
-    <ds:schemaRef ds:uri="http://schemas.microsoft.com/office/2006/documentManagement/types"/>
-    <ds:schemaRef ds:uri="http://schemas.microsoft.com/office/2006/metadata/properties"/>
-    <ds:schemaRef ds:uri="http://purl.org/dc/elements/1.1/"/>
-    <ds:schemaRef ds:uri="230e9df3-be65-4c73-a93b-d1236ebd677e"/>
-    <ds:schemaRef ds:uri="http://purl.org/dc/terms/"/>
-    <ds:schemaRef ds:uri="http://schemas.openxmlformats.org/package/2006/metadata/core-properties"/>
-    <ds:schemaRef ds:uri="http://purl.org/dc/dcmitype/"/>
-    <ds:schemaRef ds:uri="http://schemas.microsoft.com/office/infopath/2007/PartnerControls"/>
-    <ds:schemaRef ds:uri="http://schemas.microsoft.com/sharepoint/v3"/>
-    <ds:schemaRef ds:uri="http://www.w3.org/XML/1998/namespace"/>
+    <ds:schemaRef ds:uri="http://schemas.microsoft.com/sharepoint/v3/contenttype/forms"/>
   </ds:schemaRefs>
 </ds:datastoreItem>
 </file>
@@ -9826,9 +9942,19 @@
 </file>
 
 <file path=customXml/itemProps3.xml><?xml version="1.0" encoding="utf-8"?>
-<ds:datastoreItem xmlns:ds="http://schemas.openxmlformats.org/officeDocument/2006/customXml" ds:itemID="{B0CA13EC-1D3C-4D6F-8D1C-E8A452CFC79A}">
+<ds:datastoreItem xmlns:ds="http://schemas.openxmlformats.org/officeDocument/2006/customXml" ds:itemID="{7025FDD9-4C58-4084-9F89-0E6ADD6FFF55}">
   <ds:schemaRefs>
-    <ds:schemaRef ds:uri="http://schemas.microsoft.com/sharepoint/v3/contenttype/forms"/>
+    <ds:schemaRef ds:uri="27aa9422-7f1f-4c84-9cdf-302b1a67e513"/>
+    <ds:schemaRef ds:uri="http://schemas.microsoft.com/office/2006/documentManagement/types"/>
+    <ds:schemaRef ds:uri="http://schemas.microsoft.com/office/2006/metadata/properties"/>
+    <ds:schemaRef ds:uri="http://purl.org/dc/elements/1.1/"/>
+    <ds:schemaRef ds:uri="230e9df3-be65-4c73-a93b-d1236ebd677e"/>
+    <ds:schemaRef ds:uri="http://purl.org/dc/terms/"/>
+    <ds:schemaRef ds:uri="http://schemas.openxmlformats.org/package/2006/metadata/core-properties"/>
+    <ds:schemaRef ds:uri="http://purl.org/dc/dcmitype/"/>
+    <ds:schemaRef ds:uri="http://schemas.microsoft.com/office/infopath/2007/PartnerControls"/>
+    <ds:schemaRef ds:uri="http://schemas.microsoft.com/sharepoint/v3"/>
+    <ds:schemaRef ds:uri="http://www.w3.org/XML/1998/namespace"/>
   </ds:schemaRefs>
 </ds:datastoreItem>
 </file>
</xml_diff>

<commit_message>
Tweaks for deck and examples for Module 6
</commit_message>
<xml_diff>
--- a/Slides/Module 6 - Web API Advanced Design.pptx
+++ b/Slides/Module 6 - Web API Advanced Design.pptx
@@ -3179,7 +3179,7 @@
           <a:p>
             <a:fld id="{312E7B4A-039C-48A2-9B2C-AF16AA3873D8}" type="datetimeFigureOut">
               <a:rPr lang="en-US" smtClean="0"/>
-              <a:t>1/28/2015</a:t>
+              <a:t>1/29/2015</a:t>
             </a:fld>
             <a:endParaRPr lang="en-US"/>
           </a:p>
@@ -3344,7 +3344,7 @@
           <a:p>
             <a:fld id="{DA005A0C-54D9-45AA-87D4-C551D08DFCE1}" type="datetimeFigureOut">
               <a:rPr lang="en-US" smtClean="0"/>
-              <a:t>1/28/2015</a:t>
+              <a:t>1/29/2015</a:t>
             </a:fld>
             <a:endParaRPr lang="en-US"/>
           </a:p>
@@ -3942,7 +3942,6 @@
               <a:rPr lang="en-US" dirty="0" smtClean="0"/>
               <a:t>/vectors</a:t>
             </a:r>
-            <a:endParaRPr lang="en-US" dirty="0" smtClean="0"/>
           </a:p>
           <a:p>
             <a:r>
@@ -4100,7 +4099,7 @@
               <a:t>api</a:t>
             </a:r>
             <a:r>
-              <a:rPr lang="en-US" smtClean="0"/>
+              <a:rPr lang="en-US" dirty="0" smtClean="0"/>
               <a:t>/vectors/1|2|3|4|5|6</a:t>
             </a:r>
             <a:endParaRPr lang="en-US" dirty="0"/>
@@ -4207,11 +4206,15 @@
             </a:r>
             <a:r>
               <a:rPr lang="en-US" dirty="0" err="1" smtClean="0"/>
-              <a:t>nobinding</a:t>
-            </a:r>
-            <a:r>
-              <a:rPr lang="en-US" dirty="0" smtClean="0"/>
-              <a:t> requires for data (</a:t>
+              <a:t>nobinder</a:t>
+            </a:r>
+            <a:r>
+              <a:rPr lang="en-US" dirty="0" smtClean="0"/>
+              <a:t> </a:t>
+            </a:r>
+            <a:r>
+              <a:rPr lang="en-US" dirty="0" smtClean="0"/>
+              <a:t>requires for data (</a:t>
             </a:r>
             <a:r>
               <a:rPr lang="en-US" dirty="0" err="1" smtClean="0"/>
@@ -4233,7 +4236,11 @@
             </a:r>
             <a:r>
               <a:rPr lang="en-US" dirty="0" smtClean="0"/>
-              <a:t>/vectors/binding can take a ?vector=1|2|3|4|5|6</a:t>
+              <a:t>/vectors/binder </a:t>
+            </a:r>
+            <a:r>
+              <a:rPr lang="en-US" dirty="0" smtClean="0"/>
+              <a:t>can take a ?vector=1|2|3|4|5|6</a:t>
             </a:r>
             <a:r>
               <a:rPr lang="en-US" baseline="0" dirty="0" smtClean="0"/>
@@ -4325,10 +4332,68 @@
           <a:p>
             <a:r>
               <a:rPr lang="en-US" dirty="0" smtClean="0"/>
-              <a:t>06dVersioning – attribute based and non-attribute</a:t>
-            </a:r>
-          </a:p>
-          <a:p>
+              <a:t>06dVersioning</a:t>
+            </a:r>
+          </a:p>
+          <a:p>
+            <a:r>
+              <a:rPr lang="en-US" dirty="0" smtClean="0"/>
+              <a:t>/</a:t>
+            </a:r>
+            <a:r>
+              <a:rPr lang="en-US" dirty="0" err="1" smtClean="0"/>
+              <a:t>api</a:t>
+            </a:r>
+            <a:r>
+              <a:rPr lang="en-US" dirty="0" smtClean="0"/>
+              <a:t>/things,</a:t>
+            </a:r>
+            <a:r>
+              <a:rPr lang="en-US" baseline="0" dirty="0" smtClean="0"/>
+              <a:t> /</a:t>
+            </a:r>
+            <a:r>
+              <a:rPr lang="en-US" baseline="0" dirty="0" err="1" smtClean="0"/>
+              <a:t>api</a:t>
+            </a:r>
+            <a:r>
+              <a:rPr lang="en-US" baseline="0" dirty="0" smtClean="0"/>
+              <a:t>/v2/things, /</a:t>
+            </a:r>
+            <a:r>
+              <a:rPr lang="en-US" baseline="0" dirty="0" err="1" smtClean="0"/>
+              <a:t>api</a:t>
+            </a:r>
+            <a:r>
+              <a:rPr lang="en-US" baseline="0" dirty="0" smtClean="0"/>
+              <a:t>/v1/things, header Version 1, header Accept application/xml, header Accept application/</a:t>
+            </a:r>
+            <a:r>
+              <a:rPr lang="en-US" baseline="0" dirty="0" err="1" smtClean="0"/>
+              <a:t>xml;Version</a:t>
+            </a:r>
+            <a:r>
+              <a:rPr lang="en-US" baseline="0" dirty="0" smtClean="0"/>
+              <a:t>=1</a:t>
+            </a:r>
+          </a:p>
+          <a:p>
+            <a:r>
+              <a:rPr lang="en-US" dirty="0" smtClean="0"/>
+              <a:t>/</a:t>
+            </a:r>
+            <a:r>
+              <a:rPr lang="en-US" dirty="0" err="1" smtClean="0"/>
+              <a:t>api</a:t>
+            </a:r>
+            <a:r>
+              <a:rPr lang="en-US" dirty="0" smtClean="0"/>
+              <a:t>/versions (use same request</a:t>
+            </a:r>
+            <a:r>
+              <a:rPr lang="en-US" baseline="0" dirty="0" smtClean="0"/>
+              <a:t> headers)</a:t>
+            </a:r>
             <a:endParaRPr lang="en-US" dirty="0"/>
           </a:p>
         </p:txBody>
@@ -8563,7 +8628,6 @@
               <a:rPr lang="en-US" dirty="0" smtClean="0"/>
               <a:t> </a:t>
             </a:r>
-            <a:endParaRPr lang="en-US" dirty="0" smtClean="0"/>
           </a:p>
           <a:p>
             <a:r>
@@ -9136,8 +9200,21 @@
             </a:r>
             <a:r>
               <a:rPr lang="en-US" dirty="0" smtClean="0"/>
-              <a:t> (string)</a:t>
-            </a:r>
+              <a:t> (string) [Set </a:t>
+            </a:r>
+            <a:r>
+              <a:rPr lang="en-US" dirty="0" err="1" smtClean="0"/>
+              <a:t>CanConvertTo</a:t>
+            </a:r>
+            <a:r>
+              <a:rPr lang="en-US" dirty="0" smtClean="0"/>
+              <a:t> </a:t>
+            </a:r>
+            <a:r>
+              <a:rPr lang="en-US" smtClean="0"/>
+              <a:t>to False!!!]</a:t>
+            </a:r>
+            <a:endParaRPr lang="en-US" dirty="0" smtClean="0"/>
           </a:p>
           <a:p>
             <a:r>

</xml_diff>